<commit_message>
added documents and a rough draft of final presentation
</commit_message>
<xml_diff>
--- a/Doc/SSBB.pptx
+++ b/Doc/SSBB.pptx
@@ -4,13 +4,17 @@
   <p:sldMasterIdLst>
     <p:sldMasterId id="2147483648" r:id="rId1"/>
   </p:sldMasterIdLst>
+  <p:notesMasterIdLst>
+    <p:notesMasterId r:id="rId9"/>
+  </p:notesMasterIdLst>
   <p:sldIdLst>
     <p:sldId id="256" r:id="rId2"/>
     <p:sldId id="257" r:id="rId3"/>
     <p:sldId id="258" r:id="rId4"/>
     <p:sldId id="259" r:id="rId5"/>
-    <p:sldId id="260" r:id="rId6"/>
-    <p:sldId id="261" r:id="rId7"/>
+    <p:sldId id="263" r:id="rId6"/>
+    <p:sldId id="262" r:id="rId7"/>
+    <p:sldId id="261" r:id="rId8"/>
   </p:sldIdLst>
   <p:sldSz cx="9144000" cy="6858000" type="screen4x3"/>
   <p:notesSz cx="6858000" cy="9144000"/>
@@ -112,6 +116,776 @@
 </p:presentation>
 </file>
 
+<file path=ppt/notesMasters/notesMaster1.xml><?xml version="1.0" encoding="utf-8"?>
+<p:notesMaster xmlns:a="http://schemas.openxmlformats.org/drawingml/2006/main" xmlns:r="http://schemas.openxmlformats.org/officeDocument/2006/relationships" xmlns:p="http://schemas.openxmlformats.org/presentationml/2006/main">
+  <p:cSld>
+    <p:bg>
+      <p:bgRef idx="1001">
+        <a:schemeClr val="bg1"/>
+      </p:bgRef>
+    </p:bg>
+    <p:spTree>
+      <p:nvGrpSpPr>
+        <p:cNvPr id="1" name=""/>
+        <p:cNvGrpSpPr/>
+        <p:nvPr/>
+      </p:nvGrpSpPr>
+      <p:grpSpPr>
+        <a:xfrm>
+          <a:off x="0" y="0"/>
+          <a:ext cx="0" cy="0"/>
+          <a:chOff x="0" y="0"/>
+          <a:chExt cx="0" cy="0"/>
+        </a:xfrm>
+      </p:grpSpPr>
+      <p:sp>
+        <p:nvSpPr>
+          <p:cNvPr id="2" name="Header Placeholder 1"/>
+          <p:cNvSpPr>
+            <a:spLocks noGrp="1"/>
+          </p:cNvSpPr>
+          <p:nvPr>
+            <p:ph type="hdr" sz="quarter"/>
+          </p:nvPr>
+        </p:nvSpPr>
+        <p:spPr>
+          <a:xfrm>
+            <a:off x="0" y="0"/>
+            <a:ext cx="2971800" cy="457200"/>
+          </a:xfrm>
+          <a:prstGeom prst="rect">
+            <a:avLst/>
+          </a:prstGeom>
+        </p:spPr>
+        <p:txBody>
+          <a:bodyPr vert="horz" lIns="91440" tIns="45720" rIns="91440" bIns="45720" rtlCol="0"/>
+          <a:lstStyle>
+            <a:lvl1pPr algn="l">
+              <a:defRPr sz="1200"/>
+            </a:lvl1pPr>
+          </a:lstStyle>
+          <a:p>
+            <a:endParaRPr lang="en-US"/>
+          </a:p>
+        </p:txBody>
+      </p:sp>
+      <p:sp>
+        <p:nvSpPr>
+          <p:cNvPr id="3" name="Date Placeholder 2"/>
+          <p:cNvSpPr>
+            <a:spLocks noGrp="1"/>
+          </p:cNvSpPr>
+          <p:nvPr>
+            <p:ph type="dt" idx="1"/>
+          </p:nvPr>
+        </p:nvSpPr>
+        <p:spPr>
+          <a:xfrm>
+            <a:off x="3884613" y="0"/>
+            <a:ext cx="2971800" cy="457200"/>
+          </a:xfrm>
+          <a:prstGeom prst="rect">
+            <a:avLst/>
+          </a:prstGeom>
+        </p:spPr>
+        <p:txBody>
+          <a:bodyPr vert="horz" lIns="91440" tIns="45720" rIns="91440" bIns="45720" rtlCol="0"/>
+          <a:lstStyle>
+            <a:lvl1pPr algn="r">
+              <a:defRPr sz="1200"/>
+            </a:lvl1pPr>
+          </a:lstStyle>
+          <a:p>
+            <a:fld id="{403354D1-20C3-4F56-B919-64B1C606EB49}" type="datetimeFigureOut">
+              <a:rPr lang="en-US" smtClean="0"/>
+              <a:t>2/13/2012</a:t>
+            </a:fld>
+            <a:endParaRPr lang="en-US"/>
+          </a:p>
+        </p:txBody>
+      </p:sp>
+      <p:sp>
+        <p:nvSpPr>
+          <p:cNvPr id="4" name="Slide Image Placeholder 3"/>
+          <p:cNvSpPr>
+            <a:spLocks noGrp="1" noRot="1" noChangeAspect="1"/>
+          </p:cNvSpPr>
+          <p:nvPr>
+            <p:ph type="sldImg" idx="2"/>
+          </p:nvPr>
+        </p:nvSpPr>
+        <p:spPr>
+          <a:xfrm>
+            <a:off x="1143000" y="685800"/>
+            <a:ext cx="4572000" cy="3429000"/>
+          </a:xfrm>
+          <a:prstGeom prst="rect">
+            <a:avLst/>
+          </a:prstGeom>
+          <a:noFill/>
+          <a:ln w="12700">
+            <a:solidFill>
+              <a:prstClr val="black"/>
+            </a:solidFill>
+          </a:ln>
+        </p:spPr>
+        <p:txBody>
+          <a:bodyPr vert="horz" lIns="91440" tIns="45720" rIns="91440" bIns="45720" rtlCol="0" anchor="ctr"/>
+          <a:lstStyle/>
+          <a:p>
+            <a:endParaRPr lang="en-US"/>
+          </a:p>
+        </p:txBody>
+      </p:sp>
+      <p:sp>
+        <p:nvSpPr>
+          <p:cNvPr id="5" name="Notes Placeholder 4"/>
+          <p:cNvSpPr>
+            <a:spLocks noGrp="1"/>
+          </p:cNvSpPr>
+          <p:nvPr>
+            <p:ph type="body" sz="quarter" idx="3"/>
+          </p:nvPr>
+        </p:nvSpPr>
+        <p:spPr>
+          <a:xfrm>
+            <a:off x="685800" y="4343400"/>
+            <a:ext cx="5486400" cy="4114800"/>
+          </a:xfrm>
+          <a:prstGeom prst="rect">
+            <a:avLst/>
+          </a:prstGeom>
+        </p:spPr>
+        <p:txBody>
+          <a:bodyPr vert="horz" lIns="91440" tIns="45720" rIns="91440" bIns="45720" rtlCol="0"/>
+          <a:lstStyle/>
+          <a:p>
+            <a:pPr lvl="0"/>
+            <a:r>
+              <a:rPr lang="en-US" smtClean="0"/>
+              <a:t>Click to edit Master text styles</a:t>
+            </a:r>
+          </a:p>
+          <a:p>
+            <a:pPr lvl="1"/>
+            <a:r>
+              <a:rPr lang="en-US" smtClean="0"/>
+              <a:t>Second level</a:t>
+            </a:r>
+          </a:p>
+          <a:p>
+            <a:pPr lvl="2"/>
+            <a:r>
+              <a:rPr lang="en-US" smtClean="0"/>
+              <a:t>Third level</a:t>
+            </a:r>
+          </a:p>
+          <a:p>
+            <a:pPr lvl="3"/>
+            <a:r>
+              <a:rPr lang="en-US" smtClean="0"/>
+              <a:t>Fourth level</a:t>
+            </a:r>
+          </a:p>
+          <a:p>
+            <a:pPr lvl="4"/>
+            <a:r>
+              <a:rPr lang="en-US" smtClean="0"/>
+              <a:t>Fifth level</a:t>
+            </a:r>
+            <a:endParaRPr lang="en-US"/>
+          </a:p>
+        </p:txBody>
+      </p:sp>
+      <p:sp>
+        <p:nvSpPr>
+          <p:cNvPr id="6" name="Footer Placeholder 5"/>
+          <p:cNvSpPr>
+            <a:spLocks noGrp="1"/>
+          </p:cNvSpPr>
+          <p:nvPr>
+            <p:ph type="ftr" sz="quarter" idx="4"/>
+          </p:nvPr>
+        </p:nvSpPr>
+        <p:spPr>
+          <a:xfrm>
+            <a:off x="0" y="8685213"/>
+            <a:ext cx="2971800" cy="457200"/>
+          </a:xfrm>
+          <a:prstGeom prst="rect">
+            <a:avLst/>
+          </a:prstGeom>
+        </p:spPr>
+        <p:txBody>
+          <a:bodyPr vert="horz" lIns="91440" tIns="45720" rIns="91440" bIns="45720" rtlCol="0" anchor="b"/>
+          <a:lstStyle>
+            <a:lvl1pPr algn="l">
+              <a:defRPr sz="1200"/>
+            </a:lvl1pPr>
+          </a:lstStyle>
+          <a:p>
+            <a:endParaRPr lang="en-US"/>
+          </a:p>
+        </p:txBody>
+      </p:sp>
+      <p:sp>
+        <p:nvSpPr>
+          <p:cNvPr id="7" name="Slide Number Placeholder 6"/>
+          <p:cNvSpPr>
+            <a:spLocks noGrp="1"/>
+          </p:cNvSpPr>
+          <p:nvPr>
+            <p:ph type="sldNum" sz="quarter" idx="5"/>
+          </p:nvPr>
+        </p:nvSpPr>
+        <p:spPr>
+          <a:xfrm>
+            <a:off x="3884613" y="8685213"/>
+            <a:ext cx="2971800" cy="457200"/>
+          </a:xfrm>
+          <a:prstGeom prst="rect">
+            <a:avLst/>
+          </a:prstGeom>
+        </p:spPr>
+        <p:txBody>
+          <a:bodyPr vert="horz" lIns="91440" tIns="45720" rIns="91440" bIns="45720" rtlCol="0" anchor="b"/>
+          <a:lstStyle>
+            <a:lvl1pPr algn="r">
+              <a:defRPr sz="1200"/>
+            </a:lvl1pPr>
+          </a:lstStyle>
+          <a:p>
+            <a:fld id="{7C2ACA1A-54EA-4124-A07F-903EDF5822AB}" type="slidenum">
+              <a:rPr lang="en-US" smtClean="0"/>
+              <a:t>‹#›</a:t>
+            </a:fld>
+            <a:endParaRPr lang="en-US"/>
+          </a:p>
+        </p:txBody>
+      </p:sp>
+    </p:spTree>
+    <p:extLst>
+      <p:ext uri="{BB962C8B-B14F-4D97-AF65-F5344CB8AC3E}">
+        <p14:creationId xmlns:p14="http://schemas.microsoft.com/office/powerpoint/2010/main" val="1796528328"/>
+      </p:ext>
+    </p:extLst>
+  </p:cSld>
+  <p:clrMap bg1="lt1" tx1="dk1" bg2="lt2" tx2="dk2" accent1="accent1" accent2="accent2" accent3="accent3" accent4="accent4" accent5="accent5" accent6="accent6" hlink="hlink" folHlink="folHlink"/>
+  <p:notesStyle>
+    <a:lvl1pPr marL="0" algn="l" defTabSz="914400" rtl="0" eaLnBrk="1" latinLnBrk="0" hangingPunct="1">
+      <a:defRPr sz="1200" kern="1200">
+        <a:solidFill>
+          <a:schemeClr val="tx1"/>
+        </a:solidFill>
+        <a:latin typeface="+mn-lt"/>
+        <a:ea typeface="+mn-ea"/>
+        <a:cs typeface="+mn-cs"/>
+      </a:defRPr>
+    </a:lvl1pPr>
+    <a:lvl2pPr marL="457200" algn="l" defTabSz="914400" rtl="0" eaLnBrk="1" latinLnBrk="0" hangingPunct="1">
+      <a:defRPr sz="1200" kern="1200">
+        <a:solidFill>
+          <a:schemeClr val="tx1"/>
+        </a:solidFill>
+        <a:latin typeface="+mn-lt"/>
+        <a:ea typeface="+mn-ea"/>
+        <a:cs typeface="+mn-cs"/>
+      </a:defRPr>
+    </a:lvl2pPr>
+    <a:lvl3pPr marL="914400" algn="l" defTabSz="914400" rtl="0" eaLnBrk="1" latinLnBrk="0" hangingPunct="1">
+      <a:defRPr sz="1200" kern="1200">
+        <a:solidFill>
+          <a:schemeClr val="tx1"/>
+        </a:solidFill>
+        <a:latin typeface="+mn-lt"/>
+        <a:ea typeface="+mn-ea"/>
+        <a:cs typeface="+mn-cs"/>
+      </a:defRPr>
+    </a:lvl3pPr>
+    <a:lvl4pPr marL="1371600" algn="l" defTabSz="914400" rtl="0" eaLnBrk="1" latinLnBrk="0" hangingPunct="1">
+      <a:defRPr sz="1200" kern="1200">
+        <a:solidFill>
+          <a:schemeClr val="tx1"/>
+        </a:solidFill>
+        <a:latin typeface="+mn-lt"/>
+        <a:ea typeface="+mn-ea"/>
+        <a:cs typeface="+mn-cs"/>
+      </a:defRPr>
+    </a:lvl4pPr>
+    <a:lvl5pPr marL="1828800" algn="l" defTabSz="914400" rtl="0" eaLnBrk="1" latinLnBrk="0" hangingPunct="1">
+      <a:defRPr sz="1200" kern="1200">
+        <a:solidFill>
+          <a:schemeClr val="tx1"/>
+        </a:solidFill>
+        <a:latin typeface="+mn-lt"/>
+        <a:ea typeface="+mn-ea"/>
+        <a:cs typeface="+mn-cs"/>
+      </a:defRPr>
+    </a:lvl5pPr>
+    <a:lvl6pPr marL="2286000" algn="l" defTabSz="914400" rtl="0" eaLnBrk="1" latinLnBrk="0" hangingPunct="1">
+      <a:defRPr sz="1200" kern="1200">
+        <a:solidFill>
+          <a:schemeClr val="tx1"/>
+        </a:solidFill>
+        <a:latin typeface="+mn-lt"/>
+        <a:ea typeface="+mn-ea"/>
+        <a:cs typeface="+mn-cs"/>
+      </a:defRPr>
+    </a:lvl6pPr>
+    <a:lvl7pPr marL="2743200" algn="l" defTabSz="914400" rtl="0" eaLnBrk="1" latinLnBrk="0" hangingPunct="1">
+      <a:defRPr sz="1200" kern="1200">
+        <a:solidFill>
+          <a:schemeClr val="tx1"/>
+        </a:solidFill>
+        <a:latin typeface="+mn-lt"/>
+        <a:ea typeface="+mn-ea"/>
+        <a:cs typeface="+mn-cs"/>
+      </a:defRPr>
+    </a:lvl7pPr>
+    <a:lvl8pPr marL="3200400" algn="l" defTabSz="914400" rtl="0" eaLnBrk="1" latinLnBrk="0" hangingPunct="1">
+      <a:defRPr sz="1200" kern="1200">
+        <a:solidFill>
+          <a:schemeClr val="tx1"/>
+        </a:solidFill>
+        <a:latin typeface="+mn-lt"/>
+        <a:ea typeface="+mn-ea"/>
+        <a:cs typeface="+mn-cs"/>
+      </a:defRPr>
+    </a:lvl8pPr>
+    <a:lvl9pPr marL="3657600" algn="l" defTabSz="914400" rtl="0" eaLnBrk="1" latinLnBrk="0" hangingPunct="1">
+      <a:defRPr sz="1200" kern="1200">
+        <a:solidFill>
+          <a:schemeClr val="tx1"/>
+        </a:solidFill>
+        <a:latin typeface="+mn-lt"/>
+        <a:ea typeface="+mn-ea"/>
+        <a:cs typeface="+mn-cs"/>
+      </a:defRPr>
+    </a:lvl9pPr>
+  </p:notesStyle>
+</p:notesMaster>
+</file>
+
+<file path=ppt/notesSlides/notesSlide1.xml><?xml version="1.0" encoding="utf-8"?>
+<p:notes xmlns:a="http://schemas.openxmlformats.org/drawingml/2006/main" xmlns:r="http://schemas.openxmlformats.org/officeDocument/2006/relationships" xmlns:p="http://schemas.openxmlformats.org/presentationml/2006/main">
+  <p:cSld>
+    <p:spTree>
+      <p:nvGrpSpPr>
+        <p:cNvPr id="1" name=""/>
+        <p:cNvGrpSpPr/>
+        <p:nvPr/>
+      </p:nvGrpSpPr>
+      <p:grpSpPr>
+        <a:xfrm>
+          <a:off x="0" y="0"/>
+          <a:ext cx="0" cy="0"/>
+          <a:chOff x="0" y="0"/>
+          <a:chExt cx="0" cy="0"/>
+        </a:xfrm>
+      </p:grpSpPr>
+      <p:sp>
+        <p:nvSpPr>
+          <p:cNvPr id="2" name="Slide Image Placeholder 1"/>
+          <p:cNvSpPr>
+            <a:spLocks noGrp="1" noRot="1" noChangeAspect="1"/>
+          </p:cNvSpPr>
+          <p:nvPr>
+            <p:ph type="sldImg"/>
+          </p:nvPr>
+        </p:nvSpPr>
+        <p:spPr/>
+      </p:sp>
+      <p:sp>
+        <p:nvSpPr>
+          <p:cNvPr id="3" name="Notes Placeholder 2"/>
+          <p:cNvSpPr>
+            <a:spLocks noGrp="1"/>
+          </p:cNvSpPr>
+          <p:nvPr>
+            <p:ph type="body" idx="1"/>
+          </p:nvPr>
+        </p:nvSpPr>
+        <p:spPr/>
+        <p:txBody>
+          <a:bodyPr/>
+          <a:lstStyle/>
+          <a:p>
+            <a:r>
+              <a:rPr lang="en-US" dirty="0" smtClean="0"/>
+              <a:t>What else is there</a:t>
+            </a:r>
+            <a:r>
+              <a:rPr lang="en-US" baseline="0" dirty="0" smtClean="0"/>
+              <a:t> to this?</a:t>
+            </a:r>
+            <a:endParaRPr lang="en-US" dirty="0"/>
+          </a:p>
+        </p:txBody>
+      </p:sp>
+      <p:sp>
+        <p:nvSpPr>
+          <p:cNvPr id="4" name="Slide Number Placeholder 3"/>
+          <p:cNvSpPr>
+            <a:spLocks noGrp="1"/>
+          </p:cNvSpPr>
+          <p:nvPr>
+            <p:ph type="sldNum" sz="quarter" idx="10"/>
+          </p:nvPr>
+        </p:nvSpPr>
+        <p:spPr/>
+        <p:txBody>
+          <a:bodyPr/>
+          <a:lstStyle/>
+          <a:p>
+            <a:fld id="{7C2ACA1A-54EA-4124-A07F-903EDF5822AB}" type="slidenum">
+              <a:rPr lang="en-US" smtClean="0"/>
+              <a:t>3</a:t>
+            </a:fld>
+            <a:endParaRPr lang="en-US"/>
+          </a:p>
+        </p:txBody>
+      </p:sp>
+    </p:spTree>
+    <p:extLst>
+      <p:ext uri="{BB962C8B-B14F-4D97-AF65-F5344CB8AC3E}">
+        <p14:creationId xmlns:p14="http://schemas.microsoft.com/office/powerpoint/2010/main" val="2183716062"/>
+      </p:ext>
+    </p:extLst>
+  </p:cSld>
+  <p:clrMapOvr>
+    <a:masterClrMapping/>
+  </p:clrMapOvr>
+</p:notes>
+</file>
+
+<file path=ppt/notesSlides/notesSlide2.xml><?xml version="1.0" encoding="utf-8"?>
+<p:notes xmlns:a="http://schemas.openxmlformats.org/drawingml/2006/main" xmlns:r="http://schemas.openxmlformats.org/officeDocument/2006/relationships" xmlns:p="http://schemas.openxmlformats.org/presentationml/2006/main">
+  <p:cSld>
+    <p:spTree>
+      <p:nvGrpSpPr>
+        <p:cNvPr id="1" name=""/>
+        <p:cNvGrpSpPr/>
+        <p:nvPr/>
+      </p:nvGrpSpPr>
+      <p:grpSpPr>
+        <a:xfrm>
+          <a:off x="0" y="0"/>
+          <a:ext cx="0" cy="0"/>
+          <a:chOff x="0" y="0"/>
+          <a:chExt cx="0" cy="0"/>
+        </a:xfrm>
+      </p:grpSpPr>
+      <p:sp>
+        <p:nvSpPr>
+          <p:cNvPr id="2" name="Slide Image Placeholder 1"/>
+          <p:cNvSpPr>
+            <a:spLocks noGrp="1" noRot="1" noChangeAspect="1"/>
+          </p:cNvSpPr>
+          <p:nvPr>
+            <p:ph type="sldImg"/>
+          </p:nvPr>
+        </p:nvSpPr>
+        <p:spPr/>
+      </p:sp>
+      <p:sp>
+        <p:nvSpPr>
+          <p:cNvPr id="3" name="Notes Placeholder 2"/>
+          <p:cNvSpPr>
+            <a:spLocks noGrp="1"/>
+          </p:cNvSpPr>
+          <p:nvPr>
+            <p:ph type="body" idx="1"/>
+          </p:nvPr>
+        </p:nvSpPr>
+        <p:spPr/>
+        <p:txBody>
+          <a:bodyPr/>
+          <a:lstStyle/>
+          <a:p>
+            <a:r>
+              <a:rPr lang="en-US" dirty="0" smtClean="0"/>
+              <a:t>Schema, tables, ER?</a:t>
+            </a:r>
+            <a:endParaRPr lang="en-US" dirty="0"/>
+          </a:p>
+        </p:txBody>
+      </p:sp>
+      <p:sp>
+        <p:nvSpPr>
+          <p:cNvPr id="4" name="Slide Number Placeholder 3"/>
+          <p:cNvSpPr>
+            <a:spLocks noGrp="1"/>
+          </p:cNvSpPr>
+          <p:nvPr>
+            <p:ph type="sldNum" sz="quarter" idx="10"/>
+          </p:nvPr>
+        </p:nvSpPr>
+        <p:spPr/>
+        <p:txBody>
+          <a:bodyPr/>
+          <a:lstStyle/>
+          <a:p>
+            <a:fld id="{7C2ACA1A-54EA-4124-A07F-903EDF5822AB}" type="slidenum">
+              <a:rPr lang="en-US" smtClean="0"/>
+              <a:t>4</a:t>
+            </a:fld>
+            <a:endParaRPr lang="en-US"/>
+          </a:p>
+        </p:txBody>
+      </p:sp>
+    </p:spTree>
+    <p:extLst>
+      <p:ext uri="{BB962C8B-B14F-4D97-AF65-F5344CB8AC3E}">
+        <p14:creationId xmlns:p14="http://schemas.microsoft.com/office/powerpoint/2010/main" val="2451156484"/>
+      </p:ext>
+    </p:extLst>
+  </p:cSld>
+  <p:clrMapOvr>
+    <a:masterClrMapping/>
+  </p:clrMapOvr>
+</p:notes>
+</file>
+
+<file path=ppt/notesSlides/notesSlide3.xml><?xml version="1.0" encoding="utf-8"?>
+<p:notes xmlns:a="http://schemas.openxmlformats.org/drawingml/2006/main" xmlns:r="http://schemas.openxmlformats.org/officeDocument/2006/relationships" xmlns:p="http://schemas.openxmlformats.org/presentationml/2006/main">
+  <p:cSld>
+    <p:spTree>
+      <p:nvGrpSpPr>
+        <p:cNvPr id="1" name=""/>
+        <p:cNvGrpSpPr/>
+        <p:nvPr/>
+      </p:nvGrpSpPr>
+      <p:grpSpPr>
+        <a:xfrm>
+          <a:off x="0" y="0"/>
+          <a:ext cx="0" cy="0"/>
+          <a:chOff x="0" y="0"/>
+          <a:chExt cx="0" cy="0"/>
+        </a:xfrm>
+      </p:grpSpPr>
+      <p:sp>
+        <p:nvSpPr>
+          <p:cNvPr id="2" name="Slide Image Placeholder 1"/>
+          <p:cNvSpPr>
+            <a:spLocks noGrp="1" noRot="1" noChangeAspect="1"/>
+          </p:cNvSpPr>
+          <p:nvPr>
+            <p:ph type="sldImg"/>
+          </p:nvPr>
+        </p:nvSpPr>
+        <p:spPr/>
+      </p:sp>
+      <p:sp>
+        <p:nvSpPr>
+          <p:cNvPr id="3" name="Notes Placeholder 2"/>
+          <p:cNvSpPr>
+            <a:spLocks noGrp="1"/>
+          </p:cNvSpPr>
+          <p:nvPr>
+            <p:ph type="body" idx="1"/>
+          </p:nvPr>
+        </p:nvSpPr>
+        <p:spPr/>
+        <p:txBody>
+          <a:bodyPr/>
+          <a:lstStyle/>
+          <a:p>
+            <a:r>
+              <a:rPr lang="en-US" dirty="0" smtClean="0"/>
+              <a:t>1) How</a:t>
+            </a:r>
+            <a:r>
+              <a:rPr lang="en-US" baseline="0" dirty="0" smtClean="0"/>
+              <a:t> do you verify a </a:t>
+            </a:r>
+            <a:r>
+              <a:rPr lang="en-US" baseline="0" dirty="0" err="1" smtClean="0"/>
+              <a:t>sproc</a:t>
+            </a:r>
+            <a:r>
+              <a:rPr lang="en-US" baseline="0" dirty="0" smtClean="0"/>
+              <a:t> that is supposed to affect a row of data, but returns nothing</a:t>
+            </a:r>
+            <a:endParaRPr lang="en-US" dirty="0" smtClean="0"/>
+          </a:p>
+          <a:p>
+            <a:r>
+              <a:rPr lang="en-US" dirty="0" smtClean="0"/>
+              <a:t>2) C#</a:t>
+            </a:r>
+            <a:r>
+              <a:rPr lang="en-US" baseline="0" dirty="0" smtClean="0"/>
+              <a:t> has some peculiarities in terms of handling </a:t>
+            </a:r>
+            <a:r>
+              <a:rPr lang="en-US" baseline="0" dirty="0" err="1" smtClean="0"/>
+              <a:t>sprocs</a:t>
+            </a:r>
+            <a:endParaRPr lang="en-US" baseline="0" dirty="0" smtClean="0"/>
+          </a:p>
+          <a:p>
+            <a:r>
+              <a:rPr lang="en-US" baseline="0" dirty="0" smtClean="0"/>
+              <a:t>3) Making sure that the final product is not susceptible to SQL injections, and that data is stored securely</a:t>
+            </a:r>
+            <a:endParaRPr lang="en-US" dirty="0"/>
+          </a:p>
+        </p:txBody>
+      </p:sp>
+      <p:sp>
+        <p:nvSpPr>
+          <p:cNvPr id="4" name="Slide Number Placeholder 3"/>
+          <p:cNvSpPr>
+            <a:spLocks noGrp="1"/>
+          </p:cNvSpPr>
+          <p:nvPr>
+            <p:ph type="sldNum" sz="quarter" idx="10"/>
+          </p:nvPr>
+        </p:nvSpPr>
+        <p:spPr/>
+        <p:txBody>
+          <a:bodyPr/>
+          <a:lstStyle/>
+          <a:p>
+            <a:fld id="{7C2ACA1A-54EA-4124-A07F-903EDF5822AB}" type="slidenum">
+              <a:rPr lang="en-US" smtClean="0"/>
+              <a:t>5</a:t>
+            </a:fld>
+            <a:endParaRPr lang="en-US"/>
+          </a:p>
+        </p:txBody>
+      </p:sp>
+    </p:spTree>
+    <p:extLst>
+      <p:ext uri="{BB962C8B-B14F-4D97-AF65-F5344CB8AC3E}">
+        <p14:creationId xmlns:p14="http://schemas.microsoft.com/office/powerpoint/2010/main" val="2950522331"/>
+      </p:ext>
+    </p:extLst>
+  </p:cSld>
+  <p:clrMapOvr>
+    <a:masterClrMapping/>
+  </p:clrMapOvr>
+</p:notes>
+</file>
+
+<file path=ppt/notesSlides/notesSlide4.xml><?xml version="1.0" encoding="utf-8"?>
+<p:notes xmlns:a="http://schemas.openxmlformats.org/drawingml/2006/main" xmlns:r="http://schemas.openxmlformats.org/officeDocument/2006/relationships" xmlns:p="http://schemas.openxmlformats.org/presentationml/2006/main">
+  <p:cSld>
+    <p:spTree>
+      <p:nvGrpSpPr>
+        <p:cNvPr id="1" name=""/>
+        <p:cNvGrpSpPr/>
+        <p:nvPr/>
+      </p:nvGrpSpPr>
+      <p:grpSpPr>
+        <a:xfrm>
+          <a:off x="0" y="0"/>
+          <a:ext cx="0" cy="0"/>
+          <a:chOff x="0" y="0"/>
+          <a:chExt cx="0" cy="0"/>
+        </a:xfrm>
+      </p:grpSpPr>
+      <p:sp>
+        <p:nvSpPr>
+          <p:cNvPr id="2" name="Slide Image Placeholder 1"/>
+          <p:cNvSpPr>
+            <a:spLocks noGrp="1" noRot="1" noChangeAspect="1"/>
+          </p:cNvSpPr>
+          <p:nvPr>
+            <p:ph type="sldImg"/>
+          </p:nvPr>
+        </p:nvSpPr>
+        <p:spPr/>
+      </p:sp>
+      <p:sp>
+        <p:nvSpPr>
+          <p:cNvPr id="3" name="Notes Placeholder 2"/>
+          <p:cNvSpPr>
+            <a:spLocks noGrp="1"/>
+          </p:cNvSpPr>
+          <p:nvPr>
+            <p:ph type="body" idx="1"/>
+          </p:nvPr>
+        </p:nvSpPr>
+        <p:spPr/>
+        <p:txBody>
+          <a:bodyPr/>
+          <a:lstStyle/>
+          <a:p>
+            <a:pPr marL="228600" indent="-228600">
+              <a:buAutoNum type="arabicParenR"/>
+            </a:pPr>
+            <a:r>
+              <a:rPr lang="en-US" dirty="0" smtClean="0"/>
+              <a:t>Makes all the difference, can find tutorials and examples aplenty from</a:t>
+            </a:r>
+            <a:r>
+              <a:rPr lang="en-US" baseline="0" dirty="0" smtClean="0"/>
+              <a:t> handling SQL to security</a:t>
+            </a:r>
+          </a:p>
+          <a:p>
+            <a:pPr marL="228600" indent="-228600">
+              <a:buAutoNum type="arabicParenR"/>
+            </a:pPr>
+            <a:r>
+              <a:rPr lang="en-US" baseline="0" dirty="0" smtClean="0"/>
+              <a:t>Concerning </a:t>
+            </a:r>
+            <a:r>
+              <a:rPr lang="en-US" b="1" baseline="0" dirty="0" smtClean="0"/>
+              <a:t>the final point</a:t>
+            </a:r>
+            <a:r>
+              <a:rPr lang="en-US" baseline="0" dirty="0" smtClean="0"/>
+              <a:t>, we had an issue trying to verify games.  How do we ensure honesty and efficiency?  In the real world, leaderboards are handled by the game’s console sending the data directly so that there is no question of honesty and efficiency is optimal</a:t>
+            </a:r>
+            <a:endParaRPr lang="en-US" dirty="0" smtClean="0"/>
+          </a:p>
+          <a:p>
+            <a:pPr marL="228600" indent="-228600">
+              <a:buAutoNum type="arabicParenR"/>
+            </a:pPr>
+            <a:endParaRPr lang="en-US" dirty="0"/>
+          </a:p>
+        </p:txBody>
+      </p:sp>
+      <p:sp>
+        <p:nvSpPr>
+          <p:cNvPr id="4" name="Slide Number Placeholder 3"/>
+          <p:cNvSpPr>
+            <a:spLocks noGrp="1"/>
+          </p:cNvSpPr>
+          <p:nvPr>
+            <p:ph type="sldNum" sz="quarter" idx="10"/>
+          </p:nvPr>
+        </p:nvSpPr>
+        <p:spPr/>
+        <p:txBody>
+          <a:bodyPr/>
+          <a:lstStyle/>
+          <a:p>
+            <a:fld id="{7C2ACA1A-54EA-4124-A07F-903EDF5822AB}" type="slidenum">
+              <a:rPr lang="en-US" smtClean="0"/>
+              <a:t>6</a:t>
+            </a:fld>
+            <a:endParaRPr lang="en-US"/>
+          </a:p>
+        </p:txBody>
+      </p:sp>
+    </p:spTree>
+    <p:extLst>
+      <p:ext uri="{BB962C8B-B14F-4D97-AF65-F5344CB8AC3E}">
+        <p14:creationId xmlns:p14="http://schemas.microsoft.com/office/powerpoint/2010/main" val="4182557960"/>
+      </p:ext>
+    </p:extLst>
+  </p:cSld>
+  <p:clrMapOvr>
+    <a:masterClrMapping/>
+  </p:clrMapOvr>
+</p:notes>
+</file>
+
 <file path=ppt/slideLayouts/slideLayout1.xml><?xml version="1.0" encoding="utf-8"?>
 <p:sldLayout xmlns:a="http://schemas.openxmlformats.org/drawingml/2006/main" xmlns:r="http://schemas.openxmlformats.org/officeDocument/2006/relationships" xmlns:p="http://schemas.openxmlformats.org/presentationml/2006/main" type="title" preserve="1">
   <p:cSld name="Title Slide">
@@ -293,7 +1067,7 @@
           <a:p>
             <a:fld id="{C7CC37B0-632C-4020-A6AC-E4347642F710}" type="datetimeFigureOut">
               <a:rPr lang="en-US" smtClean="0"/>
-              <a:t>2/12/2012</a:t>
+              <a:t>2/13/2012</a:t>
             </a:fld>
             <a:endParaRPr lang="en-US"/>
           </a:p>
@@ -463,7 +1237,7 @@
           <a:p>
             <a:fld id="{C7CC37B0-632C-4020-A6AC-E4347642F710}" type="datetimeFigureOut">
               <a:rPr lang="en-US" smtClean="0"/>
-              <a:t>2/12/2012</a:t>
+              <a:t>2/13/2012</a:t>
             </a:fld>
             <a:endParaRPr lang="en-US"/>
           </a:p>
@@ -643,7 +1417,7 @@
           <a:p>
             <a:fld id="{C7CC37B0-632C-4020-A6AC-E4347642F710}" type="datetimeFigureOut">
               <a:rPr lang="en-US" smtClean="0"/>
-              <a:t>2/12/2012</a:t>
+              <a:t>2/13/2012</a:t>
             </a:fld>
             <a:endParaRPr lang="en-US"/>
           </a:p>
@@ -813,7 +1587,7 @@
           <a:p>
             <a:fld id="{C7CC37B0-632C-4020-A6AC-E4347642F710}" type="datetimeFigureOut">
               <a:rPr lang="en-US" smtClean="0"/>
-              <a:t>2/12/2012</a:t>
+              <a:t>2/13/2012</a:t>
             </a:fld>
             <a:endParaRPr lang="en-US"/>
           </a:p>
@@ -1059,7 +1833,7 @@
           <a:p>
             <a:fld id="{C7CC37B0-632C-4020-A6AC-E4347642F710}" type="datetimeFigureOut">
               <a:rPr lang="en-US" smtClean="0"/>
-              <a:t>2/12/2012</a:t>
+              <a:t>2/13/2012</a:t>
             </a:fld>
             <a:endParaRPr lang="en-US"/>
           </a:p>
@@ -1347,7 +2121,7 @@
           <a:p>
             <a:fld id="{C7CC37B0-632C-4020-A6AC-E4347642F710}" type="datetimeFigureOut">
               <a:rPr lang="en-US" smtClean="0"/>
-              <a:t>2/12/2012</a:t>
+              <a:t>2/13/2012</a:t>
             </a:fld>
             <a:endParaRPr lang="en-US"/>
           </a:p>
@@ -1769,7 +2543,7 @@
           <a:p>
             <a:fld id="{C7CC37B0-632C-4020-A6AC-E4347642F710}" type="datetimeFigureOut">
               <a:rPr lang="en-US" smtClean="0"/>
-              <a:t>2/12/2012</a:t>
+              <a:t>2/13/2012</a:t>
             </a:fld>
             <a:endParaRPr lang="en-US"/>
           </a:p>
@@ -1887,7 +2661,7 @@
           <a:p>
             <a:fld id="{C7CC37B0-632C-4020-A6AC-E4347642F710}" type="datetimeFigureOut">
               <a:rPr lang="en-US" smtClean="0"/>
-              <a:t>2/12/2012</a:t>
+              <a:t>2/13/2012</a:t>
             </a:fld>
             <a:endParaRPr lang="en-US"/>
           </a:p>
@@ -1982,7 +2756,7 @@
           <a:p>
             <a:fld id="{C7CC37B0-632C-4020-A6AC-E4347642F710}" type="datetimeFigureOut">
               <a:rPr lang="en-US" smtClean="0"/>
-              <a:t>2/12/2012</a:t>
+              <a:t>2/13/2012</a:t>
             </a:fld>
             <a:endParaRPr lang="en-US"/>
           </a:p>
@@ -2259,7 +3033,7 @@
           <a:p>
             <a:fld id="{C7CC37B0-632C-4020-A6AC-E4347642F710}" type="datetimeFigureOut">
               <a:rPr lang="en-US" smtClean="0"/>
-              <a:t>2/12/2012</a:t>
+              <a:t>2/13/2012</a:t>
             </a:fld>
             <a:endParaRPr lang="en-US"/>
           </a:p>
@@ -2512,7 +3286,7 @@
           <a:p>
             <a:fld id="{C7CC37B0-632C-4020-A6AC-E4347642F710}" type="datetimeFigureOut">
               <a:rPr lang="en-US" smtClean="0"/>
-              <a:t>2/12/2012</a:t>
+              <a:t>2/13/2012</a:t>
             </a:fld>
             <a:endParaRPr lang="en-US"/>
           </a:p>
@@ -2725,7 +3499,7 @@
           <a:p>
             <a:fld id="{C7CC37B0-632C-4020-A6AC-E4347642F710}" type="datetimeFigureOut">
               <a:rPr lang="en-US" smtClean="0"/>
-              <a:t>2/12/2012</a:t>
+              <a:t>2/13/2012</a:t>
             </a:fld>
             <a:endParaRPr lang="en-US"/>
           </a:p>
@@ -3219,7 +3993,37 @@
             </a:pPr>
             <a:r>
               <a:rPr lang="en-US" dirty="0" smtClean="0"/>
-              <a:t>description</a:t>
+              <a:t>One of Nintendo’s greatest title franchises lacks a few key features:</a:t>
+            </a:r>
+          </a:p>
+          <a:p>
+            <a:pPr>
+              <a:buFontTx/>
+              <a:buChar char="-"/>
+            </a:pPr>
+            <a:r>
+              <a:rPr lang="en-US" dirty="0" smtClean="0"/>
+              <a:t>Centralized leaderboards</a:t>
+            </a:r>
+          </a:p>
+          <a:p>
+            <a:pPr>
+              <a:buFontTx/>
+              <a:buChar char="-"/>
+            </a:pPr>
+            <a:r>
+              <a:rPr lang="en-US" dirty="0" smtClean="0"/>
+              <a:t>Social networking</a:t>
+            </a:r>
+          </a:p>
+          <a:p>
+            <a:pPr>
+              <a:buFontTx/>
+              <a:buChar char="-"/>
+            </a:pPr>
+            <a:r>
+              <a:rPr lang="en-US" dirty="0" smtClean="0"/>
+              <a:t>Consistent game information</a:t>
             </a:r>
             <a:endParaRPr lang="en-US" dirty="0"/>
           </a:p>
@@ -3298,7 +4102,7 @@
             </a:pPr>
             <a:r>
               <a:rPr lang="en-US" dirty="0" smtClean="0"/>
-              <a:t>description</a:t>
+              <a:t>SSBB Management System</a:t>
             </a:r>
             <a:endParaRPr lang="en-US" dirty="0"/>
           </a:p>
@@ -3377,7 +4181,11 @@
             </a:pPr>
             <a:r>
               <a:rPr lang="en-US" dirty="0" smtClean="0"/>
-              <a:t>foo</a:t>
+              <a:t>Ask </a:t>
+            </a:r>
+            <a:r>
+              <a:rPr lang="en-US" dirty="0" err="1" smtClean="0"/>
+              <a:t>nadine</a:t>
             </a:r>
             <a:endParaRPr lang="en-US" dirty="0"/>
           </a:p>
@@ -3430,7 +4238,7 @@
           <a:p>
             <a:r>
               <a:rPr lang="en-US" dirty="0" smtClean="0"/>
-              <a:t>challenges + lessons learned</a:t>
+              <a:t>challenges</a:t>
             </a:r>
             <a:endParaRPr lang="en-US" dirty="0"/>
           </a:p>
@@ -3451,9 +4259,26 @@
           <a:bodyPr/>
           <a:lstStyle/>
           <a:p>
-            <a:pPr marL="0" indent="0">
-              <a:buNone/>
-            </a:pPr>
+            <a:r>
+              <a:rPr lang="en-US" dirty="0"/>
+              <a:t>s</a:t>
+            </a:r>
+            <a:r>
+              <a:rPr lang="en-US" dirty="0" smtClean="0"/>
+              <a:t>tored procedures without a return value</a:t>
+            </a:r>
+          </a:p>
+          <a:p>
+            <a:r>
+              <a:rPr lang="en-US" dirty="0" smtClean="0"/>
+              <a:t>C# language tics</a:t>
+            </a:r>
+          </a:p>
+          <a:p>
+            <a:r>
+              <a:rPr lang="en-US" dirty="0" smtClean="0"/>
+              <a:t>security</a:t>
+            </a:r>
             <a:endParaRPr lang="en-US" dirty="0"/>
           </a:p>
         </p:txBody>
@@ -3461,7 +4286,7 @@
     </p:spTree>
     <p:extLst>
       <p:ext uri="{BB962C8B-B14F-4D97-AF65-F5344CB8AC3E}">
-        <p14:creationId xmlns:p14="http://schemas.microsoft.com/office/powerpoint/2010/main" val="4106355352"/>
+        <p14:creationId xmlns:p14="http://schemas.microsoft.com/office/powerpoint/2010/main" val="3870651819"/>
       </p:ext>
     </p:extLst>
   </p:cSld>
@@ -3472,6 +4297,100 @@
 </file>
 
 <file path=ppt/slides/slide6.xml><?xml version="1.0" encoding="utf-8"?>
+<p:sld xmlns:a="http://schemas.openxmlformats.org/drawingml/2006/main" xmlns:r="http://schemas.openxmlformats.org/officeDocument/2006/relationships" xmlns:p="http://schemas.openxmlformats.org/presentationml/2006/main">
+  <p:cSld>
+    <p:spTree>
+      <p:nvGrpSpPr>
+        <p:cNvPr id="1" name=""/>
+        <p:cNvGrpSpPr/>
+        <p:nvPr/>
+      </p:nvGrpSpPr>
+      <p:grpSpPr>
+        <a:xfrm>
+          <a:off x="0" y="0"/>
+          <a:ext cx="0" cy="0"/>
+          <a:chOff x="0" y="0"/>
+          <a:chExt cx="0" cy="0"/>
+        </a:xfrm>
+      </p:grpSpPr>
+      <p:sp>
+        <p:nvSpPr>
+          <p:cNvPr id="2" name="Title 1"/>
+          <p:cNvSpPr>
+            <a:spLocks noGrp="1"/>
+          </p:cNvSpPr>
+          <p:nvPr>
+            <p:ph type="title"/>
+          </p:nvPr>
+        </p:nvSpPr>
+        <p:spPr/>
+        <p:txBody>
+          <a:bodyPr/>
+          <a:lstStyle/>
+          <a:p>
+            <a:r>
+              <a:rPr lang="en-US" dirty="0" smtClean="0"/>
+              <a:t>lessons learned</a:t>
+            </a:r>
+            <a:endParaRPr lang="en-US" dirty="0"/>
+          </a:p>
+        </p:txBody>
+      </p:sp>
+      <p:sp>
+        <p:nvSpPr>
+          <p:cNvPr id="3" name="Content Placeholder 2"/>
+          <p:cNvSpPr>
+            <a:spLocks noGrp="1"/>
+          </p:cNvSpPr>
+          <p:nvPr>
+            <p:ph idx="1"/>
+          </p:nvPr>
+        </p:nvSpPr>
+        <p:spPr/>
+        <p:txBody>
+          <a:bodyPr/>
+          <a:lstStyle/>
+          <a:p>
+            <a:r>
+              <a:rPr lang="en-US" dirty="0" smtClean="0"/>
+              <a:t>choosing a well-documented language</a:t>
+            </a:r>
+          </a:p>
+          <a:p>
+            <a:r>
+              <a:rPr lang="en-US" dirty="0" smtClean="0"/>
+              <a:t>visual studio is excellent for working with GUI applications</a:t>
+            </a:r>
+          </a:p>
+          <a:p>
+            <a:r>
+              <a:rPr lang="en-US" dirty="0" smtClean="0"/>
+              <a:t>SQL and C# work together seamlessly</a:t>
+            </a:r>
+          </a:p>
+          <a:p>
+            <a:r>
+              <a:rPr lang="en-US" dirty="0" smtClean="0"/>
+              <a:t>not all calls can, nor should, be handled by your application</a:t>
+            </a:r>
+            <a:endParaRPr lang="en-US" dirty="0"/>
+          </a:p>
+        </p:txBody>
+      </p:sp>
+    </p:spTree>
+    <p:extLst>
+      <p:ext uri="{BB962C8B-B14F-4D97-AF65-F5344CB8AC3E}">
+        <p14:creationId xmlns:p14="http://schemas.microsoft.com/office/powerpoint/2010/main" val="1407803486"/>
+      </p:ext>
+    </p:extLst>
+  </p:cSld>
+  <p:clrMapOvr>
+    <a:masterClrMapping/>
+  </p:clrMapOvr>
+</p:sld>
+</file>
+
+<file path=ppt/slides/slide7.xml><?xml version="1.0" encoding="utf-8"?>
 <p:sld xmlns:a="http://schemas.openxmlformats.org/drawingml/2006/main" xmlns:r="http://schemas.openxmlformats.org/officeDocument/2006/relationships" xmlns:p="http://schemas.openxmlformats.org/presentationml/2006/main">
   <p:cSld>
     <p:spTree>
@@ -3812,4 +4731,289 @@
   <a:objectDefaults/>
   <a:extraClrSchemeLst/>
 </a:theme>
+</file>
+
+<file path=ppt/theme/theme2.xml><?xml version="1.0" encoding="utf-8"?>
+<a:theme xmlns:a="http://schemas.openxmlformats.org/drawingml/2006/main" name="Office Theme">
+  <a:themeElements>
+    <a:clrScheme name="Office">
+      <a:dk1>
+        <a:sysClr val="windowText" lastClr="000000"/>
+      </a:dk1>
+      <a:lt1>
+        <a:sysClr val="window" lastClr="FFFFFF"/>
+      </a:lt1>
+      <a:dk2>
+        <a:srgbClr val="1F497D"/>
+      </a:dk2>
+      <a:lt2>
+        <a:srgbClr val="EEECE1"/>
+      </a:lt2>
+      <a:accent1>
+        <a:srgbClr val="4F81BD"/>
+      </a:accent1>
+      <a:accent2>
+        <a:srgbClr val="C0504D"/>
+      </a:accent2>
+      <a:accent3>
+        <a:srgbClr val="9BBB59"/>
+      </a:accent3>
+      <a:accent4>
+        <a:srgbClr val="8064A2"/>
+      </a:accent4>
+      <a:accent5>
+        <a:srgbClr val="4BACC6"/>
+      </a:accent5>
+      <a:accent6>
+        <a:srgbClr val="F79646"/>
+      </a:accent6>
+      <a:hlink>
+        <a:srgbClr val="0000FF"/>
+      </a:hlink>
+      <a:folHlink>
+        <a:srgbClr val="800080"/>
+      </a:folHlink>
+    </a:clrScheme>
+    <a:fontScheme name="Office">
+      <a:majorFont>
+        <a:latin typeface="Calibri"/>
+        <a:ea typeface=""/>
+        <a:cs typeface=""/>
+        <a:font script="Jpan" typeface="ＭＳ Ｐゴシック"/>
+        <a:font script="Hang" typeface="맑은 고딕"/>
+        <a:font script="Hans" typeface="宋体"/>
+        <a:font script="Hant" typeface="新細明體"/>
+        <a:font script="Arab" typeface="Times New Roman"/>
+        <a:font script="Hebr" typeface="Times New Roman"/>
+        <a:font script="Thai" typeface="Angsana New"/>
+        <a:font script="Ethi" typeface="Nyala"/>
+        <a:font script="Beng" typeface="Vrinda"/>
+        <a:font script="Gujr" typeface="Shruti"/>
+        <a:font script="Khmr" typeface="MoolBoran"/>
+        <a:font script="Knda" typeface="Tunga"/>
+        <a:font script="Guru" typeface="Raavi"/>
+        <a:font script="Cans" typeface="Euphemia"/>
+        <a:font script="Cher" typeface="Plantagenet Cherokee"/>
+        <a:font script="Yiii" typeface="Microsoft Yi Baiti"/>
+        <a:font script="Tibt" typeface="Microsoft Himalaya"/>
+        <a:font script="Thaa" typeface="MV Boli"/>
+        <a:font script="Deva" typeface="Mangal"/>
+        <a:font script="Telu" typeface="Gautami"/>
+        <a:font script="Taml" typeface="Latha"/>
+        <a:font script="Syrc" typeface="Estrangelo Edessa"/>
+        <a:font script="Orya" typeface="Kalinga"/>
+        <a:font script="Mlym" typeface="Kartika"/>
+        <a:font script="Laoo" typeface="DokChampa"/>
+        <a:font script="Sinh" typeface="Iskoola Pota"/>
+        <a:font script="Mong" typeface="Mongolian Baiti"/>
+        <a:font script="Viet" typeface="Times New Roman"/>
+        <a:font script="Uigh" typeface="Microsoft Uighur"/>
+        <a:font script="Geor" typeface="Sylfaen"/>
+      </a:majorFont>
+      <a:minorFont>
+        <a:latin typeface="Calibri"/>
+        <a:ea typeface=""/>
+        <a:cs typeface=""/>
+        <a:font script="Jpan" typeface="ＭＳ Ｐゴシック"/>
+        <a:font script="Hang" typeface="맑은 고딕"/>
+        <a:font script="Hans" typeface="宋体"/>
+        <a:font script="Hant" typeface="新細明體"/>
+        <a:font script="Arab" typeface="Arial"/>
+        <a:font script="Hebr" typeface="Arial"/>
+        <a:font script="Thai" typeface="Cordia New"/>
+        <a:font script="Ethi" typeface="Nyala"/>
+        <a:font script="Beng" typeface="Vrinda"/>
+        <a:font script="Gujr" typeface="Shruti"/>
+        <a:font script="Khmr" typeface="DaunPenh"/>
+        <a:font script="Knda" typeface="Tunga"/>
+        <a:font script="Guru" typeface="Raavi"/>
+        <a:font script="Cans" typeface="Euphemia"/>
+        <a:font script="Cher" typeface="Plantagenet Cherokee"/>
+        <a:font script="Yiii" typeface="Microsoft Yi Baiti"/>
+        <a:font script="Tibt" typeface="Microsoft Himalaya"/>
+        <a:font script="Thaa" typeface="MV Boli"/>
+        <a:font script="Deva" typeface="Mangal"/>
+        <a:font script="Telu" typeface="Gautami"/>
+        <a:font script="Taml" typeface="Latha"/>
+        <a:font script="Syrc" typeface="Estrangelo Edessa"/>
+        <a:font script="Orya" typeface="Kalinga"/>
+        <a:font script="Mlym" typeface="Kartika"/>
+        <a:font script="Laoo" typeface="DokChampa"/>
+        <a:font script="Sinh" typeface="Iskoola Pota"/>
+        <a:font script="Mong" typeface="Mongolian Baiti"/>
+        <a:font script="Viet" typeface="Arial"/>
+        <a:font script="Uigh" typeface="Microsoft Uighur"/>
+        <a:font script="Geor" typeface="Sylfaen"/>
+      </a:minorFont>
+    </a:fontScheme>
+    <a:fmtScheme name="Office">
+      <a:fillStyleLst>
+        <a:solidFill>
+          <a:schemeClr val="phClr"/>
+        </a:solidFill>
+        <a:gradFill rotWithShape="1">
+          <a:gsLst>
+            <a:gs pos="0">
+              <a:schemeClr val="phClr">
+                <a:tint val="50000"/>
+                <a:satMod val="300000"/>
+              </a:schemeClr>
+            </a:gs>
+            <a:gs pos="35000">
+              <a:schemeClr val="phClr">
+                <a:tint val="37000"/>
+                <a:satMod val="300000"/>
+              </a:schemeClr>
+            </a:gs>
+            <a:gs pos="100000">
+              <a:schemeClr val="phClr">
+                <a:tint val="15000"/>
+                <a:satMod val="350000"/>
+              </a:schemeClr>
+            </a:gs>
+          </a:gsLst>
+          <a:lin ang="16200000" scaled="1"/>
+        </a:gradFill>
+        <a:gradFill rotWithShape="1">
+          <a:gsLst>
+            <a:gs pos="0">
+              <a:schemeClr val="phClr">
+                <a:shade val="51000"/>
+                <a:satMod val="130000"/>
+              </a:schemeClr>
+            </a:gs>
+            <a:gs pos="80000">
+              <a:schemeClr val="phClr">
+                <a:shade val="93000"/>
+                <a:satMod val="130000"/>
+              </a:schemeClr>
+            </a:gs>
+            <a:gs pos="100000">
+              <a:schemeClr val="phClr">
+                <a:shade val="94000"/>
+                <a:satMod val="135000"/>
+              </a:schemeClr>
+            </a:gs>
+          </a:gsLst>
+          <a:lin ang="16200000" scaled="0"/>
+        </a:gradFill>
+      </a:fillStyleLst>
+      <a:lnStyleLst>
+        <a:ln w="9525" cap="flat" cmpd="sng" algn="ctr">
+          <a:solidFill>
+            <a:schemeClr val="phClr">
+              <a:shade val="95000"/>
+              <a:satMod val="105000"/>
+            </a:schemeClr>
+          </a:solidFill>
+          <a:prstDash val="solid"/>
+        </a:ln>
+        <a:ln w="25400" cap="flat" cmpd="sng" algn="ctr">
+          <a:solidFill>
+            <a:schemeClr val="phClr"/>
+          </a:solidFill>
+          <a:prstDash val="solid"/>
+        </a:ln>
+        <a:ln w="38100" cap="flat" cmpd="sng" algn="ctr">
+          <a:solidFill>
+            <a:schemeClr val="phClr"/>
+          </a:solidFill>
+          <a:prstDash val="solid"/>
+        </a:ln>
+      </a:lnStyleLst>
+      <a:effectStyleLst>
+        <a:effectStyle>
+          <a:effectLst>
+            <a:outerShdw blurRad="40000" dist="20000" dir="5400000" rotWithShape="0">
+              <a:srgbClr val="000000">
+                <a:alpha val="38000"/>
+              </a:srgbClr>
+            </a:outerShdw>
+          </a:effectLst>
+        </a:effectStyle>
+        <a:effectStyle>
+          <a:effectLst>
+            <a:outerShdw blurRad="40000" dist="23000" dir="5400000" rotWithShape="0">
+              <a:srgbClr val="000000">
+                <a:alpha val="35000"/>
+              </a:srgbClr>
+            </a:outerShdw>
+          </a:effectLst>
+        </a:effectStyle>
+        <a:effectStyle>
+          <a:effectLst>
+            <a:outerShdw blurRad="40000" dist="23000" dir="5400000" rotWithShape="0">
+              <a:srgbClr val="000000">
+                <a:alpha val="35000"/>
+              </a:srgbClr>
+            </a:outerShdw>
+          </a:effectLst>
+          <a:scene3d>
+            <a:camera prst="orthographicFront">
+              <a:rot lat="0" lon="0" rev="0"/>
+            </a:camera>
+            <a:lightRig rig="threePt" dir="t">
+              <a:rot lat="0" lon="0" rev="1200000"/>
+            </a:lightRig>
+          </a:scene3d>
+          <a:sp3d>
+            <a:bevelT w="63500" h="25400"/>
+          </a:sp3d>
+        </a:effectStyle>
+      </a:effectStyleLst>
+      <a:bgFillStyleLst>
+        <a:solidFill>
+          <a:schemeClr val="phClr"/>
+        </a:solidFill>
+        <a:gradFill rotWithShape="1">
+          <a:gsLst>
+            <a:gs pos="0">
+              <a:schemeClr val="phClr">
+                <a:tint val="40000"/>
+                <a:satMod val="350000"/>
+              </a:schemeClr>
+            </a:gs>
+            <a:gs pos="40000">
+              <a:schemeClr val="phClr">
+                <a:tint val="45000"/>
+                <a:shade val="99000"/>
+                <a:satMod val="350000"/>
+              </a:schemeClr>
+            </a:gs>
+            <a:gs pos="100000">
+              <a:schemeClr val="phClr">
+                <a:shade val="20000"/>
+                <a:satMod val="255000"/>
+              </a:schemeClr>
+            </a:gs>
+          </a:gsLst>
+          <a:path path="circle">
+            <a:fillToRect l="50000" t="-80000" r="50000" b="180000"/>
+          </a:path>
+        </a:gradFill>
+        <a:gradFill rotWithShape="1">
+          <a:gsLst>
+            <a:gs pos="0">
+              <a:schemeClr val="phClr">
+                <a:tint val="80000"/>
+                <a:satMod val="300000"/>
+              </a:schemeClr>
+            </a:gs>
+            <a:gs pos="100000">
+              <a:schemeClr val="phClr">
+                <a:shade val="30000"/>
+                <a:satMod val="200000"/>
+              </a:schemeClr>
+            </a:gs>
+          </a:gsLst>
+          <a:path path="circle">
+            <a:fillToRect l="50000" t="50000" r="50000" b="50000"/>
+          </a:path>
+        </a:gradFill>
+      </a:bgFillStyleLst>
+    </a:fmtScheme>
+  </a:themeElements>
+  <a:objectDefaults/>
+  <a:extraClrSchemeLst/>
+</a:theme>
 </file>
</xml_diff>

<commit_message>
near final changes to ppt
</commit_message>
<xml_diff>
--- a/Doc/SSBB.pptx
+++ b/Doc/SSBB.pptx
@@ -2,7 +2,7 @@
 <file path=ppt/presentation.xml><?xml version="1.0" encoding="utf-8"?>
 <p:presentation xmlns:a="http://schemas.openxmlformats.org/drawingml/2006/main" xmlns:r="http://schemas.openxmlformats.org/officeDocument/2006/relationships" xmlns:p="http://schemas.openxmlformats.org/presentationml/2006/main" saveSubsetFonts="1">
   <p:sldMasterIdLst>
-    <p:sldMasterId id="2147483648" r:id="rId1"/>
+    <p:sldMasterId id="2147483660" r:id="rId1"/>
   </p:sldMasterIdLst>
   <p:notesMasterIdLst>
     <p:notesMasterId r:id="rId9"/>
@@ -905,29 +905,87 @@
       </p:grpSpPr>
       <p:sp>
         <p:nvSpPr>
-          <p:cNvPr id="2" name="Title 1"/>
-          <p:cNvSpPr>
-            <a:spLocks noGrp="1"/>
-          </p:cNvSpPr>
-          <p:nvPr>
-            <p:ph type="ctrTitle"/>
-          </p:nvPr>
+          <p:cNvPr id="8" name="TextBox 7"/>
+          <p:cNvSpPr txBox="1"/>
+          <p:nvPr/>
         </p:nvSpPr>
         <p:spPr>
           <a:xfrm>
-            <a:off x="685800" y="2130425"/>
-            <a:ext cx="7772400" cy="1470025"/>
+            <a:off x="1828800" y="3159760"/>
+            <a:ext cx="457200" cy="1034129"/>
+          </a:xfrm>
+          <a:prstGeom prst="rect">
+            <a:avLst/>
+          </a:prstGeom>
+          <a:noFill/>
+        </p:spPr>
+        <p:txBody>
+          <a:bodyPr wrap="square" lIns="0" tIns="9144" rIns="0" bIns="9144" rtlCol="0" anchor="ctr" anchorCtr="0">
+            <a:spAutoFit/>
+          </a:bodyPr>
+          <a:lstStyle/>
+          <a:p>
+            <a:r>
+              <a:rPr lang="en-US" sz="6600" dirty="0" smtClean="0">
+                <a:effectLst>
+                  <a:outerShdw blurRad="38100" dist="38100" dir="2700000" algn="tl">
+                    <a:srgbClr val="000000">
+                      <a:alpha val="43137"/>
+                    </a:srgbClr>
+                  </a:outerShdw>
+                </a:effectLst>
+                <a:latin typeface="+mn-lt"/>
+              </a:rPr>
+              <a:t>{</a:t>
+            </a:r>
+            <a:endParaRPr lang="en-US" sz="6600" dirty="0">
+              <a:effectLst>
+                <a:outerShdw blurRad="38100" dist="38100" dir="2700000" algn="tl">
+                  <a:srgbClr val="000000">
+                    <a:alpha val="43137"/>
+                  </a:srgbClr>
+                </a:outerShdw>
+              </a:effectLst>
+              <a:latin typeface="+mn-lt"/>
+            </a:endParaRPr>
+          </a:p>
+        </p:txBody>
+      </p:sp>
+      <p:sp>
+        <p:nvSpPr>
+          <p:cNvPr id="2" name="Title 1"/>
+          <p:cNvSpPr>
+            <a:spLocks noGrp="1"/>
+          </p:cNvSpPr>
+          <p:nvPr>
+            <p:ph type="ctrTitle"/>
+          </p:nvPr>
+        </p:nvSpPr>
+        <p:spPr>
+          <a:xfrm>
+            <a:off x="777240" y="1219200"/>
+            <a:ext cx="7543800" cy="2152650"/>
           </a:xfrm>
         </p:spPr>
         <p:txBody>
-          <a:bodyPr/>
-          <a:lstStyle/>
+          <a:bodyPr>
+            <a:noAutofit/>
+          </a:bodyPr>
+          <a:lstStyle>
+            <a:lvl1pPr>
+              <a:defRPr sz="6000">
+                <a:solidFill>
+                  <a:schemeClr val="tx1"/>
+                </a:solidFill>
+              </a:defRPr>
+            </a:lvl1pPr>
+          </a:lstStyle>
           <a:p>
             <a:r>
               <a:rPr lang="en-US" smtClean="0"/>
               <a:t>Click to edit Master title style</a:t>
             </a:r>
-            <a:endParaRPr lang="en-US"/>
+            <a:endParaRPr lang="en-US" dirty="0"/>
           </a:p>
         </p:txBody>
       </p:sp>
@@ -943,20 +1001,18 @@
         </p:nvSpPr>
         <p:spPr>
           <a:xfrm>
-            <a:off x="1371600" y="3886200"/>
-            <a:ext cx="6400800" cy="1752600"/>
+            <a:off x="2133600" y="3375491"/>
+            <a:ext cx="6172200" cy="685800"/>
           </a:xfrm>
         </p:spPr>
         <p:txBody>
-          <a:bodyPr/>
+          <a:bodyPr anchor="ctr"/>
           <a:lstStyle>
-            <a:lvl1pPr marL="0" indent="0" algn="ctr">
+            <a:lvl1pPr marL="0" indent="0" algn="l">
               <a:buNone/>
               <a:defRPr>
                 <a:solidFill>
-                  <a:schemeClr val="tx1">
-                    <a:tint val="75000"/>
-                  </a:schemeClr>
+                  <a:schemeClr val="tx1"/>
                 </a:solidFill>
               </a:defRPr>
             </a:lvl1pPr>
@@ -1046,13 +1102,13 @@
               <a:rPr lang="en-US" smtClean="0"/>
               <a:t>Click to edit Master subtitle style</a:t>
             </a:r>
-            <a:endParaRPr lang="en-US"/>
-          </a:p>
-        </p:txBody>
-      </p:sp>
-      <p:sp>
-        <p:nvSpPr>
-          <p:cNvPr id="4" name="Date Placeholder 3"/>
+            <a:endParaRPr lang="en-US" dirty="0"/>
+          </a:p>
+        </p:txBody>
+      </p:sp>
+      <p:sp>
+        <p:nvSpPr>
+          <p:cNvPr id="15" name="Date Placeholder 14"/>
           <p:cNvSpPr>
             <a:spLocks noGrp="1"/>
           </p:cNvSpPr>
@@ -1075,31 +1131,12 @@
       </p:sp>
       <p:sp>
         <p:nvSpPr>
-          <p:cNvPr id="5" name="Footer Placeholder 4"/>
-          <p:cNvSpPr>
-            <a:spLocks noGrp="1"/>
-          </p:cNvSpPr>
-          <p:nvPr>
-            <p:ph type="ftr" sz="quarter" idx="11"/>
-          </p:nvPr>
-        </p:nvSpPr>
-        <p:spPr/>
-        <p:txBody>
-          <a:bodyPr/>
-          <a:lstStyle/>
-          <a:p>
-            <a:endParaRPr lang="en-US"/>
-          </a:p>
-        </p:txBody>
-      </p:sp>
-      <p:sp>
-        <p:nvSpPr>
-          <p:cNvPr id="6" name="Slide Number Placeholder 5"/>
-          <p:cNvSpPr>
-            <a:spLocks noGrp="1"/>
-          </p:cNvSpPr>
-          <p:nvPr>
-            <p:ph type="sldNum" sz="quarter" idx="12"/>
+          <p:cNvPr id="16" name="Slide Number Placeholder 15"/>
+          <p:cNvSpPr>
+            <a:spLocks noGrp="1"/>
+          </p:cNvSpPr>
+          <p:nvPr>
+            <p:ph type="sldNum" sz="quarter" idx="11"/>
           </p:nvPr>
         </p:nvSpPr>
         <p:spPr/>
@@ -1115,12 +1152,26 @@
           </a:p>
         </p:txBody>
       </p:sp>
+      <p:sp>
+        <p:nvSpPr>
+          <p:cNvPr id="17" name="Footer Placeholder 16"/>
+          <p:cNvSpPr>
+            <a:spLocks noGrp="1"/>
+          </p:cNvSpPr>
+          <p:nvPr>
+            <p:ph type="ftr" sz="quarter" idx="12"/>
+          </p:nvPr>
+        </p:nvSpPr>
+        <p:spPr/>
+        <p:txBody>
+          <a:bodyPr/>
+          <a:lstStyle/>
+          <a:p>
+            <a:endParaRPr lang="en-US"/>
+          </a:p>
+        </p:txBody>
+      </p:sp>
     </p:spTree>
-    <p:extLst>
-      <p:ext uri="{BB962C8B-B14F-4D97-AF65-F5344CB8AC3E}">
-        <p14:creationId xmlns:p14="http://schemas.microsoft.com/office/powerpoint/2010/main" val="2376684707"/>
-      </p:ext>
-    </p:extLst>
   </p:cSld>
   <p:clrMapOvr>
     <a:masterClrMapping/>
@@ -1164,7 +1215,7 @@
               <a:rPr lang="en-US" smtClean="0"/>
               <a:t>Click to edit Master title style</a:t>
             </a:r>
-            <a:endParaRPr lang="en-US"/>
+            <a:endParaRPr lang="en-US" dirty="0"/>
           </a:p>
         </p:txBody>
       </p:sp>
@@ -1178,9 +1229,14 @@
             <p:ph type="body" orient="vert" idx="1"/>
           </p:nvPr>
         </p:nvSpPr>
-        <p:spPr/>
-        <p:txBody>
-          <a:bodyPr vert="eaVert"/>
+        <p:spPr>
+          <a:xfrm>
+            <a:off x="2133600" y="685801"/>
+            <a:ext cx="5791200" cy="3505199"/>
+          </a:xfrm>
+        </p:spPr>
+        <p:txBody>
+          <a:bodyPr vert="eaVert" anchor="t"/>
           <a:lstStyle/>
           <a:p>
             <a:pPr lvl="0"/>
@@ -1286,11 +1342,6 @@
         </p:txBody>
       </p:sp>
     </p:spTree>
-    <p:extLst>
-      <p:ext uri="{BB962C8B-B14F-4D97-AF65-F5344CB8AC3E}">
-        <p14:creationId xmlns:p14="http://schemas.microsoft.com/office/powerpoint/2010/main" val="4002634202"/>
-      </p:ext>
-    </p:extLst>
   </p:cSld>
   <p:clrMapOvr>
     <a:masterClrMapping/>
@@ -1327,8 +1378,8 @@
         </p:nvSpPr>
         <p:spPr>
           <a:xfrm>
-            <a:off x="6629400" y="274638"/>
-            <a:ext cx="2057400" cy="5851525"/>
+            <a:off x="609600" y="609601"/>
+            <a:ext cx="2133600" cy="5181600"/>
           </a:xfrm>
         </p:spPr>
         <p:txBody>
@@ -1339,7 +1390,7 @@
               <a:rPr lang="en-US" smtClean="0"/>
               <a:t>Click to edit Master title style</a:t>
             </a:r>
-            <a:endParaRPr lang="en-US"/>
+            <a:endParaRPr lang="en-US" dirty="0"/>
           </a:p>
         </p:txBody>
       </p:sp>
@@ -1355,12 +1406,12 @@
         </p:nvSpPr>
         <p:spPr>
           <a:xfrm>
-            <a:off x="457200" y="274638"/>
-            <a:ext cx="6019800" cy="5851525"/>
+            <a:off x="2895600" y="685801"/>
+            <a:ext cx="5029200" cy="4572000"/>
           </a:xfrm>
         </p:spPr>
         <p:txBody>
-          <a:bodyPr vert="eaVert"/>
+          <a:bodyPr vert="eaVert" anchor="t"/>
           <a:lstStyle/>
           <a:p>
             <a:pPr lvl="0"/>
@@ -1396,7 +1447,7 @@
               <a:rPr lang="en-US" smtClean="0"/>
               <a:t>Fifth level</a:t>
             </a:r>
-            <a:endParaRPr lang="en-US"/>
+            <a:endParaRPr lang="en-US" dirty="0"/>
           </a:p>
         </p:txBody>
       </p:sp>
@@ -1466,11 +1517,6 @@
         </p:txBody>
       </p:sp>
     </p:spTree>
-    <p:extLst>
-      <p:ext uri="{BB962C8B-B14F-4D97-AF65-F5344CB8AC3E}">
-        <p14:creationId xmlns:p14="http://schemas.microsoft.com/office/powerpoint/2010/main" val="1164130064"/>
-      </p:ext>
-    </p:extLst>
   </p:cSld>
   <p:clrMapOvr>
     <a:masterClrMapping/>
@@ -1497,7 +1543,59 @@
       </p:grpSpPr>
       <p:sp>
         <p:nvSpPr>
-          <p:cNvPr id="2" name="Title 1"/>
+          <p:cNvPr id="3" name="Content Placeholder 2"/>
+          <p:cNvSpPr>
+            <a:spLocks noGrp="1"/>
+          </p:cNvSpPr>
+          <p:nvPr>
+            <p:ph idx="1"/>
+          </p:nvPr>
+        </p:nvSpPr>
+        <p:spPr/>
+        <p:txBody>
+          <a:bodyPr/>
+          <a:lstStyle/>
+          <a:p>
+            <a:pPr lvl="0"/>
+            <a:r>
+              <a:rPr lang="en-US" smtClean="0"/>
+              <a:t>Click to edit Master text styles</a:t>
+            </a:r>
+          </a:p>
+          <a:p>
+            <a:pPr lvl="1"/>
+            <a:r>
+              <a:rPr lang="en-US" smtClean="0"/>
+              <a:t>Second level</a:t>
+            </a:r>
+          </a:p>
+          <a:p>
+            <a:pPr lvl="2"/>
+            <a:r>
+              <a:rPr lang="en-US" smtClean="0"/>
+              <a:t>Third level</a:t>
+            </a:r>
+          </a:p>
+          <a:p>
+            <a:pPr lvl="3"/>
+            <a:r>
+              <a:rPr lang="en-US" smtClean="0"/>
+              <a:t>Fourth level</a:t>
+            </a:r>
+          </a:p>
+          <a:p>
+            <a:pPr lvl="4"/>
+            <a:r>
+              <a:rPr lang="en-US" smtClean="0"/>
+              <a:t>Fifth level</a:t>
+            </a:r>
+            <a:endParaRPr lang="en-US"/>
+          </a:p>
+        </p:txBody>
+      </p:sp>
+      <p:sp>
+        <p:nvSpPr>
+          <p:cNvPr id="13" name="Title 12"/>
           <p:cNvSpPr>
             <a:spLocks noGrp="1"/>
           </p:cNvSpPr>
@@ -1520,59 +1618,7 @@
       </p:sp>
       <p:sp>
         <p:nvSpPr>
-          <p:cNvPr id="3" name="Content Placeholder 2"/>
-          <p:cNvSpPr>
-            <a:spLocks noGrp="1"/>
-          </p:cNvSpPr>
-          <p:nvPr>
-            <p:ph idx="1"/>
-          </p:nvPr>
-        </p:nvSpPr>
-        <p:spPr/>
-        <p:txBody>
-          <a:bodyPr/>
-          <a:lstStyle/>
-          <a:p>
-            <a:pPr lvl="0"/>
-            <a:r>
-              <a:rPr lang="en-US" smtClean="0"/>
-              <a:t>Click to edit Master text styles</a:t>
-            </a:r>
-          </a:p>
-          <a:p>
-            <a:pPr lvl="1"/>
-            <a:r>
-              <a:rPr lang="en-US" smtClean="0"/>
-              <a:t>Second level</a:t>
-            </a:r>
-          </a:p>
-          <a:p>
-            <a:pPr lvl="2"/>
-            <a:r>
-              <a:rPr lang="en-US" smtClean="0"/>
-              <a:t>Third level</a:t>
-            </a:r>
-          </a:p>
-          <a:p>
-            <a:pPr lvl="3"/>
-            <a:r>
-              <a:rPr lang="en-US" smtClean="0"/>
-              <a:t>Fourth level</a:t>
-            </a:r>
-          </a:p>
-          <a:p>
-            <a:pPr lvl="4"/>
-            <a:r>
-              <a:rPr lang="en-US" smtClean="0"/>
-              <a:t>Fifth level</a:t>
-            </a:r>
-            <a:endParaRPr lang="en-US"/>
-          </a:p>
-        </p:txBody>
-      </p:sp>
-      <p:sp>
-        <p:nvSpPr>
-          <p:cNvPr id="4" name="Date Placeholder 3"/>
+          <p:cNvPr id="14" name="Date Placeholder 13"/>
           <p:cNvSpPr>
             <a:spLocks noGrp="1"/>
           </p:cNvSpPr>
@@ -1595,31 +1641,12 @@
       </p:sp>
       <p:sp>
         <p:nvSpPr>
-          <p:cNvPr id="5" name="Footer Placeholder 4"/>
-          <p:cNvSpPr>
-            <a:spLocks noGrp="1"/>
-          </p:cNvSpPr>
-          <p:nvPr>
-            <p:ph type="ftr" sz="quarter" idx="11"/>
-          </p:nvPr>
-        </p:nvSpPr>
-        <p:spPr/>
-        <p:txBody>
-          <a:bodyPr/>
-          <a:lstStyle/>
-          <a:p>
-            <a:endParaRPr lang="en-US"/>
-          </a:p>
-        </p:txBody>
-      </p:sp>
-      <p:sp>
-        <p:nvSpPr>
-          <p:cNvPr id="6" name="Slide Number Placeholder 5"/>
-          <p:cNvSpPr>
-            <a:spLocks noGrp="1"/>
-          </p:cNvSpPr>
-          <p:nvPr>
-            <p:ph type="sldNum" sz="quarter" idx="12"/>
+          <p:cNvPr id="15" name="Slide Number Placeholder 14"/>
+          <p:cNvSpPr>
+            <a:spLocks noGrp="1"/>
+          </p:cNvSpPr>
+          <p:nvPr>
+            <p:ph type="sldNum" sz="quarter" idx="11"/>
           </p:nvPr>
         </p:nvSpPr>
         <p:spPr/>
@@ -1635,12 +1662,26 @@
           </a:p>
         </p:txBody>
       </p:sp>
+      <p:sp>
+        <p:nvSpPr>
+          <p:cNvPr id="16" name="Footer Placeholder 15"/>
+          <p:cNvSpPr>
+            <a:spLocks noGrp="1"/>
+          </p:cNvSpPr>
+          <p:nvPr>
+            <p:ph type="ftr" sz="quarter" idx="12"/>
+          </p:nvPr>
+        </p:nvSpPr>
+        <p:spPr/>
+        <p:txBody>
+          <a:bodyPr/>
+          <a:lstStyle/>
+          <a:p>
+            <a:endParaRPr lang="en-US"/>
+          </a:p>
+        </p:txBody>
+      </p:sp>
     </p:spTree>
-    <p:extLst>
-      <p:ext uri="{BB962C8B-B14F-4D97-AF65-F5344CB8AC3E}">
-        <p14:creationId xmlns:p14="http://schemas.microsoft.com/office/powerpoint/2010/main" val="665588615"/>
-      </p:ext>
-    </p:extLst>
   </p:cSld>
   <p:clrMapOvr>
     <a:masterClrMapping/>
@@ -1667,62 +1708,78 @@
       </p:grpSpPr>
       <p:sp>
         <p:nvSpPr>
-          <p:cNvPr id="2" name="Title 1"/>
-          <p:cNvSpPr>
-            <a:spLocks noGrp="1"/>
-          </p:cNvSpPr>
-          <p:nvPr>
-            <p:ph type="title"/>
-          </p:nvPr>
+          <p:cNvPr id="8" name="TextBox 7"/>
+          <p:cNvSpPr txBox="1"/>
+          <p:nvPr/>
         </p:nvSpPr>
         <p:spPr>
           <a:xfrm>
-            <a:off x="722313" y="4406900"/>
-            <a:ext cx="7772400" cy="1362075"/>
+            <a:off x="4267200" y="4074497"/>
+            <a:ext cx="457200" cy="1015663"/>
+          </a:xfrm>
+          <a:prstGeom prst="rect">
+            <a:avLst/>
+          </a:prstGeom>
+          <a:noFill/>
+        </p:spPr>
+        <p:txBody>
+          <a:bodyPr wrap="square" lIns="0" tIns="0" rIns="0" bIns="0" rtlCol="0" anchor="t" anchorCtr="0">
+            <a:spAutoFit/>
+          </a:bodyPr>
+          <a:lstStyle/>
+          <a:p>
+            <a:r>
+              <a:rPr lang="en-US" sz="6600" dirty="0" smtClean="0">
+                <a:effectLst>
+                  <a:outerShdw blurRad="38100" dist="38100" dir="2700000" algn="tl">
+                    <a:srgbClr val="000000">
+                      <a:alpha val="43137"/>
+                    </a:srgbClr>
+                  </a:outerShdw>
+                </a:effectLst>
+                <a:latin typeface="+mn-lt"/>
+              </a:rPr>
+              <a:t>{</a:t>
+            </a:r>
+            <a:endParaRPr lang="en-US" sz="6600" dirty="0">
+              <a:effectLst>
+                <a:outerShdw blurRad="38100" dist="38100" dir="2700000" algn="tl">
+                  <a:srgbClr val="000000">
+                    <a:alpha val="43137"/>
+                  </a:srgbClr>
+                </a:outerShdw>
+              </a:effectLst>
+              <a:latin typeface="+mn-lt"/>
+            </a:endParaRPr>
+          </a:p>
+        </p:txBody>
+      </p:sp>
+      <p:sp>
+        <p:nvSpPr>
+          <p:cNvPr id="3" name="Text Placeholder 2"/>
+          <p:cNvSpPr>
+            <a:spLocks noGrp="1"/>
+          </p:cNvSpPr>
+          <p:nvPr>
+            <p:ph type="body" idx="1"/>
+          </p:nvPr>
+        </p:nvSpPr>
+        <p:spPr>
+          <a:xfrm>
+            <a:off x="4572000" y="4267368"/>
+            <a:ext cx="3733800" cy="731520"/>
           </a:xfrm>
         </p:spPr>
         <p:txBody>
-          <a:bodyPr anchor="t"/>
-          <a:lstStyle>
-            <a:lvl1pPr algn="l">
-              <a:defRPr sz="4000" b="1" cap="all"/>
-            </a:lvl1pPr>
-          </a:lstStyle>
-          <a:p>
-            <a:r>
-              <a:rPr lang="en-US" smtClean="0"/>
-              <a:t>Click to edit Master title style</a:t>
-            </a:r>
-            <a:endParaRPr lang="en-US"/>
-          </a:p>
-        </p:txBody>
-      </p:sp>
-      <p:sp>
-        <p:nvSpPr>
-          <p:cNvPr id="3" name="Text Placeholder 2"/>
-          <p:cNvSpPr>
-            <a:spLocks noGrp="1"/>
-          </p:cNvSpPr>
-          <p:nvPr>
-            <p:ph type="body" idx="1"/>
-          </p:nvPr>
-        </p:nvSpPr>
-        <p:spPr>
-          <a:xfrm>
-            <a:off x="722313" y="2906713"/>
-            <a:ext cx="7772400" cy="1500187"/>
-          </a:xfrm>
-        </p:spPr>
-        <p:txBody>
-          <a:bodyPr anchor="b"/>
+          <a:bodyPr anchor="ctr">
+            <a:normAutofit/>
+          </a:bodyPr>
           <a:lstStyle>
             <a:lvl1pPr marL="0" indent="0">
               <a:buNone/>
-              <a:defRPr sz="2000">
+              <a:defRPr sz="1800">
                 <a:solidFill>
-                  <a:schemeClr val="tx1">
-                    <a:tint val="75000"/>
-                  </a:schemeClr>
+                  <a:schemeClr val="tx1"/>
                 </a:solidFill>
               </a:defRPr>
             </a:lvl1pPr>
@@ -1818,7 +1875,7 @@
       </p:sp>
       <p:sp>
         <p:nvSpPr>
-          <p:cNvPr id="4" name="Date Placeholder 3"/>
+          <p:cNvPr id="12" name="Date Placeholder 11"/>
           <p:cNvSpPr>
             <a:spLocks noGrp="1"/>
           </p:cNvSpPr>
@@ -1841,31 +1898,12 @@
       </p:sp>
       <p:sp>
         <p:nvSpPr>
-          <p:cNvPr id="5" name="Footer Placeholder 4"/>
-          <p:cNvSpPr>
-            <a:spLocks noGrp="1"/>
-          </p:cNvSpPr>
-          <p:nvPr>
-            <p:ph type="ftr" sz="quarter" idx="11"/>
-          </p:nvPr>
-        </p:nvSpPr>
-        <p:spPr/>
-        <p:txBody>
-          <a:bodyPr/>
-          <a:lstStyle/>
-          <a:p>
-            <a:endParaRPr lang="en-US"/>
-          </a:p>
-        </p:txBody>
-      </p:sp>
-      <p:sp>
-        <p:nvSpPr>
-          <p:cNvPr id="6" name="Slide Number Placeholder 5"/>
-          <p:cNvSpPr>
-            <a:spLocks noGrp="1"/>
-          </p:cNvSpPr>
-          <p:nvPr>
-            <p:ph type="sldNum" sz="quarter" idx="12"/>
+          <p:cNvPr id="13" name="Slide Number Placeholder 12"/>
+          <p:cNvSpPr>
+            <a:spLocks noGrp="1"/>
+          </p:cNvSpPr>
+          <p:nvPr>
+            <p:ph type="sldNum" sz="quarter" idx="11"/>
           </p:nvPr>
         </p:nvSpPr>
         <p:spPr/>
@@ -1881,12 +1919,76 @@
           </a:p>
         </p:txBody>
       </p:sp>
+      <p:sp>
+        <p:nvSpPr>
+          <p:cNvPr id="14" name="Footer Placeholder 13"/>
+          <p:cNvSpPr>
+            <a:spLocks noGrp="1"/>
+          </p:cNvSpPr>
+          <p:nvPr>
+            <p:ph type="ftr" sz="quarter" idx="12"/>
+          </p:nvPr>
+        </p:nvSpPr>
+        <p:spPr/>
+        <p:txBody>
+          <a:bodyPr/>
+          <a:lstStyle/>
+          <a:p>
+            <a:endParaRPr lang="en-US"/>
+          </a:p>
+        </p:txBody>
+      </p:sp>
+      <p:sp>
+        <p:nvSpPr>
+          <p:cNvPr id="4" name="Title 3"/>
+          <p:cNvSpPr>
+            <a:spLocks noGrp="1"/>
+          </p:cNvSpPr>
+          <p:nvPr>
+            <p:ph type="title"/>
+          </p:nvPr>
+        </p:nvSpPr>
+        <p:spPr>
+          <a:xfrm>
+            <a:off x="2286000" y="1905000"/>
+            <a:ext cx="6035040" cy="2350008"/>
+          </a:xfrm>
+        </p:spPr>
+        <p:txBody>
+          <a:bodyPr/>
+          <a:lstStyle>
+            <a:lvl1pPr marL="0" algn="l" defTabSz="914400" rtl="0" eaLnBrk="1" latinLnBrk="0" hangingPunct="1">
+              <a:spcBef>
+                <a:spcPct val="0"/>
+              </a:spcBef>
+              <a:buNone/>
+              <a:defRPr lang="en-US" sz="5400" b="0" kern="1200" cap="none" dirty="0" smtClean="0">
+                <a:solidFill>
+                  <a:schemeClr val="tx1"/>
+                </a:solidFill>
+                <a:effectLst>
+                  <a:outerShdw blurRad="38100" dist="38100" dir="2700000" algn="tl">
+                    <a:srgbClr val="000000">
+                      <a:alpha val="43137"/>
+                    </a:srgbClr>
+                  </a:outerShdw>
+                </a:effectLst>
+                <a:latin typeface="+mj-lt"/>
+                <a:ea typeface="+mj-ea"/>
+                <a:cs typeface="+mj-cs"/>
+              </a:defRPr>
+            </a:lvl1pPr>
+          </a:lstStyle>
+          <a:p>
+            <a:r>
+              <a:rPr lang="en-US" smtClean="0"/>
+              <a:t>Click to edit Master title style</a:t>
+            </a:r>
+            <a:endParaRPr lang="en-US" dirty="0"/>
+          </a:p>
+        </p:txBody>
+      </p:sp>
     </p:spTree>
-    <p:extLst>
-      <p:ext uri="{BB962C8B-B14F-4D97-AF65-F5344CB8AC3E}">
-        <p14:creationId xmlns:p14="http://schemas.microsoft.com/office/powerpoint/2010/main" val="990750414"/>
-      </p:ext>
-    </p:extLst>
   </p:cSld>
   <p:clrMapOvr>
     <a:masterClrMapping/>
@@ -1913,200 +2015,7 @@
       </p:grpSpPr>
       <p:sp>
         <p:nvSpPr>
-          <p:cNvPr id="2" name="Title 1"/>
-          <p:cNvSpPr>
-            <a:spLocks noGrp="1"/>
-          </p:cNvSpPr>
-          <p:nvPr>
-            <p:ph type="title"/>
-          </p:nvPr>
-        </p:nvSpPr>
-        <p:spPr/>
-        <p:txBody>
-          <a:bodyPr/>
-          <a:lstStyle/>
-          <a:p>
-            <a:r>
-              <a:rPr lang="en-US" smtClean="0"/>
-              <a:t>Click to edit Master title style</a:t>
-            </a:r>
-            <a:endParaRPr lang="en-US"/>
-          </a:p>
-        </p:txBody>
-      </p:sp>
-      <p:sp>
-        <p:nvSpPr>
-          <p:cNvPr id="3" name="Content Placeholder 2"/>
-          <p:cNvSpPr>
-            <a:spLocks noGrp="1"/>
-          </p:cNvSpPr>
-          <p:nvPr>
-            <p:ph sz="half" idx="1"/>
-          </p:nvPr>
-        </p:nvSpPr>
-        <p:spPr>
-          <a:xfrm>
-            <a:off x="457200" y="1600200"/>
-            <a:ext cx="4038600" cy="4525963"/>
-          </a:xfrm>
-        </p:spPr>
-        <p:txBody>
-          <a:bodyPr/>
-          <a:lstStyle>
-            <a:lvl1pPr>
-              <a:defRPr sz="2800"/>
-            </a:lvl1pPr>
-            <a:lvl2pPr>
-              <a:defRPr sz="2400"/>
-            </a:lvl2pPr>
-            <a:lvl3pPr>
-              <a:defRPr sz="2000"/>
-            </a:lvl3pPr>
-            <a:lvl4pPr>
-              <a:defRPr sz="1800"/>
-            </a:lvl4pPr>
-            <a:lvl5pPr>
-              <a:defRPr sz="1800"/>
-            </a:lvl5pPr>
-            <a:lvl6pPr>
-              <a:defRPr sz="1800"/>
-            </a:lvl6pPr>
-            <a:lvl7pPr>
-              <a:defRPr sz="1800"/>
-            </a:lvl7pPr>
-            <a:lvl8pPr>
-              <a:defRPr sz="1800"/>
-            </a:lvl8pPr>
-            <a:lvl9pPr>
-              <a:defRPr sz="1800"/>
-            </a:lvl9pPr>
-          </a:lstStyle>
-          <a:p>
-            <a:pPr lvl="0"/>
-            <a:r>
-              <a:rPr lang="en-US" smtClean="0"/>
-              <a:t>Click to edit Master text styles</a:t>
-            </a:r>
-          </a:p>
-          <a:p>
-            <a:pPr lvl="1"/>
-            <a:r>
-              <a:rPr lang="en-US" smtClean="0"/>
-              <a:t>Second level</a:t>
-            </a:r>
-          </a:p>
-          <a:p>
-            <a:pPr lvl="2"/>
-            <a:r>
-              <a:rPr lang="en-US" smtClean="0"/>
-              <a:t>Third level</a:t>
-            </a:r>
-          </a:p>
-          <a:p>
-            <a:pPr lvl="3"/>
-            <a:r>
-              <a:rPr lang="en-US" smtClean="0"/>
-              <a:t>Fourth level</a:t>
-            </a:r>
-          </a:p>
-          <a:p>
-            <a:pPr lvl="4"/>
-            <a:r>
-              <a:rPr lang="en-US" smtClean="0"/>
-              <a:t>Fifth level</a:t>
-            </a:r>
-            <a:endParaRPr lang="en-US"/>
-          </a:p>
-        </p:txBody>
-      </p:sp>
-      <p:sp>
-        <p:nvSpPr>
-          <p:cNvPr id="4" name="Content Placeholder 3"/>
-          <p:cNvSpPr>
-            <a:spLocks noGrp="1"/>
-          </p:cNvSpPr>
-          <p:nvPr>
-            <p:ph sz="half" idx="2"/>
-          </p:nvPr>
-        </p:nvSpPr>
-        <p:spPr>
-          <a:xfrm>
-            <a:off x="4648200" y="1600200"/>
-            <a:ext cx="4038600" cy="4525963"/>
-          </a:xfrm>
-        </p:spPr>
-        <p:txBody>
-          <a:bodyPr/>
-          <a:lstStyle>
-            <a:lvl1pPr>
-              <a:defRPr sz="2800"/>
-            </a:lvl1pPr>
-            <a:lvl2pPr>
-              <a:defRPr sz="2400"/>
-            </a:lvl2pPr>
-            <a:lvl3pPr>
-              <a:defRPr sz="2000"/>
-            </a:lvl3pPr>
-            <a:lvl4pPr>
-              <a:defRPr sz="1800"/>
-            </a:lvl4pPr>
-            <a:lvl5pPr>
-              <a:defRPr sz="1800"/>
-            </a:lvl5pPr>
-            <a:lvl6pPr>
-              <a:defRPr sz="1800"/>
-            </a:lvl6pPr>
-            <a:lvl7pPr>
-              <a:defRPr sz="1800"/>
-            </a:lvl7pPr>
-            <a:lvl8pPr>
-              <a:defRPr sz="1800"/>
-            </a:lvl8pPr>
-            <a:lvl9pPr>
-              <a:defRPr sz="1800"/>
-            </a:lvl9pPr>
-          </a:lstStyle>
-          <a:p>
-            <a:pPr lvl="0"/>
-            <a:r>
-              <a:rPr lang="en-US" smtClean="0"/>
-              <a:t>Click to edit Master text styles</a:t>
-            </a:r>
-          </a:p>
-          <a:p>
-            <a:pPr lvl="1"/>
-            <a:r>
-              <a:rPr lang="en-US" smtClean="0"/>
-              <a:t>Second level</a:t>
-            </a:r>
-          </a:p>
-          <a:p>
-            <a:pPr lvl="2"/>
-            <a:r>
-              <a:rPr lang="en-US" smtClean="0"/>
-              <a:t>Third level</a:t>
-            </a:r>
-          </a:p>
-          <a:p>
-            <a:pPr lvl="3"/>
-            <a:r>
-              <a:rPr lang="en-US" smtClean="0"/>
-              <a:t>Fourth level</a:t>
-            </a:r>
-          </a:p>
-          <a:p>
-            <a:pPr lvl="4"/>
-            <a:r>
-              <a:rPr lang="en-US" smtClean="0"/>
-              <a:t>Fifth level</a:t>
-            </a:r>
-            <a:endParaRPr lang="en-US"/>
-          </a:p>
-        </p:txBody>
-      </p:sp>
-      <p:sp>
-        <p:nvSpPr>
-          <p:cNvPr id="5" name="Date Placeholder 4"/>
+          <p:cNvPr id="8" name="Date Placeholder 7"/>
           <p:cNvSpPr>
             <a:spLocks noGrp="1"/>
           </p:cNvSpPr>
@@ -2129,31 +2038,12 @@
       </p:sp>
       <p:sp>
         <p:nvSpPr>
-          <p:cNvPr id="6" name="Footer Placeholder 5"/>
-          <p:cNvSpPr>
-            <a:spLocks noGrp="1"/>
-          </p:cNvSpPr>
-          <p:nvPr>
-            <p:ph type="ftr" sz="quarter" idx="11"/>
-          </p:nvPr>
-        </p:nvSpPr>
-        <p:spPr/>
-        <p:txBody>
-          <a:bodyPr/>
-          <a:lstStyle/>
-          <a:p>
-            <a:endParaRPr lang="en-US"/>
-          </a:p>
-        </p:txBody>
-      </p:sp>
-      <p:sp>
-        <p:nvSpPr>
-          <p:cNvPr id="7" name="Slide Number Placeholder 6"/>
-          <p:cNvSpPr>
-            <a:spLocks noGrp="1"/>
-          </p:cNvSpPr>
-          <p:nvPr>
-            <p:ph type="sldNum" sz="quarter" idx="12"/>
+          <p:cNvPr id="9" name="Slide Number Placeholder 8"/>
+          <p:cNvSpPr>
+            <a:spLocks noGrp="1"/>
+          </p:cNvSpPr>
+          <p:nvPr>
+            <p:ph type="sldNum" sz="quarter" idx="11"/>
           </p:nvPr>
         </p:nvSpPr>
         <p:spPr/>
@@ -2169,12 +2059,163 @@
           </a:p>
         </p:txBody>
       </p:sp>
+      <p:sp>
+        <p:nvSpPr>
+          <p:cNvPr id="10" name="Footer Placeholder 9"/>
+          <p:cNvSpPr>
+            <a:spLocks noGrp="1"/>
+          </p:cNvSpPr>
+          <p:nvPr>
+            <p:ph type="ftr" sz="quarter" idx="12"/>
+          </p:nvPr>
+        </p:nvSpPr>
+        <p:spPr/>
+        <p:txBody>
+          <a:bodyPr/>
+          <a:lstStyle/>
+          <a:p>
+            <a:endParaRPr lang="en-US"/>
+          </a:p>
+        </p:txBody>
+      </p:sp>
+      <p:sp>
+        <p:nvSpPr>
+          <p:cNvPr id="11" name="Title 10"/>
+          <p:cNvSpPr>
+            <a:spLocks noGrp="1"/>
+          </p:cNvSpPr>
+          <p:nvPr>
+            <p:ph type="title"/>
+          </p:nvPr>
+        </p:nvSpPr>
+        <p:spPr/>
+        <p:txBody>
+          <a:bodyPr/>
+          <a:lstStyle/>
+          <a:p>
+            <a:r>
+              <a:rPr lang="en-US" smtClean="0"/>
+              <a:t>Click to edit Master title style</a:t>
+            </a:r>
+            <a:endParaRPr lang="en-US" dirty="0"/>
+          </a:p>
+        </p:txBody>
+      </p:sp>
+      <p:sp>
+        <p:nvSpPr>
+          <p:cNvPr id="5" name="Content Placeholder 4"/>
+          <p:cNvSpPr>
+            <a:spLocks noGrp="1"/>
+          </p:cNvSpPr>
+          <p:nvPr>
+            <p:ph sz="quarter" idx="13"/>
+          </p:nvPr>
+        </p:nvSpPr>
+        <p:spPr>
+          <a:xfrm>
+            <a:off x="1344168" y="658368"/>
+            <a:ext cx="3273552" cy="3429000"/>
+          </a:xfrm>
+        </p:spPr>
+        <p:txBody>
+          <a:bodyPr/>
+          <a:lstStyle/>
+          <a:p>
+            <a:pPr lvl="0"/>
+            <a:r>
+              <a:rPr lang="en-US" smtClean="0"/>
+              <a:t>Click to edit Master text styles</a:t>
+            </a:r>
+          </a:p>
+          <a:p>
+            <a:pPr lvl="1"/>
+            <a:r>
+              <a:rPr lang="en-US" smtClean="0"/>
+              <a:t>Second level</a:t>
+            </a:r>
+          </a:p>
+          <a:p>
+            <a:pPr lvl="2"/>
+            <a:r>
+              <a:rPr lang="en-US" smtClean="0"/>
+              <a:t>Third level</a:t>
+            </a:r>
+          </a:p>
+          <a:p>
+            <a:pPr lvl="3"/>
+            <a:r>
+              <a:rPr lang="en-US" smtClean="0"/>
+              <a:t>Fourth level</a:t>
+            </a:r>
+          </a:p>
+          <a:p>
+            <a:pPr lvl="4"/>
+            <a:r>
+              <a:rPr lang="en-US" smtClean="0"/>
+              <a:t>Fifth level</a:t>
+            </a:r>
+            <a:endParaRPr lang="en-US" dirty="0"/>
+          </a:p>
+        </p:txBody>
+      </p:sp>
+      <p:sp>
+        <p:nvSpPr>
+          <p:cNvPr id="7" name="Content Placeholder 6"/>
+          <p:cNvSpPr>
+            <a:spLocks noGrp="1"/>
+          </p:cNvSpPr>
+          <p:nvPr>
+            <p:ph sz="quarter" idx="14"/>
+          </p:nvPr>
+        </p:nvSpPr>
+        <p:spPr>
+          <a:xfrm>
+            <a:off x="5029200" y="658368"/>
+            <a:ext cx="3273552" cy="3432175"/>
+          </a:xfrm>
+        </p:spPr>
+        <p:txBody>
+          <a:bodyPr/>
+          <a:lstStyle/>
+          <a:p>
+            <a:pPr lvl="0"/>
+            <a:r>
+              <a:rPr lang="en-US" smtClean="0"/>
+              <a:t>Click to edit Master text styles</a:t>
+            </a:r>
+          </a:p>
+          <a:p>
+            <a:pPr lvl="1"/>
+            <a:r>
+              <a:rPr lang="en-US" smtClean="0"/>
+              <a:t>Second level</a:t>
+            </a:r>
+          </a:p>
+          <a:p>
+            <a:pPr lvl="2"/>
+            <a:r>
+              <a:rPr lang="en-US" smtClean="0"/>
+              <a:t>Third level</a:t>
+            </a:r>
+          </a:p>
+          <a:p>
+            <a:pPr lvl="3"/>
+            <a:r>
+              <a:rPr lang="en-US" smtClean="0"/>
+              <a:t>Fourth level</a:t>
+            </a:r>
+          </a:p>
+          <a:p>
+            <a:pPr lvl="4"/>
+            <a:r>
+              <a:rPr lang="en-US" smtClean="0"/>
+              <a:t>Fifth level</a:t>
+            </a:r>
+            <a:endParaRPr lang="en-US"/>
+          </a:p>
+        </p:txBody>
+      </p:sp>
     </p:spTree>
-    <p:extLst>
-      <p:ext uri="{BB962C8B-B14F-4D97-AF65-F5344CB8AC3E}">
-        <p14:creationId xmlns:p14="http://schemas.microsoft.com/office/powerpoint/2010/main" val="3945484667"/>
-      </p:ext>
-    </p:extLst>
   </p:cSld>
   <p:clrMapOvr>
     <a:masterClrMapping/>
@@ -2201,33 +2242,6 @@
       </p:grpSpPr>
       <p:sp>
         <p:nvSpPr>
-          <p:cNvPr id="2" name="Title 1"/>
-          <p:cNvSpPr>
-            <a:spLocks noGrp="1"/>
-          </p:cNvSpPr>
-          <p:nvPr>
-            <p:ph type="title"/>
-          </p:nvPr>
-        </p:nvSpPr>
-        <p:spPr/>
-        <p:txBody>
-          <a:bodyPr/>
-          <a:lstStyle>
-            <a:lvl1pPr>
-              <a:defRPr/>
-            </a:lvl1pPr>
-          </a:lstStyle>
-          <a:p>
-            <a:r>
-              <a:rPr lang="en-US" smtClean="0"/>
-              <a:t>Click to edit Master title style</a:t>
-            </a:r>
-            <a:endParaRPr lang="en-US"/>
-          </a:p>
-        </p:txBody>
-      </p:sp>
-      <p:sp>
-        <p:nvSpPr>
           <p:cNvPr id="3" name="Text Placeholder 2"/>
           <p:cNvSpPr>
             <a:spLocks noGrp="1"/>
@@ -2238,16 +2252,18 @@
         </p:nvSpPr>
         <p:spPr>
           <a:xfrm>
-            <a:off x="457200" y="1535113"/>
-            <a:ext cx="4040188" cy="639762"/>
+            <a:off x="1341120" y="661976"/>
+            <a:ext cx="3273552" cy="639762"/>
           </a:xfrm>
         </p:spPr>
         <p:txBody>
-          <a:bodyPr anchor="b"/>
+          <a:bodyPr anchor="ctr">
+            <a:noAutofit/>
+          </a:bodyPr>
           <a:lstStyle>
             <a:lvl1pPr marL="0" indent="0">
               <a:buNone/>
-              <a:defRPr sz="2400" b="1"/>
+              <a:defRPr sz="2200" b="0"/>
             </a:lvl1pPr>
             <a:lvl2pPr marL="457200" indent="0">
               <a:buNone/>
@@ -2303,12 +2319,12 @@
         </p:nvSpPr>
         <p:spPr>
           <a:xfrm>
-            <a:off x="457200" y="2174875"/>
-            <a:ext cx="4040188" cy="3951288"/>
+            <a:off x="1344168" y="1371600"/>
+            <a:ext cx="3276600" cy="2743200"/>
           </a:xfrm>
         </p:spPr>
         <p:txBody>
-          <a:bodyPr/>
+          <a:bodyPr anchor="t"/>
           <a:lstStyle>
             <a:lvl1pPr>
               <a:defRPr sz="2400"/>
@@ -2372,7 +2388,7 @@
               <a:rPr lang="en-US" smtClean="0"/>
               <a:t>Fifth level</a:t>
             </a:r>
-            <a:endParaRPr lang="en-US"/>
+            <a:endParaRPr lang="en-US" dirty="0"/>
           </a:p>
         </p:txBody>
       </p:sp>
@@ -2388,16 +2404,18 @@
         </p:nvSpPr>
         <p:spPr>
           <a:xfrm>
-            <a:off x="4645025" y="1535113"/>
-            <a:ext cx="4041775" cy="639762"/>
+            <a:off x="5029200" y="661976"/>
+            <a:ext cx="3273552" cy="639762"/>
           </a:xfrm>
         </p:spPr>
         <p:txBody>
-          <a:bodyPr anchor="b"/>
+          <a:bodyPr anchor="ctr">
+            <a:noAutofit/>
+          </a:bodyPr>
           <a:lstStyle>
             <a:lvl1pPr marL="0" indent="0">
               <a:buNone/>
-              <a:defRPr sz="2400" b="1"/>
+              <a:defRPr sz="2200" b="0"/>
             </a:lvl1pPr>
             <a:lvl2pPr marL="457200" indent="0">
               <a:buNone/>
@@ -2453,12 +2471,12 @@
         </p:nvSpPr>
         <p:spPr>
           <a:xfrm>
-            <a:off x="4645025" y="2174875"/>
-            <a:ext cx="4041775" cy="3951288"/>
+            <a:off x="5029200" y="1371600"/>
+            <a:ext cx="3273552" cy="2743200"/>
           </a:xfrm>
         </p:spPr>
         <p:txBody>
-          <a:bodyPr/>
+          <a:bodyPr anchor="t"/>
           <a:lstStyle>
             <a:lvl1pPr>
               <a:defRPr sz="2400"/>
@@ -2522,13 +2540,132 @@
               <a:rPr lang="en-US" smtClean="0"/>
               <a:t>Fifth level</a:t>
             </a:r>
-            <a:endParaRPr lang="en-US"/>
-          </a:p>
-        </p:txBody>
-      </p:sp>
-      <p:sp>
-        <p:nvSpPr>
-          <p:cNvPr id="7" name="Date Placeholder 6"/>
+            <a:endParaRPr lang="en-US" dirty="0"/>
+          </a:p>
+        </p:txBody>
+      </p:sp>
+      <p:sp>
+        <p:nvSpPr>
+          <p:cNvPr id="13" name="TextBox 12"/>
+          <p:cNvSpPr txBox="1"/>
+          <p:nvPr/>
+        </p:nvSpPr>
+        <p:spPr>
+          <a:xfrm>
+            <a:off x="1056640" y="520192"/>
+            <a:ext cx="457200" cy="923330"/>
+          </a:xfrm>
+          <a:prstGeom prst="rect">
+            <a:avLst/>
+          </a:prstGeom>
+          <a:noFill/>
+        </p:spPr>
+        <p:txBody>
+          <a:bodyPr wrap="square" lIns="0" tIns="0" rIns="0" bIns="0" rtlCol="0" anchor="t" anchorCtr="0">
+            <a:spAutoFit/>
+          </a:bodyPr>
+          <a:lstStyle/>
+          <a:p>
+            <a:r>
+              <a:rPr lang="en-US" sz="6000" dirty="0" smtClean="0">
+                <a:effectLst>
+                  <a:outerShdw blurRad="38100" dist="38100" dir="2700000" algn="tl">
+                    <a:srgbClr val="000000">
+                      <a:alpha val="43137"/>
+                    </a:srgbClr>
+                  </a:outerShdw>
+                </a:effectLst>
+                <a:latin typeface="+mn-lt"/>
+              </a:rPr>
+              <a:t>{</a:t>
+            </a:r>
+            <a:endParaRPr lang="en-US" sz="6000" dirty="0">
+              <a:effectLst>
+                <a:outerShdw blurRad="38100" dist="38100" dir="2700000" algn="tl">
+                  <a:srgbClr val="000000">
+                    <a:alpha val="43137"/>
+                  </a:srgbClr>
+                </a:outerShdw>
+              </a:effectLst>
+              <a:latin typeface="+mn-lt"/>
+            </a:endParaRPr>
+          </a:p>
+        </p:txBody>
+      </p:sp>
+      <p:sp>
+        <p:nvSpPr>
+          <p:cNvPr id="18" name="TextBox 17"/>
+          <p:cNvSpPr txBox="1"/>
+          <p:nvPr/>
+        </p:nvSpPr>
+        <p:spPr>
+          <a:xfrm>
+            <a:off x="4780280" y="520192"/>
+            <a:ext cx="457200" cy="923330"/>
+          </a:xfrm>
+          <a:prstGeom prst="rect">
+            <a:avLst/>
+          </a:prstGeom>
+          <a:noFill/>
+        </p:spPr>
+        <p:txBody>
+          <a:bodyPr wrap="square" lIns="0" tIns="0" rIns="0" bIns="0" rtlCol="0" anchor="t" anchorCtr="0">
+            <a:spAutoFit/>
+          </a:bodyPr>
+          <a:lstStyle/>
+          <a:p>
+            <a:r>
+              <a:rPr lang="en-US" sz="6000" dirty="0" smtClean="0">
+                <a:effectLst>
+                  <a:outerShdw blurRad="38100" dist="38100" dir="2700000" algn="tl">
+                    <a:srgbClr val="000000">
+                      <a:alpha val="43137"/>
+                    </a:srgbClr>
+                  </a:outerShdw>
+                </a:effectLst>
+                <a:latin typeface="+mn-lt"/>
+              </a:rPr>
+              <a:t>{</a:t>
+            </a:r>
+            <a:endParaRPr lang="en-US" sz="6000" dirty="0">
+              <a:effectLst>
+                <a:outerShdw blurRad="38100" dist="38100" dir="2700000" algn="tl">
+                  <a:srgbClr val="000000">
+                    <a:alpha val="43137"/>
+                  </a:srgbClr>
+                </a:outerShdw>
+              </a:effectLst>
+              <a:latin typeface="+mn-lt"/>
+            </a:endParaRPr>
+          </a:p>
+        </p:txBody>
+      </p:sp>
+      <p:sp>
+        <p:nvSpPr>
+          <p:cNvPr id="12" name="Title 11"/>
+          <p:cNvSpPr>
+            <a:spLocks noGrp="1"/>
+          </p:cNvSpPr>
+          <p:nvPr>
+            <p:ph type="title"/>
+          </p:nvPr>
+        </p:nvSpPr>
+        <p:spPr/>
+        <p:txBody>
+          <a:bodyPr/>
+          <a:lstStyle/>
+          <a:p>
+            <a:r>
+              <a:rPr lang="en-US" smtClean="0"/>
+              <a:t>Click to edit Master title style</a:t>
+            </a:r>
+            <a:endParaRPr lang="en-US" dirty="0"/>
+          </a:p>
+        </p:txBody>
+      </p:sp>
+      <p:sp>
+        <p:nvSpPr>
+          <p:cNvPr id="14" name="Date Placeholder 13"/>
           <p:cNvSpPr>
             <a:spLocks noGrp="1"/>
           </p:cNvSpPr>
@@ -2551,31 +2688,12 @@
       </p:sp>
       <p:sp>
         <p:nvSpPr>
-          <p:cNvPr id="8" name="Footer Placeholder 7"/>
-          <p:cNvSpPr>
-            <a:spLocks noGrp="1"/>
-          </p:cNvSpPr>
-          <p:nvPr>
-            <p:ph type="ftr" sz="quarter" idx="11"/>
-          </p:nvPr>
-        </p:nvSpPr>
-        <p:spPr/>
-        <p:txBody>
-          <a:bodyPr/>
-          <a:lstStyle/>
-          <a:p>
-            <a:endParaRPr lang="en-US"/>
-          </a:p>
-        </p:txBody>
-      </p:sp>
-      <p:sp>
-        <p:nvSpPr>
-          <p:cNvPr id="9" name="Slide Number Placeholder 8"/>
-          <p:cNvSpPr>
-            <a:spLocks noGrp="1"/>
-          </p:cNvSpPr>
-          <p:nvPr>
-            <p:ph type="sldNum" sz="quarter" idx="12"/>
+          <p:cNvPr id="15" name="Slide Number Placeholder 14"/>
+          <p:cNvSpPr>
+            <a:spLocks noGrp="1"/>
+          </p:cNvSpPr>
+          <p:nvPr>
+            <p:ph type="sldNum" sz="quarter" idx="11"/>
           </p:nvPr>
         </p:nvSpPr>
         <p:spPr/>
@@ -2591,12 +2709,26 @@
           </a:p>
         </p:txBody>
       </p:sp>
+      <p:sp>
+        <p:nvSpPr>
+          <p:cNvPr id="16" name="Footer Placeholder 15"/>
+          <p:cNvSpPr>
+            <a:spLocks noGrp="1"/>
+          </p:cNvSpPr>
+          <p:nvPr>
+            <p:ph type="ftr" sz="quarter" idx="12"/>
+          </p:nvPr>
+        </p:nvSpPr>
+        <p:spPr/>
+        <p:txBody>
+          <a:bodyPr/>
+          <a:lstStyle/>
+          <a:p>
+            <a:endParaRPr lang="en-US"/>
+          </a:p>
+        </p:txBody>
+      </p:sp>
     </p:spTree>
-    <p:extLst>
-      <p:ext uri="{BB962C8B-B14F-4D97-AF65-F5344CB8AC3E}">
-        <p14:creationId xmlns:p14="http://schemas.microsoft.com/office/powerpoint/2010/main" val="1099486350"/>
-      </p:ext>
-    </p:extLst>
   </p:cSld>
   <p:clrMapOvr>
     <a:masterClrMapping/>
@@ -2623,7 +2755,7 @@
       </p:grpSpPr>
       <p:sp>
         <p:nvSpPr>
-          <p:cNvPr id="2" name="Title 1"/>
+          <p:cNvPr id="6" name="Title 5"/>
           <p:cNvSpPr>
             <a:spLocks noGrp="1"/>
           </p:cNvSpPr>
@@ -2646,7 +2778,7 @@
       </p:sp>
       <p:sp>
         <p:nvSpPr>
-          <p:cNvPr id="3" name="Date Placeholder 2"/>
+          <p:cNvPr id="7" name="Date Placeholder 6"/>
           <p:cNvSpPr>
             <a:spLocks noGrp="1"/>
           </p:cNvSpPr>
@@ -2669,31 +2801,12 @@
       </p:sp>
       <p:sp>
         <p:nvSpPr>
-          <p:cNvPr id="4" name="Footer Placeholder 3"/>
-          <p:cNvSpPr>
-            <a:spLocks noGrp="1"/>
-          </p:cNvSpPr>
-          <p:nvPr>
-            <p:ph type="ftr" sz="quarter" idx="11"/>
-          </p:nvPr>
-        </p:nvSpPr>
-        <p:spPr/>
-        <p:txBody>
-          <a:bodyPr/>
-          <a:lstStyle/>
-          <a:p>
-            <a:endParaRPr lang="en-US"/>
-          </a:p>
-        </p:txBody>
-      </p:sp>
-      <p:sp>
-        <p:nvSpPr>
-          <p:cNvPr id="5" name="Slide Number Placeholder 4"/>
-          <p:cNvSpPr>
-            <a:spLocks noGrp="1"/>
-          </p:cNvSpPr>
-          <p:nvPr>
-            <p:ph type="sldNum" sz="quarter" idx="12"/>
+          <p:cNvPr id="8" name="Slide Number Placeholder 7"/>
+          <p:cNvSpPr>
+            <a:spLocks noGrp="1"/>
+          </p:cNvSpPr>
+          <p:nvPr>
+            <p:ph type="sldNum" sz="quarter" idx="11"/>
           </p:nvPr>
         </p:nvSpPr>
         <p:spPr/>
@@ -2709,12 +2822,26 @@
           </a:p>
         </p:txBody>
       </p:sp>
+      <p:sp>
+        <p:nvSpPr>
+          <p:cNvPr id="9" name="Footer Placeholder 8"/>
+          <p:cNvSpPr>
+            <a:spLocks noGrp="1"/>
+          </p:cNvSpPr>
+          <p:nvPr>
+            <p:ph type="ftr" sz="quarter" idx="12"/>
+          </p:nvPr>
+        </p:nvSpPr>
+        <p:spPr/>
+        <p:txBody>
+          <a:bodyPr/>
+          <a:lstStyle/>
+          <a:p>
+            <a:endParaRPr lang="en-US"/>
+          </a:p>
+        </p:txBody>
+      </p:sp>
     </p:spTree>
-    <p:extLst>
-      <p:ext uri="{BB962C8B-B14F-4D97-AF65-F5344CB8AC3E}">
-        <p14:creationId xmlns:p14="http://schemas.microsoft.com/office/powerpoint/2010/main" val="3247932665"/>
-      </p:ext>
-    </p:extLst>
   </p:cSld>
   <p:clrMapOvr>
     <a:masterClrMapping/>
@@ -2741,7 +2868,7 @@
       </p:grpSpPr>
       <p:sp>
         <p:nvSpPr>
-          <p:cNvPr id="2" name="Date Placeholder 1"/>
+          <p:cNvPr id="5" name="Date Placeholder 4"/>
           <p:cNvSpPr>
             <a:spLocks noGrp="1"/>
           </p:cNvSpPr>
@@ -2764,31 +2891,12 @@
       </p:sp>
       <p:sp>
         <p:nvSpPr>
-          <p:cNvPr id="3" name="Footer Placeholder 2"/>
-          <p:cNvSpPr>
-            <a:spLocks noGrp="1"/>
-          </p:cNvSpPr>
-          <p:nvPr>
-            <p:ph type="ftr" sz="quarter" idx="11"/>
-          </p:nvPr>
-        </p:nvSpPr>
-        <p:spPr/>
-        <p:txBody>
-          <a:bodyPr/>
-          <a:lstStyle/>
-          <a:p>
-            <a:endParaRPr lang="en-US"/>
-          </a:p>
-        </p:txBody>
-      </p:sp>
-      <p:sp>
-        <p:nvSpPr>
-          <p:cNvPr id="4" name="Slide Number Placeholder 3"/>
-          <p:cNvSpPr>
-            <a:spLocks noGrp="1"/>
-          </p:cNvSpPr>
-          <p:nvPr>
-            <p:ph type="sldNum" sz="quarter" idx="12"/>
+          <p:cNvPr id="6" name="Slide Number Placeholder 5"/>
+          <p:cNvSpPr>
+            <a:spLocks noGrp="1"/>
+          </p:cNvSpPr>
+          <p:nvPr>
+            <p:ph type="sldNum" sz="quarter" idx="11"/>
           </p:nvPr>
         </p:nvSpPr>
         <p:spPr/>
@@ -2804,12 +2912,26 @@
           </a:p>
         </p:txBody>
       </p:sp>
+      <p:sp>
+        <p:nvSpPr>
+          <p:cNvPr id="7" name="Footer Placeholder 6"/>
+          <p:cNvSpPr>
+            <a:spLocks noGrp="1"/>
+          </p:cNvSpPr>
+          <p:nvPr>
+            <p:ph type="ftr" sz="quarter" idx="12"/>
+          </p:nvPr>
+        </p:nvSpPr>
+        <p:spPr/>
+        <p:txBody>
+          <a:bodyPr/>
+          <a:lstStyle/>
+          <a:p>
+            <a:endParaRPr lang="en-US"/>
+          </a:p>
+        </p:txBody>
+      </p:sp>
     </p:spTree>
-    <p:extLst>
-      <p:ext uri="{BB962C8B-B14F-4D97-AF65-F5344CB8AC3E}">
-        <p14:creationId xmlns:p14="http://schemas.microsoft.com/office/powerpoint/2010/main" val="2948604971"/>
-      </p:ext>
-    </p:extLst>
   </p:cSld>
   <p:clrMapOvr>
     <a:masterClrMapping/>
@@ -2836,69 +2958,85 @@
       </p:grpSpPr>
       <p:sp>
         <p:nvSpPr>
-          <p:cNvPr id="2" name="Title 1"/>
-          <p:cNvSpPr>
-            <a:spLocks noGrp="1"/>
-          </p:cNvSpPr>
-          <p:nvPr>
-            <p:ph type="title"/>
-          </p:nvPr>
+          <p:cNvPr id="9" name="TextBox 8"/>
+          <p:cNvSpPr txBox="1"/>
+          <p:nvPr/>
         </p:nvSpPr>
         <p:spPr>
           <a:xfrm>
-            <a:off x="457200" y="273050"/>
-            <a:ext cx="3008313" cy="1162050"/>
+            <a:off x="5328920" y="1774588"/>
+            <a:ext cx="457200" cy="1231106"/>
+          </a:xfrm>
+          <a:prstGeom prst="rect">
+            <a:avLst/>
+          </a:prstGeom>
+          <a:noFill/>
+        </p:spPr>
+        <p:txBody>
+          <a:bodyPr wrap="square" lIns="0" tIns="0" rIns="0" bIns="0" rtlCol="0" anchor="t" anchorCtr="0">
+            <a:spAutoFit/>
+          </a:bodyPr>
+          <a:lstStyle/>
+          <a:p>
+            <a:r>
+              <a:rPr lang="en-US" sz="8000" dirty="0" smtClean="0">
+                <a:effectLst>
+                  <a:outerShdw blurRad="38100" dist="38100" dir="2700000" algn="tl">
+                    <a:srgbClr val="000000">
+                      <a:alpha val="43137"/>
+                    </a:srgbClr>
+                  </a:outerShdw>
+                </a:effectLst>
+                <a:latin typeface="+mn-lt"/>
+              </a:rPr>
+              <a:t>{</a:t>
+            </a:r>
+            <a:endParaRPr lang="en-US" sz="8000" dirty="0">
+              <a:effectLst>
+                <a:outerShdw blurRad="38100" dist="38100" dir="2700000" algn="tl">
+                  <a:srgbClr val="000000">
+                    <a:alpha val="43137"/>
+                  </a:srgbClr>
+                </a:outerShdw>
+              </a:effectLst>
+              <a:latin typeface="+mn-lt"/>
+            </a:endParaRPr>
+          </a:p>
+        </p:txBody>
+      </p:sp>
+      <p:sp>
+        <p:nvSpPr>
+          <p:cNvPr id="3" name="Content Placeholder 2"/>
+          <p:cNvSpPr>
+            <a:spLocks noGrp="1"/>
+          </p:cNvSpPr>
+          <p:nvPr>
+            <p:ph idx="1"/>
+          </p:nvPr>
+        </p:nvSpPr>
+        <p:spPr>
+          <a:xfrm>
+            <a:off x="838200" y="685801"/>
+            <a:ext cx="4343400" cy="3429000"/>
           </a:xfrm>
         </p:spPr>
         <p:txBody>
-          <a:bodyPr anchor="b"/>
-          <a:lstStyle>
-            <a:lvl1pPr algn="l">
-              <a:defRPr sz="2000" b="1"/>
-            </a:lvl1pPr>
-          </a:lstStyle>
-          <a:p>
-            <a:r>
-              <a:rPr lang="en-US" smtClean="0"/>
-              <a:t>Click to edit Master title style</a:t>
-            </a:r>
-            <a:endParaRPr lang="en-US"/>
-          </a:p>
-        </p:txBody>
-      </p:sp>
-      <p:sp>
-        <p:nvSpPr>
-          <p:cNvPr id="3" name="Content Placeholder 2"/>
-          <p:cNvSpPr>
-            <a:spLocks noGrp="1"/>
-          </p:cNvSpPr>
-          <p:nvPr>
-            <p:ph idx="1"/>
-          </p:nvPr>
-        </p:nvSpPr>
-        <p:spPr>
-          <a:xfrm>
-            <a:off x="3575050" y="273050"/>
-            <a:ext cx="5111750" cy="5853113"/>
-          </a:xfrm>
-        </p:spPr>
-        <p:txBody>
-          <a:bodyPr/>
+          <a:bodyPr anchor="ctr"/>
           <a:lstStyle>
             <a:lvl1pPr>
-              <a:defRPr sz="3200"/>
+              <a:defRPr sz="2400"/>
             </a:lvl1pPr>
             <a:lvl2pPr>
-              <a:defRPr sz="2800"/>
+              <a:defRPr sz="2200"/>
             </a:lvl2pPr>
             <a:lvl3pPr>
-              <a:defRPr sz="2400"/>
+              <a:defRPr sz="2000"/>
             </a:lvl3pPr>
             <a:lvl4pPr>
-              <a:defRPr sz="2000"/>
+              <a:defRPr sz="1800"/>
             </a:lvl4pPr>
             <a:lvl5pPr>
-              <a:defRPr sz="2000"/>
+              <a:defRPr sz="1800"/>
             </a:lvl5pPr>
             <a:lvl6pPr>
               <a:defRPr sz="2000"/>
@@ -2947,7 +3085,7 @@
               <a:rPr lang="en-US" smtClean="0"/>
               <a:t>Fifth level</a:t>
             </a:r>
-            <a:endParaRPr lang="en-US"/>
+            <a:endParaRPr lang="en-US" dirty="0"/>
           </a:p>
         </p:txBody>
       </p:sp>
@@ -2963,16 +3101,18 @@
         </p:nvSpPr>
         <p:spPr>
           <a:xfrm>
-            <a:off x="457200" y="1435100"/>
-            <a:ext cx="3008313" cy="4691063"/>
+            <a:off x="5715000" y="685801"/>
+            <a:ext cx="2590800" cy="3429000"/>
           </a:xfrm>
         </p:spPr>
         <p:txBody>
-          <a:bodyPr/>
+          <a:bodyPr anchor="ctr">
+            <a:normAutofit/>
+          </a:bodyPr>
           <a:lstStyle>
             <a:lvl1pPr marL="0" indent="0">
               <a:buNone/>
-              <a:defRPr sz="1400"/>
+              <a:defRPr sz="1600"/>
             </a:lvl1pPr>
             <a:lvl2pPr marL="457200" indent="0">
               <a:buNone/>
@@ -3018,7 +3158,7 @@
       </p:sp>
       <p:sp>
         <p:nvSpPr>
-          <p:cNvPr id="5" name="Date Placeholder 4"/>
+          <p:cNvPr id="15" name="Date Placeholder 14"/>
           <p:cNvSpPr>
             <a:spLocks noGrp="1"/>
           </p:cNvSpPr>
@@ -3041,31 +3181,12 @@
       </p:sp>
       <p:sp>
         <p:nvSpPr>
-          <p:cNvPr id="6" name="Footer Placeholder 5"/>
-          <p:cNvSpPr>
-            <a:spLocks noGrp="1"/>
-          </p:cNvSpPr>
-          <p:nvPr>
-            <p:ph type="ftr" sz="quarter" idx="11"/>
-          </p:nvPr>
-        </p:nvSpPr>
-        <p:spPr/>
-        <p:txBody>
-          <a:bodyPr/>
-          <a:lstStyle/>
-          <a:p>
-            <a:endParaRPr lang="en-US"/>
-          </a:p>
-        </p:txBody>
-      </p:sp>
-      <p:sp>
-        <p:nvSpPr>
-          <p:cNvPr id="7" name="Slide Number Placeholder 6"/>
-          <p:cNvSpPr>
-            <a:spLocks noGrp="1"/>
-          </p:cNvSpPr>
-          <p:nvPr>
-            <p:ph type="sldNum" sz="quarter" idx="12"/>
+          <p:cNvPr id="16" name="Slide Number Placeholder 15"/>
+          <p:cNvSpPr>
+            <a:spLocks noGrp="1"/>
+          </p:cNvSpPr>
+          <p:nvPr>
+            <p:ph type="sldNum" sz="quarter" idx="11"/>
           </p:nvPr>
         </p:nvSpPr>
         <p:spPr/>
@@ -3081,12 +3202,49 @@
           </a:p>
         </p:txBody>
       </p:sp>
+      <p:sp>
+        <p:nvSpPr>
+          <p:cNvPr id="17" name="Footer Placeholder 16"/>
+          <p:cNvSpPr>
+            <a:spLocks noGrp="1"/>
+          </p:cNvSpPr>
+          <p:nvPr>
+            <p:ph type="ftr" sz="quarter" idx="12"/>
+          </p:nvPr>
+        </p:nvSpPr>
+        <p:spPr/>
+        <p:txBody>
+          <a:bodyPr/>
+          <a:lstStyle/>
+          <a:p>
+            <a:endParaRPr lang="en-US"/>
+          </a:p>
+        </p:txBody>
+      </p:sp>
+      <p:sp>
+        <p:nvSpPr>
+          <p:cNvPr id="18" name="Title 17"/>
+          <p:cNvSpPr>
+            <a:spLocks noGrp="1"/>
+          </p:cNvSpPr>
+          <p:nvPr>
+            <p:ph type="title"/>
+          </p:nvPr>
+        </p:nvSpPr>
+        <p:spPr/>
+        <p:txBody>
+          <a:bodyPr/>
+          <a:lstStyle/>
+          <a:p>
+            <a:r>
+              <a:rPr lang="en-US" smtClean="0"/>
+              <a:t>Click to edit Master title style</a:t>
+            </a:r>
+            <a:endParaRPr lang="en-US" dirty="0"/>
+          </a:p>
+        </p:txBody>
+      </p:sp>
     </p:spTree>
-    <p:extLst>
-      <p:ext uri="{BB962C8B-B14F-4D97-AF65-F5344CB8AC3E}">
-        <p14:creationId xmlns:p14="http://schemas.microsoft.com/office/powerpoint/2010/main" val="585326475"/>
-      </p:ext>
-    </p:extLst>
   </p:cSld>
   <p:clrMapOvr>
     <a:masterClrMapping/>
@@ -3113,51 +3271,26 @@
       </p:grpSpPr>
       <p:sp>
         <p:nvSpPr>
-          <p:cNvPr id="2" name="Title 1"/>
-          <p:cNvSpPr>
-            <a:spLocks noGrp="1"/>
-          </p:cNvSpPr>
-          <p:nvPr>
-            <p:ph type="title"/>
+          <p:cNvPr id="3" name="Picture Placeholder 2"/>
+          <p:cNvSpPr>
+            <a:spLocks noGrp="1"/>
+          </p:cNvSpPr>
+          <p:nvPr>
+            <p:ph type="pic" idx="1"/>
           </p:nvPr>
         </p:nvSpPr>
         <p:spPr>
           <a:xfrm>
-            <a:off x="1792288" y="4800600"/>
-            <a:ext cx="5486400" cy="566738"/>
+            <a:off x="1219200" y="612775"/>
+            <a:ext cx="6705600" cy="2546985"/>
           </a:xfrm>
-        </p:spPr>
-        <p:txBody>
-          <a:bodyPr anchor="b"/>
-          <a:lstStyle>
-            <a:lvl1pPr algn="l">
-              <a:defRPr sz="2000" b="1"/>
-            </a:lvl1pPr>
-          </a:lstStyle>
-          <a:p>
-            <a:r>
-              <a:rPr lang="en-US" smtClean="0"/>
-              <a:t>Click to edit Master title style</a:t>
-            </a:r>
-            <a:endParaRPr lang="en-US"/>
-          </a:p>
-        </p:txBody>
-      </p:sp>
-      <p:sp>
-        <p:nvSpPr>
-          <p:cNvPr id="3" name="Picture Placeholder 2"/>
-          <p:cNvSpPr>
-            <a:spLocks noGrp="1"/>
-          </p:cNvSpPr>
-          <p:nvPr>
-            <p:ph type="pic" idx="1"/>
-          </p:nvPr>
-        </p:nvSpPr>
-        <p:spPr>
-          <a:xfrm>
-            <a:off x="1792288" y="612775"/>
-            <a:ext cx="5486400" cy="4114800"/>
-          </a:xfrm>
+          <a:effectLst>
+            <a:outerShdw blurRad="152400" dist="317500" dir="5400000" sx="90000" sy="-19000" rotWithShape="0">
+              <a:prstClr val="black">
+                <a:alpha val="15000"/>
+              </a:prstClr>
+            </a:outerShdw>
+          </a:effectLst>
         </p:spPr>
         <p:txBody>
           <a:bodyPr/>
@@ -3200,6 +3333,10 @@
             </a:lvl9pPr>
           </a:lstStyle>
           <a:p>
+            <a:r>
+              <a:rPr lang="en-US" smtClean="0"/>
+              <a:t>Click icon to add picture</a:t>
+            </a:r>
             <a:endParaRPr lang="en-US"/>
           </a:p>
         </p:txBody>
@@ -3216,16 +3353,18 @@
         </p:nvSpPr>
         <p:spPr>
           <a:xfrm>
-            <a:off x="1792288" y="5367338"/>
-            <a:ext cx="5486400" cy="804862"/>
+            <a:off x="2743200" y="3453047"/>
+            <a:ext cx="5029200" cy="720804"/>
           </a:xfrm>
         </p:spPr>
         <p:txBody>
-          <a:bodyPr/>
+          <a:bodyPr anchor="ctr">
+            <a:normAutofit/>
+          </a:bodyPr>
           <a:lstStyle>
             <a:lvl1pPr marL="0" indent="0">
               <a:buNone/>
-              <a:defRPr sz="1400"/>
+              <a:defRPr sz="1600"/>
             </a:lvl1pPr>
             <a:lvl2pPr marL="457200" indent="0">
               <a:buNone/>
@@ -3271,7 +3410,78 @@
       </p:sp>
       <p:sp>
         <p:nvSpPr>
-          <p:cNvPr id="5" name="Date Placeholder 4"/>
+          <p:cNvPr id="9" name="TextBox 8"/>
+          <p:cNvSpPr txBox="1"/>
+          <p:nvPr/>
+        </p:nvSpPr>
+        <p:spPr>
+          <a:xfrm>
+            <a:off x="2435352" y="3331464"/>
+            <a:ext cx="457200" cy="923330"/>
+          </a:xfrm>
+          <a:prstGeom prst="rect">
+            <a:avLst/>
+          </a:prstGeom>
+          <a:noFill/>
+        </p:spPr>
+        <p:txBody>
+          <a:bodyPr wrap="square" lIns="0" tIns="0" rIns="0" bIns="0" rtlCol="0" anchor="t" anchorCtr="0">
+            <a:spAutoFit/>
+          </a:bodyPr>
+          <a:lstStyle/>
+          <a:p>
+            <a:r>
+              <a:rPr lang="en-US" sz="6000" dirty="0" smtClean="0">
+                <a:effectLst>
+                  <a:outerShdw blurRad="38100" dist="38100" dir="2700000" algn="tl">
+                    <a:srgbClr val="000000">
+                      <a:alpha val="43137"/>
+                    </a:srgbClr>
+                  </a:outerShdw>
+                </a:effectLst>
+                <a:latin typeface="+mn-lt"/>
+              </a:rPr>
+              <a:t>{</a:t>
+            </a:r>
+            <a:endParaRPr lang="en-US" sz="6000" dirty="0">
+              <a:effectLst>
+                <a:outerShdw blurRad="38100" dist="38100" dir="2700000" algn="tl">
+                  <a:srgbClr val="000000">
+                    <a:alpha val="43137"/>
+                  </a:srgbClr>
+                </a:outerShdw>
+              </a:effectLst>
+              <a:latin typeface="+mn-lt"/>
+            </a:endParaRPr>
+          </a:p>
+        </p:txBody>
+      </p:sp>
+      <p:sp>
+        <p:nvSpPr>
+          <p:cNvPr id="11" name="Title 10"/>
+          <p:cNvSpPr>
+            <a:spLocks noGrp="1"/>
+          </p:cNvSpPr>
+          <p:nvPr>
+            <p:ph type="title"/>
+          </p:nvPr>
+        </p:nvSpPr>
+        <p:spPr/>
+        <p:txBody>
+          <a:bodyPr/>
+          <a:lstStyle/>
+          <a:p>
+            <a:r>
+              <a:rPr lang="en-US" smtClean="0"/>
+              <a:t>Click to edit Master title style</a:t>
+            </a:r>
+            <a:endParaRPr lang="en-US"/>
+          </a:p>
+        </p:txBody>
+      </p:sp>
+      <p:sp>
+        <p:nvSpPr>
+          <p:cNvPr id="13" name="Date Placeholder 12"/>
           <p:cNvSpPr>
             <a:spLocks noGrp="1"/>
           </p:cNvSpPr>
@@ -3294,31 +3504,12 @@
       </p:sp>
       <p:sp>
         <p:nvSpPr>
-          <p:cNvPr id="6" name="Footer Placeholder 5"/>
-          <p:cNvSpPr>
-            <a:spLocks noGrp="1"/>
-          </p:cNvSpPr>
-          <p:nvPr>
-            <p:ph type="ftr" sz="quarter" idx="11"/>
-          </p:nvPr>
-        </p:nvSpPr>
-        <p:spPr/>
-        <p:txBody>
-          <a:bodyPr/>
-          <a:lstStyle/>
-          <a:p>
-            <a:endParaRPr lang="en-US"/>
-          </a:p>
-        </p:txBody>
-      </p:sp>
-      <p:sp>
-        <p:nvSpPr>
-          <p:cNvPr id="7" name="Slide Number Placeholder 6"/>
-          <p:cNvSpPr>
-            <a:spLocks noGrp="1"/>
-          </p:cNvSpPr>
-          <p:nvPr>
-            <p:ph type="sldNum" sz="quarter" idx="12"/>
+          <p:cNvPr id="14" name="Slide Number Placeholder 13"/>
+          <p:cNvSpPr>
+            <a:spLocks noGrp="1"/>
+          </p:cNvSpPr>
+          <p:nvPr>
+            <p:ph type="sldNum" sz="quarter" idx="11"/>
           </p:nvPr>
         </p:nvSpPr>
         <p:spPr/>
@@ -3334,12 +3525,26 @@
           </a:p>
         </p:txBody>
       </p:sp>
+      <p:sp>
+        <p:nvSpPr>
+          <p:cNvPr id="15" name="Footer Placeholder 14"/>
+          <p:cNvSpPr>
+            <a:spLocks noGrp="1"/>
+          </p:cNvSpPr>
+          <p:nvPr>
+            <p:ph type="ftr" sz="quarter" idx="12"/>
+          </p:nvPr>
+        </p:nvSpPr>
+        <p:spPr/>
+        <p:txBody>
+          <a:bodyPr/>
+          <a:lstStyle/>
+          <a:p>
+            <a:endParaRPr lang="en-US"/>
+          </a:p>
+        </p:txBody>
+      </p:sp>
     </p:spTree>
-    <p:extLst>
-      <p:ext uri="{BB962C8B-B14F-4D97-AF65-F5344CB8AC3E}">
-        <p14:creationId xmlns:p14="http://schemas.microsoft.com/office/powerpoint/2010/main" val="1282194586"/>
-      </p:ext>
-    </p:extLst>
   </p:cSld>
   <p:clrMapOvr>
     <a:masterClrMapping/>
@@ -3351,8 +3556,8 @@
 <p:sldMaster xmlns:a="http://schemas.openxmlformats.org/drawingml/2006/main" xmlns:r="http://schemas.openxmlformats.org/officeDocument/2006/relationships" xmlns:p="http://schemas.openxmlformats.org/presentationml/2006/main">
   <p:cSld>
     <p:bg>
-      <p:bgRef idx="1001">
-        <a:schemeClr val="bg1"/>
+      <p:bgRef idx="1003">
+        <a:schemeClr val="bg2"/>
       </p:bgRef>
     </p:bg>
     <p:spTree>
@@ -3371,26 +3576,274 @@
       </p:grpSpPr>
       <p:sp>
         <p:nvSpPr>
-          <p:cNvPr id="2" name="Title Placeholder 1"/>
-          <p:cNvSpPr>
-            <a:spLocks noGrp="1"/>
-          </p:cNvSpPr>
-          <p:nvPr>
-            <p:ph type="title"/>
-          </p:nvPr>
+          <p:cNvPr id="7" name="Rectangle 6"/>
+          <p:cNvSpPr/>
+          <p:nvPr/>
         </p:nvSpPr>
         <p:spPr>
           <a:xfrm>
-            <a:off x="457200" y="274638"/>
-            <a:ext cx="8229600" cy="1143000"/>
+            <a:off x="0" y="0"/>
+            <a:ext cx="9144000" cy="6858000"/>
+          </a:xfrm>
+          <a:prstGeom prst="rect">
+            <a:avLst/>
+          </a:prstGeom>
+          <a:gradFill>
+            <a:gsLst>
+              <a:gs pos="0">
+                <a:schemeClr val="accent6">
+                  <a:lumMod val="50000"/>
+                  <a:alpha val="36000"/>
+                </a:schemeClr>
+              </a:gs>
+              <a:gs pos="100000">
+                <a:schemeClr val="bg2">
+                  <a:alpha val="10000"/>
+                </a:schemeClr>
+              </a:gs>
+            </a:gsLst>
+            <a:lin ang="5400000" scaled="0"/>
+          </a:gradFill>
+          <a:ln>
+            <a:noFill/>
+          </a:ln>
+        </p:spPr>
+        <p:style>
+          <a:lnRef idx="2">
+            <a:schemeClr val="accent1">
+              <a:shade val="50000"/>
+            </a:schemeClr>
+          </a:lnRef>
+          <a:fillRef idx="1">
+            <a:schemeClr val="accent1"/>
+          </a:fillRef>
+          <a:effectRef idx="0">
+            <a:schemeClr val="accent1"/>
+          </a:effectRef>
+          <a:fontRef idx="minor">
+            <a:schemeClr val="lt1"/>
+          </a:fontRef>
+        </p:style>
+        <p:txBody>
+          <a:bodyPr rtlCol="0" anchor="ctr"/>
+          <a:lstStyle/>
+          <a:p>
+            <a:pPr algn="ctr"/>
+            <a:endParaRPr lang="en-US"/>
+          </a:p>
+        </p:txBody>
+      </p:sp>
+      <p:sp>
+        <p:nvSpPr>
+          <p:cNvPr id="8" name="Oval 7"/>
+          <p:cNvSpPr/>
+          <p:nvPr/>
+        </p:nvSpPr>
+        <p:spPr>
+          <a:xfrm rot="19724275">
+            <a:off x="1373221" y="1038440"/>
+            <a:ext cx="7240620" cy="5706987"/>
+          </a:xfrm>
+          <a:prstGeom prst="ellipse">
+            <a:avLst/>
+          </a:prstGeom>
+          <a:gradFill flip="none" rotWithShape="1">
+            <a:gsLst>
+              <a:gs pos="0">
+                <a:schemeClr val="accent6">
+                  <a:lumMod val="60000"/>
+                  <a:lumOff val="40000"/>
+                  <a:alpha val="7000"/>
+                </a:schemeClr>
+              </a:gs>
+              <a:gs pos="58000">
+                <a:schemeClr val="bg2">
+                  <a:alpha val="0"/>
+                </a:schemeClr>
+              </a:gs>
+            </a:gsLst>
+            <a:path path="circle">
+              <a:fillToRect l="50000" t="50000" r="50000" b="50000"/>
+            </a:path>
+            <a:tileRect/>
+          </a:gradFill>
+          <a:ln>
+            <a:noFill/>
+          </a:ln>
+        </p:spPr>
+        <p:style>
+          <a:lnRef idx="2">
+            <a:schemeClr val="accent1">
+              <a:shade val="50000"/>
+            </a:schemeClr>
+          </a:lnRef>
+          <a:fillRef idx="1">
+            <a:schemeClr val="accent1"/>
+          </a:fillRef>
+          <a:effectRef idx="0">
+            <a:schemeClr val="accent1"/>
+          </a:effectRef>
+          <a:fontRef idx="minor">
+            <a:schemeClr val="lt1"/>
+          </a:fontRef>
+        </p:style>
+        <p:txBody>
+          <a:bodyPr rtlCol="0" anchor="ctr"/>
+          <a:lstStyle/>
+          <a:p>
+            <a:pPr algn="ctr"/>
+            <a:endParaRPr lang="en-US"/>
+          </a:p>
+        </p:txBody>
+      </p:sp>
+      <p:sp>
+        <p:nvSpPr>
+          <p:cNvPr id="9" name="Oval 8"/>
+          <p:cNvSpPr/>
+          <p:nvPr/>
+        </p:nvSpPr>
+        <p:spPr>
+          <a:xfrm rot="17656910">
+            <a:off x="-274211" y="1165875"/>
+            <a:ext cx="5538472" cy="4480459"/>
+          </a:xfrm>
+          <a:prstGeom prst="ellipse">
+            <a:avLst/>
+          </a:prstGeom>
+          <a:gradFill flip="none" rotWithShape="1">
+            <a:gsLst>
+              <a:gs pos="0">
+                <a:schemeClr val="accent6">
+                  <a:lumMod val="60000"/>
+                  <a:lumOff val="40000"/>
+                  <a:alpha val="8000"/>
+                </a:schemeClr>
+              </a:gs>
+              <a:gs pos="58000">
+                <a:schemeClr val="bg2">
+                  <a:alpha val="0"/>
+                </a:schemeClr>
+              </a:gs>
+            </a:gsLst>
+            <a:path path="circle">
+              <a:fillToRect l="50000" t="50000" r="50000" b="50000"/>
+            </a:path>
+            <a:tileRect/>
+          </a:gradFill>
+          <a:ln>
+            <a:noFill/>
+          </a:ln>
+        </p:spPr>
+        <p:style>
+          <a:lnRef idx="2">
+            <a:schemeClr val="accent1">
+              <a:shade val="50000"/>
+            </a:schemeClr>
+          </a:lnRef>
+          <a:fillRef idx="1">
+            <a:schemeClr val="accent1"/>
+          </a:fillRef>
+          <a:effectRef idx="0">
+            <a:schemeClr val="accent1"/>
+          </a:effectRef>
+          <a:fontRef idx="minor">
+            <a:schemeClr val="lt1"/>
+          </a:fontRef>
+        </p:style>
+        <p:txBody>
+          <a:bodyPr rtlCol="0" anchor="ctr"/>
+          <a:lstStyle/>
+          <a:p>
+            <a:pPr algn="ctr"/>
+            <a:endParaRPr lang="en-US"/>
+          </a:p>
+        </p:txBody>
+      </p:sp>
+      <p:sp>
+        <p:nvSpPr>
+          <p:cNvPr id="10" name="Oval 9"/>
+          <p:cNvSpPr/>
+          <p:nvPr/>
+        </p:nvSpPr>
+        <p:spPr>
+          <a:xfrm rot="19724275">
+            <a:off x="3277955" y="116854"/>
+            <a:ext cx="6479362" cy="4754757"/>
+          </a:xfrm>
+          <a:prstGeom prst="ellipse">
+            <a:avLst/>
+          </a:prstGeom>
+          <a:gradFill flip="none" rotWithShape="1">
+            <a:gsLst>
+              <a:gs pos="0">
+                <a:schemeClr val="accent6">
+                  <a:lumMod val="60000"/>
+                  <a:lumOff val="40000"/>
+                  <a:alpha val="8000"/>
+                </a:schemeClr>
+              </a:gs>
+              <a:gs pos="58000">
+                <a:schemeClr val="bg2">
+                  <a:alpha val="0"/>
+                </a:schemeClr>
+              </a:gs>
+            </a:gsLst>
+            <a:path path="circle">
+              <a:fillToRect l="50000" t="50000" r="50000" b="50000"/>
+            </a:path>
+            <a:tileRect/>
+          </a:gradFill>
+          <a:ln>
+            <a:noFill/>
+          </a:ln>
+        </p:spPr>
+        <p:style>
+          <a:lnRef idx="2">
+            <a:schemeClr val="accent1">
+              <a:shade val="50000"/>
+            </a:schemeClr>
+          </a:lnRef>
+          <a:fillRef idx="1">
+            <a:schemeClr val="accent1"/>
+          </a:fillRef>
+          <a:effectRef idx="0">
+            <a:schemeClr val="accent1"/>
+          </a:effectRef>
+          <a:fontRef idx="minor">
+            <a:schemeClr val="lt1"/>
+          </a:fontRef>
+        </p:style>
+        <p:txBody>
+          <a:bodyPr rtlCol="0" anchor="ctr"/>
+          <a:lstStyle/>
+          <a:p>
+            <a:pPr algn="ctr"/>
+            <a:endParaRPr lang="en-US"/>
+          </a:p>
+        </p:txBody>
+      </p:sp>
+      <p:sp>
+        <p:nvSpPr>
+          <p:cNvPr id="2" name="Title Placeholder 1"/>
+          <p:cNvSpPr>
+            <a:spLocks noGrp="1"/>
+          </p:cNvSpPr>
+          <p:nvPr>
+            <p:ph type="title"/>
+          </p:nvPr>
+        </p:nvSpPr>
+        <p:spPr>
+          <a:xfrm>
+            <a:off x="777240" y="4876800"/>
+            <a:ext cx="7543800" cy="914400"/>
           </a:xfrm>
           <a:prstGeom prst="rect">
             <a:avLst/>
           </a:prstGeom>
         </p:spPr>
         <p:txBody>
-          <a:bodyPr vert="horz" lIns="91440" tIns="45720" rIns="91440" bIns="45720" rtlCol="0" anchor="ctr">
-            <a:normAutofit/>
+          <a:bodyPr vert="horz" lIns="91440" tIns="45720" rIns="91440" bIns="45720" rtlCol="0" anchor="b">
+            <a:noAutofit/>
           </a:bodyPr>
           <a:lstStyle/>
           <a:p>
@@ -3398,7 +3851,7 @@
               <a:rPr lang="en-US" smtClean="0"/>
               <a:t>Click to edit Master title style</a:t>
             </a:r>
-            <a:endParaRPr lang="en-US"/>
+            <a:endParaRPr lang="en-US" dirty="0"/>
           </a:p>
         </p:txBody>
       </p:sp>
@@ -3414,15 +3867,15 @@
         </p:nvSpPr>
         <p:spPr>
           <a:xfrm>
-            <a:off x="457200" y="1600200"/>
-            <a:ext cx="8229600" cy="4525963"/>
+            <a:off x="2133600" y="685801"/>
+            <a:ext cx="6096000" cy="3657599"/>
           </a:xfrm>
           <a:prstGeom prst="rect">
             <a:avLst/>
           </a:prstGeom>
         </p:spPr>
         <p:txBody>
-          <a:bodyPr vert="horz" lIns="91440" tIns="45720" rIns="91440" bIns="45720" rtlCol="0">
+          <a:bodyPr vert="horz" lIns="91440" tIns="45720" rIns="91440" bIns="45720" rtlCol="0" anchor="ctr">
             <a:normAutofit/>
           </a:bodyPr>
           <a:lstStyle/>
@@ -3460,7 +3913,7 @@
               <a:rPr lang="en-US" smtClean="0"/>
               <a:t>Fifth level</a:t>
             </a:r>
-            <a:endParaRPr lang="en-US"/>
+            <a:endParaRPr lang="en-US" dirty="0"/>
           </a:p>
         </p:txBody>
       </p:sp>
@@ -3476,7 +3929,7 @@
         </p:nvSpPr>
         <p:spPr>
           <a:xfrm>
-            <a:off x="457200" y="6356350"/>
+            <a:off x="6172200" y="6154738"/>
             <a:ext cx="2133600" cy="365125"/>
           </a:xfrm>
           <a:prstGeom prst="rect">
@@ -3484,15 +3937,16 @@
           </a:prstGeom>
         </p:spPr>
         <p:txBody>
-          <a:bodyPr vert="horz" lIns="91440" tIns="45720" rIns="91440" bIns="45720" rtlCol="0" anchor="ctr"/>
+          <a:bodyPr vert="horz" lIns="91440" tIns="45720" rIns="91440" bIns="45720" rtlCol="0" anchor="t"/>
           <a:lstStyle>
-            <a:lvl1pPr algn="l">
-              <a:defRPr sz="1200">
+            <a:lvl1pPr algn="r">
+              <a:defRPr sz="1100">
                 <a:solidFill>
                   <a:schemeClr val="tx1">
-                    <a:tint val="75000"/>
+                    <a:alpha val="60000"/>
                   </a:schemeClr>
                 </a:solidFill>
+                <a:effectLst/>
               </a:defRPr>
             </a:lvl1pPr>
           </a:lstStyle>
@@ -3517,23 +3971,24 @@
         </p:nvSpPr>
         <p:spPr>
           <a:xfrm>
-            <a:off x="3124200" y="6356350"/>
-            <a:ext cx="2895600" cy="365125"/>
+            <a:off x="822960" y="6154738"/>
+            <a:ext cx="4572000" cy="365125"/>
           </a:xfrm>
           <a:prstGeom prst="rect">
             <a:avLst/>
           </a:prstGeom>
         </p:spPr>
         <p:txBody>
-          <a:bodyPr vert="horz" lIns="91440" tIns="45720" rIns="91440" bIns="45720" rtlCol="0" anchor="ctr"/>
+          <a:bodyPr vert="horz" lIns="91440" tIns="45720" rIns="91440" bIns="45720" rtlCol="0" anchor="t"/>
           <a:lstStyle>
-            <a:lvl1pPr algn="ctr">
-              <a:defRPr sz="1200">
+            <a:lvl1pPr algn="l">
+              <a:defRPr sz="1100">
                 <a:solidFill>
                   <a:schemeClr val="tx1">
-                    <a:tint val="75000"/>
+                    <a:alpha val="60000"/>
                   </a:schemeClr>
                 </a:solidFill>
+                <a:effectLst/>
               </a:defRPr>
             </a:lvl1pPr>
           </a:lstStyle>
@@ -3554,23 +4009,24 @@
         </p:nvSpPr>
         <p:spPr>
           <a:xfrm>
-            <a:off x="6553200" y="6356350"/>
-            <a:ext cx="2133600" cy="365125"/>
+            <a:off x="822960" y="5842000"/>
+            <a:ext cx="2133600" cy="304800"/>
           </a:xfrm>
           <a:prstGeom prst="rect">
             <a:avLst/>
           </a:prstGeom>
         </p:spPr>
         <p:txBody>
-          <a:bodyPr vert="horz" lIns="91440" tIns="45720" rIns="91440" bIns="45720" rtlCol="0" anchor="ctr"/>
+          <a:bodyPr vert="horz" lIns="91440" tIns="45720" rIns="91440" bIns="9144" rtlCol="0" anchor="b"/>
           <a:lstStyle>
-            <a:lvl1pPr algn="r">
-              <a:defRPr sz="1200">
+            <a:lvl1pPr algn="l">
+              <a:defRPr sz="1600">
                 <a:solidFill>
                   <a:schemeClr val="tx1">
-                    <a:tint val="75000"/>
+                    <a:alpha val="60000"/>
                   </a:schemeClr>
                 </a:solidFill>
+                <a:effectLst/>
               </a:defRPr>
             </a:lvl1pPr>
           </a:lstStyle>
@@ -3584,174 +4040,307 @@
         </p:txBody>
       </p:sp>
     </p:spTree>
-    <p:extLst>
-      <p:ext uri="{BB962C8B-B14F-4D97-AF65-F5344CB8AC3E}">
-        <p14:creationId xmlns:p14="http://schemas.microsoft.com/office/powerpoint/2010/main" val="2420413105"/>
-      </p:ext>
-    </p:extLst>
   </p:cSld>
-  <p:clrMap bg1="lt1" tx1="dk1" bg2="lt2" tx2="dk2" accent1="accent1" accent2="accent2" accent3="accent3" accent4="accent4" accent5="accent5" accent6="accent6" hlink="hlink" folHlink="folHlink"/>
+  <p:clrMap bg1="dk1" tx1="lt1" bg2="dk2" tx2="lt2" accent1="accent1" accent2="accent2" accent3="accent3" accent4="accent4" accent5="accent5" accent6="accent6" hlink="hlink" folHlink="folHlink"/>
   <p:sldLayoutIdLst>
-    <p:sldLayoutId id="2147483649" r:id="rId1"/>
-    <p:sldLayoutId id="2147483650" r:id="rId2"/>
-    <p:sldLayoutId id="2147483651" r:id="rId3"/>
-    <p:sldLayoutId id="2147483652" r:id="rId4"/>
-    <p:sldLayoutId id="2147483653" r:id="rId5"/>
-    <p:sldLayoutId id="2147483654" r:id="rId6"/>
-    <p:sldLayoutId id="2147483655" r:id="rId7"/>
-    <p:sldLayoutId id="2147483656" r:id="rId8"/>
-    <p:sldLayoutId id="2147483657" r:id="rId9"/>
-    <p:sldLayoutId id="2147483658" r:id="rId10"/>
-    <p:sldLayoutId id="2147483659" r:id="rId11"/>
+    <p:sldLayoutId id="2147483661" r:id="rId1"/>
+    <p:sldLayoutId id="2147483662" r:id="rId2"/>
+    <p:sldLayoutId id="2147483663" r:id="rId3"/>
+    <p:sldLayoutId id="2147483664" r:id="rId4"/>
+    <p:sldLayoutId id="2147483665" r:id="rId5"/>
+    <p:sldLayoutId id="2147483666" r:id="rId6"/>
+    <p:sldLayoutId id="2147483667" r:id="rId7"/>
+    <p:sldLayoutId id="2147483668" r:id="rId8"/>
+    <p:sldLayoutId id="2147483669" r:id="rId9"/>
+    <p:sldLayoutId id="2147483670" r:id="rId10"/>
+    <p:sldLayoutId id="2147483671" r:id="rId11"/>
   </p:sldLayoutIdLst>
   <p:txStyles>
     <p:titleStyle>
-      <a:lvl1pPr algn="ctr" defTabSz="914400" rtl="0" eaLnBrk="1" latinLnBrk="0" hangingPunct="1">
+      <a:lvl1pPr algn="l" defTabSz="914400" rtl="0" eaLnBrk="1" latinLnBrk="0" hangingPunct="1">
         <a:spcBef>
           <a:spcPct val="0"/>
         </a:spcBef>
         <a:buNone/>
-        <a:defRPr sz="4400" kern="1200">
+        <a:defRPr sz="4900" kern="1200">
           <a:solidFill>
             <a:schemeClr val="tx1"/>
           </a:solidFill>
+          <a:effectLst>
+            <a:outerShdw blurRad="38100" dist="38100" dir="2700000" algn="tl">
+              <a:srgbClr val="000000">
+                <a:alpha val="43137"/>
+              </a:srgbClr>
+            </a:outerShdw>
+          </a:effectLst>
           <a:latin typeface="+mj-lt"/>
           <a:ea typeface="+mj-ea"/>
           <a:cs typeface="+mj-cs"/>
         </a:defRPr>
       </a:lvl1pPr>
+      <a:lvl2pPr eaLnBrk="1" hangingPunct="1">
+        <a:defRPr>
+          <a:solidFill>
+            <a:schemeClr val="tx2"/>
+          </a:solidFill>
+        </a:defRPr>
+      </a:lvl2pPr>
+      <a:lvl3pPr eaLnBrk="1" hangingPunct="1">
+        <a:defRPr>
+          <a:solidFill>
+            <a:schemeClr val="tx2"/>
+          </a:solidFill>
+        </a:defRPr>
+      </a:lvl3pPr>
+      <a:lvl4pPr eaLnBrk="1" hangingPunct="1">
+        <a:defRPr>
+          <a:solidFill>
+            <a:schemeClr val="tx2"/>
+          </a:solidFill>
+        </a:defRPr>
+      </a:lvl4pPr>
+      <a:lvl5pPr eaLnBrk="1" hangingPunct="1">
+        <a:defRPr>
+          <a:solidFill>
+            <a:schemeClr val="tx2"/>
+          </a:solidFill>
+        </a:defRPr>
+      </a:lvl5pPr>
+      <a:lvl6pPr eaLnBrk="1" hangingPunct="1">
+        <a:defRPr>
+          <a:solidFill>
+            <a:schemeClr val="tx2"/>
+          </a:solidFill>
+        </a:defRPr>
+      </a:lvl6pPr>
+      <a:lvl7pPr eaLnBrk="1" hangingPunct="1">
+        <a:defRPr>
+          <a:solidFill>
+            <a:schemeClr val="tx2"/>
+          </a:solidFill>
+        </a:defRPr>
+      </a:lvl7pPr>
+      <a:lvl8pPr eaLnBrk="1" hangingPunct="1">
+        <a:defRPr>
+          <a:solidFill>
+            <a:schemeClr val="tx2"/>
+          </a:solidFill>
+        </a:defRPr>
+      </a:lvl8pPr>
+      <a:lvl9pPr eaLnBrk="1" hangingPunct="1">
+        <a:defRPr>
+          <a:solidFill>
+            <a:schemeClr val="tx2"/>
+          </a:solidFill>
+        </a:defRPr>
+      </a:lvl9pPr>
     </p:titleStyle>
     <p:bodyStyle>
-      <a:lvl1pPr marL="342900" indent="-342900" algn="l" defTabSz="914400" rtl="0" eaLnBrk="1" latinLnBrk="0" hangingPunct="1">
+      <a:lvl1pPr marL="274320" indent="-256032" algn="l" defTabSz="914400" rtl="0" eaLnBrk="1" latinLnBrk="0" hangingPunct="1">
         <a:spcBef>
           <a:spcPct val="20000"/>
         </a:spcBef>
-        <a:buFont typeface="Arial" pitchFamily="34" charset="0"/>
-        <a:buChar char="•"/>
-        <a:defRPr sz="3200" kern="1200">
+        <a:spcAft>
+          <a:spcPts val="0"/>
+        </a:spcAft>
+        <a:buSzPct val="60000"/>
+        <a:buFont typeface="Wingdings" pitchFamily="2" charset="2"/>
+        <a:buChar char=""/>
+        <a:defRPr sz="2100" kern="1200">
           <a:solidFill>
             <a:schemeClr val="tx1"/>
           </a:solidFill>
+          <a:effectLst>
+            <a:outerShdw blurRad="38100" dist="38100" dir="2700000" algn="tl">
+              <a:srgbClr val="000000">
+                <a:alpha val="43137"/>
+              </a:srgbClr>
+            </a:outerShdw>
+          </a:effectLst>
           <a:latin typeface="+mn-lt"/>
           <a:ea typeface="+mn-ea"/>
           <a:cs typeface="+mn-cs"/>
         </a:defRPr>
       </a:lvl1pPr>
-      <a:lvl2pPr marL="742950" indent="-285750" algn="l" defTabSz="914400" rtl="0" eaLnBrk="1" latinLnBrk="0" hangingPunct="1">
+      <a:lvl2pPr marL="640080" indent="-256032" algn="l" defTabSz="914400" rtl="0" eaLnBrk="1" latinLnBrk="0" hangingPunct="1">
         <a:spcBef>
           <a:spcPct val="20000"/>
         </a:spcBef>
-        <a:buFont typeface="Arial" pitchFamily="34" charset="0"/>
-        <a:buChar char="–"/>
-        <a:defRPr sz="2800" kern="1200">
+        <a:buSzPct val="60000"/>
+        <a:buFont typeface="Wingdings" pitchFamily="2" charset="2"/>
+        <a:buChar char=""/>
+        <a:defRPr sz="1900" kern="1200">
           <a:solidFill>
             <a:schemeClr val="tx1"/>
           </a:solidFill>
+          <a:effectLst>
+            <a:outerShdw blurRad="38100" dist="38100" dir="2700000" algn="tl">
+              <a:srgbClr val="000000">
+                <a:alpha val="43137"/>
+              </a:srgbClr>
+            </a:outerShdw>
+          </a:effectLst>
           <a:latin typeface="+mn-lt"/>
           <a:ea typeface="+mn-ea"/>
           <a:cs typeface="+mn-cs"/>
         </a:defRPr>
       </a:lvl2pPr>
-      <a:lvl3pPr marL="1143000" indent="-228600" algn="l" defTabSz="914400" rtl="0" eaLnBrk="1" latinLnBrk="0" hangingPunct="1">
+      <a:lvl3pPr marL="1005840" indent="-256032" algn="l" defTabSz="914400" rtl="0" eaLnBrk="1" latinLnBrk="0" hangingPunct="1">
         <a:spcBef>
           <a:spcPct val="20000"/>
         </a:spcBef>
-        <a:buFont typeface="Arial" pitchFamily="34" charset="0"/>
-        <a:buChar char="•"/>
-        <a:defRPr sz="2400" kern="1200">
+        <a:buSzPct val="60000"/>
+        <a:buFont typeface="Wingdings" pitchFamily="2" charset="2"/>
+        <a:buChar char=""/>
+        <a:defRPr sz="1700" kern="1200">
           <a:solidFill>
             <a:schemeClr val="tx1"/>
           </a:solidFill>
+          <a:effectLst>
+            <a:outerShdw blurRad="38100" dist="38100" dir="2700000" algn="tl">
+              <a:srgbClr val="000000">
+                <a:alpha val="43137"/>
+              </a:srgbClr>
+            </a:outerShdw>
+          </a:effectLst>
           <a:latin typeface="+mn-lt"/>
           <a:ea typeface="+mn-ea"/>
           <a:cs typeface="+mn-cs"/>
         </a:defRPr>
       </a:lvl3pPr>
-      <a:lvl4pPr marL="1600200" indent="-228600" algn="l" defTabSz="914400" rtl="0" eaLnBrk="1" latinLnBrk="0" hangingPunct="1">
+      <a:lvl4pPr marL="1371600" indent="-256032" algn="l" defTabSz="914400" rtl="0" eaLnBrk="1" latinLnBrk="0" hangingPunct="1">
         <a:spcBef>
           <a:spcPct val="20000"/>
         </a:spcBef>
-        <a:buFont typeface="Arial" pitchFamily="34" charset="0"/>
-        <a:buChar char="–"/>
-        <a:defRPr sz="2000" kern="1200">
+        <a:buSzPct val="60000"/>
+        <a:buFont typeface="Wingdings" pitchFamily="2" charset="2"/>
+        <a:buChar char=""/>
+        <a:defRPr sz="1600" kern="1200">
           <a:solidFill>
             <a:schemeClr val="tx1"/>
           </a:solidFill>
+          <a:effectLst>
+            <a:outerShdw blurRad="38100" dist="38100" dir="2700000" algn="tl">
+              <a:srgbClr val="000000">
+                <a:alpha val="43137"/>
+              </a:srgbClr>
+            </a:outerShdw>
+          </a:effectLst>
           <a:latin typeface="+mn-lt"/>
           <a:ea typeface="+mn-ea"/>
           <a:cs typeface="+mn-cs"/>
         </a:defRPr>
       </a:lvl4pPr>
-      <a:lvl5pPr marL="2057400" indent="-228600" algn="l" defTabSz="914400" rtl="0" eaLnBrk="1" latinLnBrk="0" hangingPunct="1">
+      <a:lvl5pPr marL="1645920" indent="-256032" algn="l" defTabSz="914400" rtl="0" eaLnBrk="1" latinLnBrk="0" hangingPunct="1">
         <a:spcBef>
           <a:spcPct val="20000"/>
         </a:spcBef>
-        <a:buFont typeface="Arial" pitchFamily="34" charset="0"/>
-        <a:buChar char="»"/>
-        <a:defRPr sz="2000" kern="1200">
+        <a:buSzPct val="60000"/>
+        <a:buFont typeface="Wingdings" pitchFamily="2" charset="2"/>
+        <a:buChar char=""/>
+        <a:defRPr sz="1500" kern="1200">
           <a:solidFill>
             <a:schemeClr val="tx1"/>
           </a:solidFill>
+          <a:effectLst>
+            <a:outerShdw blurRad="38100" dist="38100" dir="2700000" algn="tl">
+              <a:srgbClr val="000000">
+                <a:alpha val="43137"/>
+              </a:srgbClr>
+            </a:outerShdw>
+          </a:effectLst>
           <a:latin typeface="+mn-lt"/>
           <a:ea typeface="+mn-ea"/>
           <a:cs typeface="+mn-cs"/>
         </a:defRPr>
       </a:lvl5pPr>
-      <a:lvl6pPr marL="2514600" indent="-228600" algn="l" defTabSz="914400" rtl="0" eaLnBrk="1" latinLnBrk="0" hangingPunct="1">
+      <a:lvl6pPr marL="1965960" indent="-256032" algn="l" defTabSz="914400" rtl="0" eaLnBrk="1" latinLnBrk="0" hangingPunct="1">
         <a:spcBef>
           <a:spcPct val="20000"/>
         </a:spcBef>
-        <a:buFont typeface="Arial" pitchFamily="34" charset="0"/>
-        <a:buChar char="•"/>
-        <a:defRPr sz="2000" kern="1200">
+        <a:buSzPct val="60000"/>
+        <a:buFont typeface="Wingdings" pitchFamily="2" charset="2"/>
+        <a:buChar char=""/>
+        <a:defRPr sz="1400" kern="1200">
           <a:solidFill>
             <a:schemeClr val="tx1"/>
           </a:solidFill>
+          <a:effectLst>
+            <a:outerShdw blurRad="38100" dist="38100" dir="2700000" algn="ctr" rotWithShape="0">
+              <a:srgbClr val="000000">
+                <a:alpha val="43000"/>
+              </a:srgbClr>
+            </a:outerShdw>
+          </a:effectLst>
           <a:latin typeface="+mn-lt"/>
           <a:ea typeface="+mn-ea"/>
           <a:cs typeface="+mn-cs"/>
         </a:defRPr>
       </a:lvl6pPr>
-      <a:lvl7pPr marL="2971800" indent="-228600" algn="l" defTabSz="914400" rtl="0" eaLnBrk="1" latinLnBrk="0" hangingPunct="1">
+      <a:lvl7pPr marL="2240280" indent="-256032" algn="l" defTabSz="914400" rtl="0" eaLnBrk="1" latinLnBrk="0" hangingPunct="1">
         <a:spcBef>
           <a:spcPct val="20000"/>
         </a:spcBef>
-        <a:buFont typeface="Arial" pitchFamily="34" charset="0"/>
-        <a:buChar char="•"/>
-        <a:defRPr sz="2000" kern="1200">
+        <a:buSzPct val="60000"/>
+        <a:buFont typeface="Wingdings" pitchFamily="2" charset="2"/>
+        <a:buChar char=""/>
+        <a:defRPr sz="1400" kern="1200">
           <a:solidFill>
             <a:schemeClr val="tx1"/>
           </a:solidFill>
+          <a:effectLst>
+            <a:outerShdw blurRad="38100" dist="38100" dir="2700000" algn="ctr" rotWithShape="0">
+              <a:srgbClr val="000000">
+                <a:alpha val="43000"/>
+              </a:srgbClr>
+            </a:outerShdw>
+          </a:effectLst>
           <a:latin typeface="+mn-lt"/>
           <a:ea typeface="+mn-ea"/>
           <a:cs typeface="+mn-cs"/>
         </a:defRPr>
       </a:lvl7pPr>
-      <a:lvl8pPr marL="3429000" indent="-228600" algn="l" defTabSz="914400" rtl="0" eaLnBrk="1" latinLnBrk="0" hangingPunct="1">
+      <a:lvl8pPr marL="2514600" indent="-256032" algn="l" defTabSz="914400" rtl="0" eaLnBrk="1" latinLnBrk="0" hangingPunct="1">
         <a:spcBef>
           <a:spcPct val="20000"/>
         </a:spcBef>
-        <a:buFont typeface="Arial" pitchFamily="34" charset="0"/>
-        <a:buChar char="•"/>
-        <a:defRPr sz="2000" kern="1200">
+        <a:buSzPct val="60000"/>
+        <a:buFont typeface="Wingdings" pitchFamily="2" charset="2"/>
+        <a:buChar char=""/>
+        <a:defRPr sz="1400" kern="1200">
           <a:solidFill>
             <a:schemeClr val="tx1"/>
           </a:solidFill>
+          <a:effectLst>
+            <a:outerShdw blurRad="38100" dist="38100" dir="2700000" algn="ctr" rotWithShape="0">
+              <a:srgbClr val="000000">
+                <a:alpha val="43000"/>
+              </a:srgbClr>
+            </a:outerShdw>
+          </a:effectLst>
           <a:latin typeface="+mn-lt"/>
           <a:ea typeface="+mn-ea"/>
           <a:cs typeface="+mn-cs"/>
         </a:defRPr>
       </a:lvl8pPr>
-      <a:lvl9pPr marL="3886200" indent="-228600" algn="l" defTabSz="914400" rtl="0" eaLnBrk="1" latinLnBrk="0" hangingPunct="1">
+      <a:lvl9pPr marL="2834640" indent="-256032" algn="l" defTabSz="914400" rtl="0" eaLnBrk="1" latinLnBrk="0" hangingPunct="1">
         <a:spcBef>
           <a:spcPct val="20000"/>
         </a:spcBef>
-        <a:buFont typeface="Arial" pitchFamily="34" charset="0"/>
-        <a:buChar char="•"/>
-        <a:defRPr sz="2000" kern="1200">
+        <a:buSzPct val="60000"/>
+        <a:buFont typeface="Wingdings" pitchFamily="2" charset="2"/>
+        <a:buChar char=""/>
+        <a:defRPr sz="1400" kern="1200">
           <a:solidFill>
             <a:schemeClr val="tx1"/>
           </a:solidFill>
+          <a:effectLst>
+            <a:outerShdw blurRad="38100" dist="38100" dir="2700000" algn="ctr" rotWithShape="0">
+              <a:srgbClr val="000000">
+                <a:alpha val="43000"/>
+              </a:srgbClr>
+            </a:outerShdw>
+          </a:effectLst>
           <a:latin typeface="+mn-lt"/>
           <a:ea typeface="+mn-ea"/>
           <a:cs typeface="+mn-cs"/>
@@ -3909,7 +4498,9 @@
         </p:nvSpPr>
         <p:spPr/>
         <p:txBody>
-          <a:bodyPr/>
+          <a:bodyPr>
+            <a:normAutofit lnSpcReduction="10000"/>
+          </a:bodyPr>
           <a:lstStyle/>
           <a:p>
             <a:r>
@@ -3930,6 +4521,13 @@
   <p:clrMapOvr>
     <a:masterClrMapping/>
   </p:clrMapOvr>
+  <p:timing>
+    <p:tnLst>
+      <p:par>
+        <p:cTn id="1" dur="indefinite" restart="never" nodeType="tmRoot"/>
+      </p:par>
+    </p:tnLst>
+  </p:timing>
 </p:sld>
 </file>
 
@@ -3952,29 +4550,6 @@
       </p:grpSpPr>
       <p:sp>
         <p:nvSpPr>
-          <p:cNvPr id="2" name="Title 1"/>
-          <p:cNvSpPr>
-            <a:spLocks noGrp="1"/>
-          </p:cNvSpPr>
-          <p:nvPr>
-            <p:ph type="title"/>
-          </p:nvPr>
-        </p:nvSpPr>
-        <p:spPr/>
-        <p:txBody>
-          <a:bodyPr/>
-          <a:lstStyle/>
-          <a:p>
-            <a:r>
-              <a:rPr lang="en-US" dirty="0" smtClean="0"/>
-              <a:t>Problem</a:t>
-            </a:r>
-            <a:endParaRPr lang="en-US" dirty="0"/>
-          </a:p>
-        </p:txBody>
-      </p:sp>
-      <p:sp>
-        <p:nvSpPr>
           <p:cNvPr id="3" name="Content Placeholder 2"/>
           <p:cNvSpPr>
             <a:spLocks noGrp="1"/>
@@ -4024,6 +4599,29 @@
             <a:r>
               <a:rPr lang="en-US" dirty="0" smtClean="0"/>
               <a:t>Consistent game information</a:t>
+            </a:r>
+            <a:endParaRPr lang="en-US" dirty="0"/>
+          </a:p>
+        </p:txBody>
+      </p:sp>
+      <p:sp>
+        <p:nvSpPr>
+          <p:cNvPr id="2" name="Title 1"/>
+          <p:cNvSpPr>
+            <a:spLocks noGrp="1"/>
+          </p:cNvSpPr>
+          <p:nvPr>
+            <p:ph type="title"/>
+          </p:nvPr>
+        </p:nvSpPr>
+        <p:spPr/>
+        <p:txBody>
+          <a:bodyPr/>
+          <a:lstStyle/>
+          <a:p>
+            <a:r>
+              <a:rPr lang="en-US" dirty="0" smtClean="0"/>
+              <a:t>Problem</a:t>
             </a:r>
             <a:endParaRPr lang="en-US" dirty="0"/>
           </a:p>
@@ -4039,6 +4637,13 @@
   <p:clrMapOvr>
     <a:masterClrMapping/>
   </p:clrMapOvr>
+  <p:timing>
+    <p:tnLst>
+      <p:par>
+        <p:cTn id="1" dur="indefinite" restart="never" nodeType="tmRoot"/>
+      </p:par>
+    </p:tnLst>
+  </p:timing>
 </p:sld>
 </file>
 
@@ -4061,6 +4666,80 @@
       </p:grpSpPr>
       <p:sp>
         <p:nvSpPr>
+          <p:cNvPr id="3" name="Content Placeholder 2"/>
+          <p:cNvSpPr>
+            <a:spLocks noGrp="1"/>
+          </p:cNvSpPr>
+          <p:nvPr>
+            <p:ph idx="1"/>
+          </p:nvPr>
+        </p:nvSpPr>
+        <p:spPr>
+          <a:xfrm>
+            <a:off x="2133600" y="1219200"/>
+            <a:ext cx="6096000" cy="3124200"/>
+          </a:xfrm>
+        </p:spPr>
+        <p:txBody>
+          <a:bodyPr/>
+          <a:lstStyle/>
+          <a:p>
+            <a:pPr marL="0" indent="0">
+              <a:buNone/>
+            </a:pPr>
+            <a:r>
+              <a:rPr lang="en-US" dirty="0" smtClean="0"/>
+              <a:t>SSBB Management </a:t>
+            </a:r>
+            <a:r>
+              <a:rPr lang="en-US" dirty="0" smtClean="0"/>
+              <a:t>System!</a:t>
+            </a:r>
+          </a:p>
+          <a:p>
+            <a:pPr marL="0" indent="0">
+              <a:buNone/>
+            </a:pPr>
+            <a:endParaRPr lang="en-US" dirty="0" smtClean="0"/>
+          </a:p>
+          <a:p>
+            <a:pPr marL="0" indent="0">
+              <a:buNone/>
+            </a:pPr>
+            <a:endParaRPr lang="en-US" dirty="0"/>
+          </a:p>
+          <a:p>
+            <a:pPr marL="0" indent="0">
+              <a:buNone/>
+            </a:pPr>
+            <a:endParaRPr lang="en-US" dirty="0" smtClean="0"/>
+          </a:p>
+          <a:p>
+            <a:pPr marL="0" indent="0">
+              <a:buNone/>
+            </a:pPr>
+            <a:endParaRPr lang="en-US" dirty="0" smtClean="0"/>
+          </a:p>
+          <a:p>
+            <a:pPr marL="0" indent="0">
+              <a:buNone/>
+            </a:pPr>
+            <a:r>
+              <a:rPr lang="en-US" dirty="0" smtClean="0"/>
+              <a:t>It solves all of the problems.</a:t>
+            </a:r>
+            <a:endParaRPr lang="en-US" dirty="0"/>
+          </a:p>
+          <a:p>
+            <a:pPr marL="0" indent="0">
+              <a:buNone/>
+            </a:pPr>
+            <a:endParaRPr lang="en-US" dirty="0"/>
+          </a:p>
+        </p:txBody>
+      </p:sp>
+      <p:sp>
+        <p:nvSpPr>
           <p:cNvPr id="2" name="Title 1"/>
           <p:cNvSpPr>
             <a:spLocks noGrp="1"/>
@@ -4077,32 +4756,6 @@
             <a:r>
               <a:rPr lang="en-US" dirty="0" smtClean="0"/>
               <a:t>Solution</a:t>
-            </a:r>
-            <a:endParaRPr lang="en-US" dirty="0"/>
-          </a:p>
-        </p:txBody>
-      </p:sp>
-      <p:sp>
-        <p:nvSpPr>
-          <p:cNvPr id="3" name="Content Placeholder 2"/>
-          <p:cNvSpPr>
-            <a:spLocks noGrp="1"/>
-          </p:cNvSpPr>
-          <p:nvPr>
-            <p:ph idx="1"/>
-          </p:nvPr>
-        </p:nvSpPr>
-        <p:spPr/>
-        <p:txBody>
-          <a:bodyPr/>
-          <a:lstStyle/>
-          <a:p>
-            <a:pPr marL="0" indent="0">
-              <a:buNone/>
-            </a:pPr>
-            <a:r>
-              <a:rPr lang="en-US" dirty="0" smtClean="0"/>
-              <a:t>SSBB Management System</a:t>
             </a:r>
             <a:endParaRPr lang="en-US" dirty="0"/>
           </a:p>
@@ -4118,6 +4771,13 @@
   <p:clrMapOvr>
     <a:masterClrMapping/>
   </p:clrMapOvr>
+  <p:timing>
+    <p:tnLst>
+      <p:par>
+        <p:cTn id="1" dur="indefinite" restart="never" nodeType="tmRoot"/>
+      </p:par>
+    </p:tnLst>
+  </p:timing>
 </p:sld>
 </file>
 
@@ -4161,36 +4821,70 @@
           </a:p>
         </p:txBody>
       </p:sp>
-      <p:sp>
-        <p:nvSpPr>
-          <p:cNvPr id="3" name="Content Placeholder 2"/>
-          <p:cNvSpPr>
-            <a:spLocks noGrp="1"/>
-          </p:cNvSpPr>
-          <p:nvPr>
-            <p:ph idx="1"/>
-          </p:nvPr>
-        </p:nvSpPr>
-        <p:spPr/>
-        <p:txBody>
-          <a:bodyPr/>
-          <a:lstStyle/>
-          <a:p>
-            <a:pPr marL="0" indent="0">
-              <a:buNone/>
-            </a:pPr>
-            <a:r>
-              <a:rPr lang="en-US" dirty="0" smtClean="0"/>
-              <a:t>Ask </a:t>
-            </a:r>
-            <a:r>
-              <a:rPr lang="en-US" dirty="0" err="1" smtClean="0"/>
-              <a:t>nadine</a:t>
-            </a:r>
-            <a:endParaRPr lang="en-US" dirty="0"/>
-          </a:p>
-        </p:txBody>
-      </p:sp>
+      <p:pic>
+        <p:nvPicPr>
+          <p:cNvPr id="1026" name="Picture 2"/>
+          <p:cNvPicPr>
+            <a:picLocks noChangeAspect="1" noChangeArrowheads="1"/>
+          </p:cNvPicPr>
+          <p:nvPr/>
+        </p:nvPicPr>
+        <p:blipFill>
+          <a:blip r:embed="rId3">
+            <a:extLst>
+              <a:ext uri="{28A0092B-C50C-407E-A947-70E740481C1C}">
+                <a14:useLocalDpi xmlns:a14="http://schemas.microsoft.com/office/drawing/2010/main" val="0"/>
+              </a:ext>
+            </a:extLst>
+          </a:blip>
+          <a:srcRect/>
+          <a:stretch>
+            <a:fillRect/>
+          </a:stretch>
+        </p:blipFill>
+        <p:spPr bwMode="auto">
+          <a:xfrm>
+            <a:off x="1828800" y="304801"/>
+            <a:ext cx="5410200" cy="4739442"/>
+          </a:xfrm>
+          <a:prstGeom prst="rect">
+            <a:avLst/>
+          </a:prstGeom>
+          <a:noFill/>
+          <a:ln>
+            <a:noFill/>
+          </a:ln>
+          <a:effectLst/>
+          <a:extLst>
+            <a:ext uri="{909E8E84-426E-40DD-AFC4-6F175D3DCCD1}">
+              <a14:hiddenFill xmlns:a14="http://schemas.microsoft.com/office/drawing/2010/main">
+                <a:solidFill>
+                  <a:schemeClr val="accent1"/>
+                </a:solidFill>
+              </a14:hiddenFill>
+            </a:ext>
+            <a:ext uri="{91240B29-F687-4F45-9708-019B960494DF}">
+              <a14:hiddenLine xmlns:a14="http://schemas.microsoft.com/office/drawing/2010/main" w="9525">
+                <a:solidFill>
+                  <a:schemeClr val="tx1"/>
+                </a:solidFill>
+                <a:miter lim="800000"/>
+                <a:headEnd/>
+                <a:tailEnd/>
+              </a14:hiddenLine>
+            </a:ext>
+            <a:ext uri="{AF507438-7753-43E0-B8FC-AC1667EBCBE1}">
+              <a14:hiddenEffects xmlns:a14="http://schemas.microsoft.com/office/drawing/2010/main">
+                <a:effectLst>
+                  <a:outerShdw dist="35921" dir="2700000" algn="ctr" rotWithShape="0">
+                    <a:schemeClr val="bg2"/>
+                  </a:outerShdw>
+                </a:effectLst>
+              </a14:hiddenEffects>
+            </a:ext>
+          </a:extLst>
+        </p:spPr>
+      </p:pic>
     </p:spTree>
     <p:extLst>
       <p:ext uri="{BB962C8B-B14F-4D97-AF65-F5344CB8AC3E}">
@@ -4201,6 +4895,13 @@
   <p:clrMapOvr>
     <a:masterClrMapping/>
   </p:clrMapOvr>
+  <p:timing>
+    <p:tnLst>
+      <p:par>
+        <p:cTn id="1" dur="indefinite" restart="never" nodeType="tmRoot"/>
+      </p:par>
+    </p:tnLst>
+  </p:timing>
 </p:sld>
 </file>
 
@@ -4223,6 +4924,45 @@
       </p:grpSpPr>
       <p:sp>
         <p:nvSpPr>
+          <p:cNvPr id="3" name="Content Placeholder 2"/>
+          <p:cNvSpPr>
+            <a:spLocks noGrp="1"/>
+          </p:cNvSpPr>
+          <p:nvPr>
+            <p:ph idx="1"/>
+          </p:nvPr>
+        </p:nvSpPr>
+        <p:spPr/>
+        <p:txBody>
+          <a:bodyPr/>
+          <a:lstStyle/>
+          <a:p>
+            <a:r>
+              <a:rPr lang="en-US" dirty="0"/>
+              <a:t>s</a:t>
+            </a:r>
+            <a:r>
+              <a:rPr lang="en-US" dirty="0" smtClean="0"/>
+              <a:t>tored procedures without a return value</a:t>
+            </a:r>
+          </a:p>
+          <a:p>
+            <a:r>
+              <a:rPr lang="en-US" dirty="0" smtClean="0"/>
+              <a:t>C# language tics</a:t>
+            </a:r>
+          </a:p>
+          <a:p>
+            <a:r>
+              <a:rPr lang="en-US" dirty="0" smtClean="0"/>
+              <a:t>security</a:t>
+            </a:r>
+            <a:endParaRPr lang="en-US" dirty="0"/>
+          </a:p>
+        </p:txBody>
+      </p:sp>
+      <p:sp>
+        <p:nvSpPr>
           <p:cNvPr id="2" name="Title 1"/>
           <p:cNvSpPr>
             <a:spLocks noGrp="1"/>
@@ -4239,45 +4979,6 @@
             <a:r>
               <a:rPr lang="en-US" dirty="0" smtClean="0"/>
               <a:t>challenges</a:t>
-            </a:r>
-            <a:endParaRPr lang="en-US" dirty="0"/>
-          </a:p>
-        </p:txBody>
-      </p:sp>
-      <p:sp>
-        <p:nvSpPr>
-          <p:cNvPr id="3" name="Content Placeholder 2"/>
-          <p:cNvSpPr>
-            <a:spLocks noGrp="1"/>
-          </p:cNvSpPr>
-          <p:nvPr>
-            <p:ph idx="1"/>
-          </p:nvPr>
-        </p:nvSpPr>
-        <p:spPr/>
-        <p:txBody>
-          <a:bodyPr/>
-          <a:lstStyle/>
-          <a:p>
-            <a:r>
-              <a:rPr lang="en-US" dirty="0"/>
-              <a:t>s</a:t>
-            </a:r>
-            <a:r>
-              <a:rPr lang="en-US" dirty="0" smtClean="0"/>
-              <a:t>tored procedures without a return value</a:t>
-            </a:r>
-          </a:p>
-          <a:p>
-            <a:r>
-              <a:rPr lang="en-US" dirty="0" smtClean="0"/>
-              <a:t>C# language tics</a:t>
-            </a:r>
-          </a:p>
-          <a:p>
-            <a:r>
-              <a:rPr lang="en-US" dirty="0" smtClean="0"/>
-              <a:t>security</a:t>
             </a:r>
             <a:endParaRPr lang="en-US" dirty="0"/>
           </a:p>
@@ -4293,6 +4994,13 @@
   <p:clrMapOvr>
     <a:masterClrMapping/>
   </p:clrMapOvr>
+  <p:timing>
+    <p:tnLst>
+      <p:par>
+        <p:cTn id="1" dur="indefinite" restart="never" nodeType="tmRoot"/>
+      </p:par>
+    </p:tnLst>
+  </p:timing>
 </p:sld>
 </file>
 
@@ -4315,6 +5023,47 @@
       </p:grpSpPr>
       <p:sp>
         <p:nvSpPr>
+          <p:cNvPr id="3" name="Content Placeholder 2"/>
+          <p:cNvSpPr>
+            <a:spLocks noGrp="1"/>
+          </p:cNvSpPr>
+          <p:nvPr>
+            <p:ph idx="1"/>
+          </p:nvPr>
+        </p:nvSpPr>
+        <p:spPr/>
+        <p:txBody>
+          <a:bodyPr/>
+          <a:lstStyle/>
+          <a:p>
+            <a:r>
+              <a:rPr lang="en-US" dirty="0" smtClean="0"/>
+              <a:t>choosing a well-documented language</a:t>
+            </a:r>
+          </a:p>
+          <a:p>
+            <a:r>
+              <a:rPr lang="en-US" dirty="0" smtClean="0"/>
+              <a:t>visual studio is excellent for working with GUI applications</a:t>
+            </a:r>
+          </a:p>
+          <a:p>
+            <a:r>
+              <a:rPr lang="en-US" dirty="0" smtClean="0"/>
+              <a:t>SQL and C# work together seamlessly</a:t>
+            </a:r>
+          </a:p>
+          <a:p>
+            <a:r>
+              <a:rPr lang="en-US" dirty="0" smtClean="0"/>
+              <a:t>not all calls can, nor should, be handled by your application</a:t>
+            </a:r>
+            <a:endParaRPr lang="en-US" dirty="0"/>
+          </a:p>
+        </p:txBody>
+      </p:sp>
+      <p:sp>
+        <p:nvSpPr>
           <p:cNvPr id="2" name="Title 1"/>
           <p:cNvSpPr>
             <a:spLocks noGrp="1"/>
@@ -4331,47 +5080,6 @@
             <a:r>
               <a:rPr lang="en-US" dirty="0" smtClean="0"/>
               <a:t>lessons learned</a:t>
-            </a:r>
-            <a:endParaRPr lang="en-US" dirty="0"/>
-          </a:p>
-        </p:txBody>
-      </p:sp>
-      <p:sp>
-        <p:nvSpPr>
-          <p:cNvPr id="3" name="Content Placeholder 2"/>
-          <p:cNvSpPr>
-            <a:spLocks noGrp="1"/>
-          </p:cNvSpPr>
-          <p:nvPr>
-            <p:ph idx="1"/>
-          </p:nvPr>
-        </p:nvSpPr>
-        <p:spPr/>
-        <p:txBody>
-          <a:bodyPr/>
-          <a:lstStyle/>
-          <a:p>
-            <a:r>
-              <a:rPr lang="en-US" dirty="0" smtClean="0"/>
-              <a:t>choosing a well-documented language</a:t>
-            </a:r>
-          </a:p>
-          <a:p>
-            <a:r>
-              <a:rPr lang="en-US" dirty="0" smtClean="0"/>
-              <a:t>visual studio is excellent for working with GUI applications</a:t>
-            </a:r>
-          </a:p>
-          <a:p>
-            <a:r>
-              <a:rPr lang="en-US" dirty="0" smtClean="0"/>
-              <a:t>SQL and C# work together seamlessly</a:t>
-            </a:r>
-          </a:p>
-          <a:p>
-            <a:r>
-              <a:rPr lang="en-US" dirty="0" smtClean="0"/>
-              <a:t>not all calls can, nor should, be handled by your application</a:t>
             </a:r>
             <a:endParaRPr lang="en-US" dirty="0"/>
           </a:p>
@@ -4387,6 +5095,13 @@
   <p:clrMapOvr>
     <a:masterClrMapping/>
   </p:clrMapOvr>
+  <p:timing>
+    <p:tnLst>
+      <p:par>
+        <p:cTn id="1" dur="indefinite" restart="never" nodeType="tmRoot"/>
+      </p:par>
+    </p:tnLst>
+  </p:timing>
 </p:sld>
 </file>
 
@@ -4445,13 +5160,20 @@
   <p:clrMapOvr>
     <a:masterClrMapping/>
   </p:clrMapOvr>
+  <p:timing>
+    <p:tnLst>
+      <p:par>
+        <p:cTn id="1" dur="indefinite" restart="never" nodeType="tmRoot"/>
+      </p:par>
+    </p:tnLst>
+  </p:timing>
 </p:sld>
 </file>
 
 <file path=ppt/theme/theme1.xml><?xml version="1.0" encoding="utf-8"?>
-<a:theme xmlns:a="http://schemas.openxmlformats.org/drawingml/2006/main" name="Office Theme">
+<a:theme xmlns:a="http://schemas.openxmlformats.org/drawingml/2006/main" name="Elemental">
   <a:themeElements>
-    <a:clrScheme name="Office">
+    <a:clrScheme name="Elemental">
       <a:dk1>
         <a:sysClr val="windowText" lastClr="000000"/>
       </a:dk1>
@@ -4459,48 +5181,48 @@
         <a:sysClr val="window" lastClr="FFFFFF"/>
       </a:lt1>
       <a:dk2>
-        <a:srgbClr val="1F497D"/>
+        <a:srgbClr val="242852"/>
       </a:dk2>
       <a:lt2>
-        <a:srgbClr val="EEECE1"/>
+        <a:srgbClr val="ACCBF9"/>
       </a:lt2>
       <a:accent1>
-        <a:srgbClr val="4F81BD"/>
+        <a:srgbClr val="629DD1"/>
       </a:accent1>
       <a:accent2>
-        <a:srgbClr val="C0504D"/>
+        <a:srgbClr val="297FD5"/>
       </a:accent2>
       <a:accent3>
-        <a:srgbClr val="9BBB59"/>
+        <a:srgbClr val="7F8FA9"/>
       </a:accent3>
       <a:accent4>
-        <a:srgbClr val="8064A2"/>
+        <a:srgbClr val="4A66AC"/>
       </a:accent4>
       <a:accent5>
-        <a:srgbClr val="4BACC6"/>
+        <a:srgbClr val="5AA2AE"/>
       </a:accent5>
       <a:accent6>
-        <a:srgbClr val="F79646"/>
+        <a:srgbClr val="9D90A0"/>
       </a:accent6>
       <a:hlink>
-        <a:srgbClr val="0000FF"/>
+        <a:srgbClr val="9454C3"/>
       </a:hlink>
       <a:folHlink>
-        <a:srgbClr val="800080"/>
+        <a:srgbClr val="3EBBF0"/>
       </a:folHlink>
     </a:clrScheme>
-    <a:fontScheme name="Office">
+    <a:fontScheme name="Elemental">
       <a:majorFont>
-        <a:latin typeface="Calibri"/>
+        <a:latin typeface="Palatino Linotype"/>
         <a:ea typeface=""/>
         <a:cs typeface=""/>
-        <a:font script="Jpan" typeface="ＭＳ Ｐゴシック"/>
+        <a:font script="Jpan" typeface="HGS明朝E"/>
         <a:font script="Hang" typeface="맑은 고딕"/>
         <a:font script="Hans" typeface="宋体"/>
         <a:font script="Hant" typeface="新細明體"/>
         <a:font script="Arab" typeface="Times New Roman"/>
         <a:font script="Hebr" typeface="Times New Roman"/>
-        <a:font script="Thai" typeface="Angsana New"/>
+        <a:font script="Thai" typeface="Browallia New"/>
         <a:font script="Ethi" typeface="Nyala"/>
         <a:font script="Beng" typeface="Vrinda"/>
         <a:font script="Gujr" typeface="Shruti"/>
@@ -4526,20 +5248,20 @@
         <a:font script="Geor" typeface="Sylfaen"/>
       </a:majorFont>
       <a:minorFont>
-        <a:latin typeface="Calibri"/>
+        <a:latin typeface="Palatino Linotype"/>
         <a:ea typeface=""/>
         <a:cs typeface=""/>
-        <a:font script="Jpan" typeface="ＭＳ Ｐゴシック"/>
+        <a:font script="Jpan" typeface="HGS明朝E"/>
         <a:font script="Hang" typeface="맑은 고딕"/>
         <a:font script="Hans" typeface="宋体"/>
         <a:font script="Hant" typeface="新細明體"/>
-        <a:font script="Arab" typeface="Arial"/>
-        <a:font script="Hebr" typeface="Arial"/>
-        <a:font script="Thai" typeface="Cordia New"/>
+        <a:font script="Arab" typeface="Times New Roman"/>
+        <a:font script="Hebr" typeface="Times New Roman"/>
+        <a:font script="Thai" typeface="Browallia New"/>
         <a:font script="Ethi" typeface="Nyala"/>
         <a:font script="Beng" typeface="Vrinda"/>
         <a:font script="Gujr" typeface="Shruti"/>
-        <a:font script="Khmr" typeface="DaunPenh"/>
+        <a:font script="Khmr" typeface="MoolBoran"/>
         <a:font script="Knda" typeface="Tunga"/>
         <a:font script="Guru" typeface="Raavi"/>
         <a:font script="Cans" typeface="Euphemia"/>
@@ -4556,12 +5278,12 @@
         <a:font script="Laoo" typeface="DokChampa"/>
         <a:font script="Sinh" typeface="Iskoola Pota"/>
         <a:font script="Mong" typeface="Mongolian Baiti"/>
-        <a:font script="Viet" typeface="Arial"/>
+        <a:font script="Viet" typeface="Times New Roman"/>
         <a:font script="Uigh" typeface="Microsoft Uighur"/>
         <a:font script="Geor" typeface="Sylfaen"/>
       </a:minorFont>
     </a:fontScheme>
-    <a:fmtScheme name="Office">
+    <a:fmtScheme name="Elemental">
       <a:fillStyleLst>
         <a:solidFill>
           <a:schemeClr val="phClr"/>
@@ -4570,20 +5292,19 @@
           <a:gsLst>
             <a:gs pos="0">
               <a:schemeClr val="phClr">
-                <a:tint val="50000"/>
-                <a:satMod val="300000"/>
+                <a:tint val="90000"/>
               </a:schemeClr>
             </a:gs>
-            <a:gs pos="35000">
+            <a:gs pos="48000">
               <a:schemeClr val="phClr">
-                <a:tint val="37000"/>
-                <a:satMod val="300000"/>
+                <a:tint val="54000"/>
+                <a:satMod val="140000"/>
               </a:schemeClr>
             </a:gs>
             <a:gs pos="100000">
               <a:schemeClr val="phClr">
-                <a:tint val="15000"/>
-                <a:satMod val="350000"/>
+                <a:tint val="24000"/>
+                <a:satMod val="260000"/>
               </a:schemeClr>
             </a:gs>
           </a:gsLst>
@@ -4592,44 +5313,40 @@
         <a:gradFill rotWithShape="1">
           <a:gsLst>
             <a:gs pos="0">
+              <a:schemeClr val="phClr"/>
+            </a:gs>
+            <a:gs pos="100000">
               <a:schemeClr val="phClr">
-                <a:shade val="51000"/>
-                <a:satMod val="130000"/>
-              </a:schemeClr>
-            </a:gs>
-            <a:gs pos="80000">
-              <a:schemeClr val="phClr">
-                <a:shade val="93000"/>
-                <a:satMod val="130000"/>
+                <a:shade val="48000"/>
+                <a:satMod val="180000"/>
+                <a:lumMod val="94000"/>
               </a:schemeClr>
             </a:gs>
             <a:gs pos="100000">
               <a:schemeClr val="phClr">
-                <a:shade val="94000"/>
-                <a:satMod val="135000"/>
+                <a:shade val="48000"/>
+                <a:satMod val="180000"/>
+                <a:lumMod val="94000"/>
               </a:schemeClr>
             </a:gs>
           </a:gsLst>
-          <a:lin ang="16200000" scaled="0"/>
+          <a:lin ang="4140000" scaled="1"/>
         </a:gradFill>
       </a:fillStyleLst>
       <a:lnStyleLst>
-        <a:ln w="9525" cap="flat" cmpd="sng" algn="ctr">
-          <a:solidFill>
-            <a:schemeClr val="phClr">
-              <a:shade val="95000"/>
-              <a:satMod val="105000"/>
-            </a:schemeClr>
-          </a:solidFill>
-          <a:prstDash val="solid"/>
-        </a:ln>
-        <a:ln w="25400" cap="flat" cmpd="sng" algn="ctr">
+        <a:ln w="12700" cap="flat" cmpd="sng" algn="ctr">
           <a:solidFill>
             <a:schemeClr val="phClr"/>
           </a:solidFill>
           <a:prstDash val="solid"/>
         </a:ln>
-        <a:ln w="38100" cap="flat" cmpd="sng" algn="ctr">
+        <a:ln w="19050" cap="flat" cmpd="sng" algn="ctr">
+          <a:solidFill>
+            <a:schemeClr val="phClr"/>
+          </a:solidFill>
+          <a:prstDash val="solid"/>
+        </a:ln>
+        <a:ln w="28575" cap="flat" cmpd="sng" algn="ctr">
           <a:solidFill>
             <a:schemeClr val="phClr"/>
           </a:solidFill>
@@ -4639,27 +5356,38 @@
       <a:effectStyleLst>
         <a:effectStyle>
           <a:effectLst>
-            <a:outerShdw blurRad="40000" dist="20000" dir="5400000" rotWithShape="0">
+            <a:outerShdw blurRad="63500" dist="12700" dir="5400000" sx="102000" sy="102000" rotWithShape="0">
               <a:srgbClr val="000000">
-                <a:alpha val="38000"/>
+                <a:alpha val="32000"/>
               </a:srgbClr>
             </a:outerShdw>
           </a:effectLst>
         </a:effectStyle>
         <a:effectStyle>
           <a:effectLst>
-            <a:outerShdw blurRad="40000" dist="23000" dir="5400000" rotWithShape="0">
+            <a:outerShdw blurRad="76200" dist="38100" dir="5400000" rotWithShape="0">
               <a:srgbClr val="000000">
-                <a:alpha val="35000"/>
+                <a:alpha val="60000"/>
               </a:srgbClr>
             </a:outerShdw>
           </a:effectLst>
+          <a:scene3d>
+            <a:camera prst="orthographicFront">
+              <a:rot lat="0" lon="0" rev="0"/>
+            </a:camera>
+            <a:lightRig rig="glow" dir="tl">
+              <a:rot lat="0" lon="0" rev="19800000"/>
+            </a:lightRig>
+          </a:scene3d>
+          <a:sp3d prstMaterial="metal">
+            <a:bevelT w="38100" h="38100"/>
+          </a:sp3d>
         </a:effectStyle>
         <a:effectStyle>
           <a:effectLst>
-            <a:outerShdw blurRad="40000" dist="23000" dir="5400000" rotWithShape="0">
+            <a:outerShdw blurRad="114300" dist="114300" dir="5400000" rotWithShape="0">
               <a:srgbClr val="000000">
-                <a:alpha val="35000"/>
+                <a:alpha val="70000"/>
               </a:srgbClr>
             </a:outerShdw>
           </a:effectLst>
@@ -4668,11 +5396,11 @@
               <a:rot lat="0" lon="0" rev="0"/>
             </a:camera>
             <a:lightRig rig="threePt" dir="t">
-              <a:rot lat="0" lon="0" rev="1200000"/>
+              <a:rot lat="0" lon="0" rev="19800000"/>
             </a:lightRig>
           </a:scene3d>
-          <a:sp3d>
-            <a:bevelT w="63500" h="25400"/>
+          <a:sp3d prstMaterial="plastic">
+            <a:bevelT w="50800" h="50800"/>
           </a:sp3d>
         </a:effectStyle>
       </a:effectStyleLst>
@@ -4684,47 +5412,33 @@
           <a:gsLst>
             <a:gs pos="0">
               <a:schemeClr val="phClr">
-                <a:tint val="40000"/>
-                <a:satMod val="350000"/>
-              </a:schemeClr>
-            </a:gs>
-            <a:gs pos="40000">
-              <a:schemeClr val="phClr">
-                <a:tint val="45000"/>
-                <a:shade val="99000"/>
-                <a:satMod val="350000"/>
+                <a:tint val="95000"/>
               </a:schemeClr>
             </a:gs>
             <a:gs pos="100000">
               <a:schemeClr val="phClr">
-                <a:shade val="20000"/>
-                <a:satMod val="255000"/>
+                <a:shade val="40000"/>
+                <a:satMod val="180000"/>
               </a:schemeClr>
             </a:gs>
           </a:gsLst>
-          <a:path path="circle">
-            <a:fillToRect l="50000" t="-80000" r="50000" b="180000"/>
-          </a:path>
+          <a:lin ang="5400000" scaled="0"/>
         </a:gradFill>
-        <a:gradFill rotWithShape="1">
-          <a:gsLst>
-            <a:gs pos="0">
+        <a:blipFill>
+          <a:blip xmlns:r="http://schemas.openxmlformats.org/officeDocument/2006/relationships" r:embed="rId1">
+            <a:duotone>
               <a:schemeClr val="phClr">
-                <a:tint val="80000"/>
-                <a:satMod val="300000"/>
+                <a:shade val="14000"/>
+                <a:satMod val="280000"/>
               </a:schemeClr>
-            </a:gs>
-            <a:gs pos="100000">
               <a:schemeClr val="phClr">
-                <a:shade val="30000"/>
-                <a:satMod val="200000"/>
+                <a:tint val="60000"/>
+                <a:satMod val="120000"/>
               </a:schemeClr>
-            </a:gs>
-          </a:gsLst>
-          <a:path path="circle">
-            <a:fillToRect l="50000" t="50000" r="50000" b="50000"/>
-          </a:path>
-        </a:gradFill>
+            </a:duotone>
+          </a:blip>
+          <a:stretch/>
+        </a:blipFill>
       </a:bgFillStyleLst>
     </a:fmtScheme>
   </a:themeElements>

</xml_diff>